<commit_message>
Revert "회의 한 뒤"
This reverts commit 0010b3ce78d06d9a98169b07ba9315c998b3a032.
</commit_message>
<xml_diff>
--- a/아악아아악!!!.pptx
+++ b/아악아아악!!!.pptx
@@ -5,18 +5,17 @@
     <p:sldMasterId id="2147483648" r:id="rId1"/>
   </p:sldMasterIdLst>
   <p:notesMasterIdLst>
-    <p:notesMasterId r:id="rId11"/>
+    <p:notesMasterId r:id="rId10"/>
   </p:notesMasterIdLst>
   <p:sldIdLst>
     <p:sldId id="256" r:id="rId2"/>
     <p:sldId id="257" r:id="rId3"/>
-    <p:sldId id="265" r:id="rId4"/>
-    <p:sldId id="258" r:id="rId5"/>
-    <p:sldId id="259" r:id="rId6"/>
-    <p:sldId id="260" r:id="rId7"/>
-    <p:sldId id="261" r:id="rId8"/>
-    <p:sldId id="263" r:id="rId9"/>
-    <p:sldId id="264" r:id="rId10"/>
+    <p:sldId id="258" r:id="rId4"/>
+    <p:sldId id="259" r:id="rId5"/>
+    <p:sldId id="260" r:id="rId6"/>
+    <p:sldId id="261" r:id="rId7"/>
+    <p:sldId id="263" r:id="rId8"/>
+    <p:sldId id="264" r:id="rId9"/>
   </p:sldIdLst>
   <p:sldSz cx="9144000" cy="6858000" type="screen4x3"/>
   <p:notesSz cx="6858000" cy="9144000"/>
@@ -115,22 +114,6 @@
       </a:defRPr>
     </a:lvl9pPr>
   </p:defaultTextStyle>
-  <p:extLst>
-    <p:ext uri="{EFAFB233-063F-42B5-8137-9DF3F51BA10A}">
-      <p15:sldGuideLst xmlns:p15="http://schemas.microsoft.com/office/powerpoint/2012/main">
-        <p15:guide id="1" orient="horz" pos="2160">
-          <p15:clr>
-            <a:srgbClr val="A4A3A4"/>
-          </p15:clr>
-        </p15:guide>
-        <p15:guide id="2" pos="2880">
-          <p15:clr>
-            <a:srgbClr val="A4A3A4"/>
-          </p15:clr>
-        </p15:guide>
-      </p15:sldGuideLst>
-    </p:ext>
-  </p:extLst>
 </p:presentation>
 </file>
 
@@ -216,7 +199,7 @@
           <a:p>
             <a:fld id="{322BE6E1-CBFE-4D75-A5D9-91F6B131BAA3}" type="datetimeFigureOut">
               <a:rPr lang="ko-KR" altLang="en-US" smtClean="0"/>
-              <a:t>2017-03-11</a:t>
+              <a:t>2017-02-12</a:t>
             </a:fld>
             <a:endParaRPr lang="ko-KR" altLang="en-US"/>
           </a:p>
@@ -665,7 +648,7 @@
           <a:p>
             <a:fld id="{1807FEBA-1443-444E-9049-49E05385B20A}" type="datetime1">
               <a:rPr lang="ko-KR" altLang="en-US" smtClean="0"/>
-              <a:t>2017-03-11</a:t>
+              <a:t>2017-02-12</a:t>
             </a:fld>
             <a:endParaRPr lang="ko-KR" altLang="en-US"/>
           </a:p>
@@ -835,7 +818,7 @@
           <a:p>
             <a:fld id="{9D6C62C2-7F97-4687-BF1D-12F476B68085}" type="datetime1">
               <a:rPr lang="ko-KR" altLang="en-US" smtClean="0"/>
-              <a:t>2017-03-11</a:t>
+              <a:t>2017-02-12</a:t>
             </a:fld>
             <a:endParaRPr lang="ko-KR" altLang="en-US"/>
           </a:p>
@@ -1015,7 +998,7 @@
           <a:p>
             <a:fld id="{0A22CA48-77A4-4CAC-9A82-254432CDD5AB}" type="datetime1">
               <a:rPr lang="ko-KR" altLang="en-US" smtClean="0"/>
-              <a:t>2017-03-11</a:t>
+              <a:t>2017-02-12</a:t>
             </a:fld>
             <a:endParaRPr lang="ko-KR" altLang="en-US"/>
           </a:p>
@@ -1185,7 +1168,7 @@
           <a:p>
             <a:fld id="{29358A36-97FB-414B-A9E3-C04C49525799}" type="datetime1">
               <a:rPr lang="ko-KR" altLang="en-US" smtClean="0"/>
-              <a:t>2017-03-11</a:t>
+              <a:t>2017-02-12</a:t>
             </a:fld>
             <a:endParaRPr lang="ko-KR" altLang="en-US"/>
           </a:p>
@@ -1431,7 +1414,7 @@
           <a:p>
             <a:fld id="{8DE8D64E-C2A3-41CD-928B-772DB2EF815D}" type="datetime1">
               <a:rPr lang="ko-KR" altLang="en-US" smtClean="0"/>
-              <a:t>2017-03-11</a:t>
+              <a:t>2017-02-12</a:t>
             </a:fld>
             <a:endParaRPr lang="ko-KR" altLang="en-US"/>
           </a:p>
@@ -1719,7 +1702,7 @@
           <a:p>
             <a:fld id="{B2ACD634-D3E2-4AC5-BB0B-ADDF2C3C8AE5}" type="datetime1">
               <a:rPr lang="ko-KR" altLang="en-US" smtClean="0"/>
-              <a:t>2017-03-11</a:t>
+              <a:t>2017-02-12</a:t>
             </a:fld>
             <a:endParaRPr lang="ko-KR" altLang="en-US"/>
           </a:p>
@@ -2141,7 +2124,7 @@
           <a:p>
             <a:fld id="{8125A497-46BF-4A15-A06C-5A4C903ADD0D}" type="datetime1">
               <a:rPr lang="ko-KR" altLang="en-US" smtClean="0"/>
-              <a:t>2017-03-11</a:t>
+              <a:t>2017-02-12</a:t>
             </a:fld>
             <a:endParaRPr lang="ko-KR" altLang="en-US"/>
           </a:p>
@@ -2259,7 +2242,7 @@
           <a:p>
             <a:fld id="{9577B026-5B5C-4407-A631-4861A6B29EDE}" type="datetime1">
               <a:rPr lang="ko-KR" altLang="en-US" smtClean="0"/>
-              <a:t>2017-03-11</a:t>
+              <a:t>2017-02-12</a:t>
             </a:fld>
             <a:endParaRPr lang="ko-KR" altLang="en-US"/>
           </a:p>
@@ -2354,7 +2337,7 @@
           <a:p>
             <a:fld id="{9533E79F-763E-46A1-A0E4-B03A594183F9}" type="datetime1">
               <a:rPr lang="ko-KR" altLang="en-US" smtClean="0"/>
-              <a:t>2017-03-11</a:t>
+              <a:t>2017-02-12</a:t>
             </a:fld>
             <a:endParaRPr lang="ko-KR" altLang="en-US"/>
           </a:p>
@@ -2631,7 +2614,7 @@
           <a:p>
             <a:fld id="{2938D0DC-F944-4121-AE2B-A6AC932CFF17}" type="datetime1">
               <a:rPr lang="ko-KR" altLang="en-US" smtClean="0"/>
-              <a:t>2017-03-11</a:t>
+              <a:t>2017-02-12</a:t>
             </a:fld>
             <a:endParaRPr lang="ko-KR" altLang="en-US"/>
           </a:p>
@@ -2884,7 +2867,7 @@
           <a:p>
             <a:fld id="{83D605B8-9783-4CE4-BB46-BD02B01AAF1D}" type="datetime1">
               <a:rPr lang="ko-KR" altLang="en-US" smtClean="0"/>
-              <a:t>2017-03-11</a:t>
+              <a:t>2017-02-12</a:t>
             </a:fld>
             <a:endParaRPr lang="ko-KR" altLang="en-US"/>
           </a:p>
@@ -3097,7 +3080,7 @@
           <a:p>
             <a:fld id="{35EE7B1C-8E4A-407E-B83F-2C2F9304F21E}" type="datetime1">
               <a:rPr lang="ko-KR" altLang="en-US" smtClean="0"/>
-              <a:t>2017-03-11</a:t>
+              <a:t>2017-02-12</a:t>
             </a:fld>
             <a:endParaRPr lang="ko-KR" altLang="en-US"/>
           </a:p>
@@ -4223,39 +4206,191 @@
       </p:grpSpPr>
       <p:sp>
         <p:nvSpPr>
-          <p:cNvPr id="2" name="제목 1"/>
-          <p:cNvSpPr>
-            <a:spLocks noGrp="1"/>
-          </p:cNvSpPr>
-          <p:nvPr>
-            <p:ph type="title"/>
-          </p:nvPr>
-        </p:nvSpPr>
-        <p:spPr/>
-        <p:txBody>
-          <a:bodyPr/>
+          <p:cNvPr id="3" name="내용 개체 틀 2"/>
+          <p:cNvSpPr>
+            <a:spLocks noGrp="1"/>
+          </p:cNvSpPr>
+          <p:nvPr>
+            <p:ph idx="1"/>
+          </p:nvPr>
+        </p:nvSpPr>
+        <p:spPr>
+          <a:xfrm>
+            <a:off x="107504" y="116632"/>
+            <a:ext cx="8928992" cy="6624736"/>
+          </a:xfrm>
+        </p:spPr>
+        <p:txBody>
+          <a:bodyPr>
+            <a:normAutofit/>
+          </a:bodyPr>
           <a:lstStyle/>
           <a:p>
-            <a:endParaRPr lang="ko-KR" altLang="en-US"/>
-          </a:p>
-        </p:txBody>
-      </p:sp>
-      <p:sp>
-        <p:nvSpPr>
-          <p:cNvPr id="3" name="내용 개체 틀 2"/>
-          <p:cNvSpPr>
-            <a:spLocks noGrp="1"/>
-          </p:cNvSpPr>
-          <p:nvPr>
-            <p:ph idx="1"/>
-          </p:nvPr>
-        </p:nvSpPr>
-        <p:spPr/>
-        <p:txBody>
-          <a:bodyPr/>
-          <a:lstStyle/>
-          <a:p>
-            <a:endParaRPr lang="ko-KR" altLang="en-US"/>
+            <a:pPr marL="457200" indent="-457200">
+              <a:buAutoNum type="arabicPeriod"/>
+            </a:pPr>
+            <a:r>
+              <a:rPr lang="ko-KR" altLang="en-US" sz="2000" dirty="0" smtClean="0">
+                <a:latin typeface="굴림체" pitchFamily="49" charset="-127"/>
+                <a:ea typeface="굴림체" pitchFamily="49" charset="-127"/>
+              </a:rPr>
+              <a:t>게임 개요</a:t>
+            </a:r>
+            <a:endParaRPr lang="en-US" altLang="ko-KR" sz="1400" dirty="0" smtClean="0">
+              <a:latin typeface="굴림체" pitchFamily="49" charset="-127"/>
+              <a:ea typeface="굴림체" pitchFamily="49" charset="-127"/>
+            </a:endParaRPr>
+          </a:p>
+          <a:p>
+            <a:pPr marL="0" indent="0">
+              <a:buNone/>
+            </a:pPr>
+            <a:r>
+              <a:rPr lang="ko-KR" altLang="en-US" sz="1400" dirty="0" smtClean="0">
+                <a:latin typeface="굴림체" pitchFamily="49" charset="-127"/>
+                <a:ea typeface="굴림체" pitchFamily="49" charset="-127"/>
+              </a:rPr>
+              <a:t> </a:t>
+            </a:r>
+            <a:endParaRPr lang="en-US" altLang="ko-KR" sz="1400" dirty="0" smtClean="0">
+              <a:latin typeface="굴림체" pitchFamily="49" charset="-127"/>
+              <a:ea typeface="굴림체" pitchFamily="49" charset="-127"/>
+            </a:endParaRPr>
+          </a:p>
+          <a:p>
+            <a:pPr marL="0" indent="0">
+              <a:buNone/>
+            </a:pPr>
+            <a:r>
+              <a:rPr lang="en-US" altLang="ko-KR" sz="1400" dirty="0">
+                <a:latin typeface="굴림체" pitchFamily="49" charset="-127"/>
+                <a:ea typeface="굴림체" pitchFamily="49" charset="-127"/>
+              </a:rPr>
+              <a:t> </a:t>
+            </a:r>
+            <a:r>
+              <a:rPr lang="ko-KR" altLang="en-US" sz="1400" dirty="0" smtClean="0">
+                <a:latin typeface="굴림체" pitchFamily="49" charset="-127"/>
+                <a:ea typeface="굴림체" pitchFamily="49" charset="-127"/>
+              </a:rPr>
+              <a:t>카라마츠의 한마디로 이따이해진 사신이치마츠가 카라마츠를 죽여버렸다</a:t>
+            </a:r>
+            <a:r>
+              <a:rPr lang="en-US" altLang="ko-KR" sz="1400" dirty="0" smtClean="0">
+                <a:latin typeface="굴림체" pitchFamily="49" charset="-127"/>
+                <a:ea typeface="굴림체" pitchFamily="49" charset="-127"/>
+              </a:rPr>
+              <a:t>.</a:t>
+            </a:r>
+          </a:p>
+          <a:p>
+            <a:pPr marL="0" indent="0">
+              <a:buNone/>
+            </a:pPr>
+            <a:r>
+              <a:rPr lang="ko-KR" altLang="en-US" sz="1400" dirty="0" smtClean="0">
+                <a:latin typeface="굴림체" pitchFamily="49" charset="-127"/>
+                <a:ea typeface="굴림체" pitchFamily="49" charset="-127"/>
+              </a:rPr>
+              <a:t>그걸 본 여신쵸로마츠는 그런 카라마츠를 불쌍히 여겨 인간아기로 되살려 플레이어에게 맡긴다</a:t>
+            </a:r>
+            <a:r>
+              <a:rPr lang="en-US" altLang="ko-KR" sz="1400" dirty="0" smtClean="0">
+                <a:latin typeface="굴림체" pitchFamily="49" charset="-127"/>
+                <a:ea typeface="굴림체" pitchFamily="49" charset="-127"/>
+              </a:rPr>
+              <a:t>.</a:t>
+            </a:r>
+          </a:p>
+          <a:p>
+            <a:pPr marL="0" indent="0">
+              <a:buNone/>
+            </a:pPr>
+            <a:endParaRPr lang="en-US" altLang="ko-KR" sz="1400" dirty="0" smtClean="0">
+              <a:latin typeface="굴림체" pitchFamily="49" charset="-127"/>
+              <a:ea typeface="굴림체" pitchFamily="49" charset="-127"/>
+            </a:endParaRPr>
+          </a:p>
+          <a:p>
+            <a:pPr marL="0" indent="0">
+              <a:buNone/>
+            </a:pPr>
+            <a:r>
+              <a:rPr lang="ko-KR" altLang="en-US" sz="1400" dirty="0" smtClean="0">
+                <a:latin typeface="굴림체" pitchFamily="49" charset="-127"/>
+                <a:ea typeface="굴림체" pitchFamily="49" charset="-127"/>
+              </a:rPr>
+              <a:t>여신쵸로마츠는 카라마츠가 참된 인간으로 자라게 하기 위해 플레이어 집의 집사가 되기로 한다</a:t>
+            </a:r>
+            <a:r>
+              <a:rPr lang="en-US" altLang="ko-KR" sz="1400" dirty="0" smtClean="0">
+                <a:latin typeface="굴림체" pitchFamily="49" charset="-127"/>
+                <a:ea typeface="굴림체" pitchFamily="49" charset="-127"/>
+              </a:rPr>
+              <a:t>.</a:t>
+            </a:r>
+          </a:p>
+          <a:p>
+            <a:pPr marL="0" indent="0">
+              <a:buNone/>
+            </a:pPr>
+            <a:r>
+              <a:rPr lang="ko-KR" altLang="en-US" sz="1400" dirty="0" smtClean="0">
+                <a:latin typeface="굴림체" pitchFamily="49" charset="-127"/>
+                <a:ea typeface="굴림체" pitchFamily="49" charset="-127"/>
+              </a:rPr>
+              <a:t>플레이어는 카라마츠를 위해 아르바이트를 시키고 여러 학원을 </a:t>
+            </a:r>
+            <a:r>
+              <a:rPr lang="en-US" altLang="ko-KR" sz="1400" dirty="0" smtClean="0">
+                <a:latin typeface="굴림체" pitchFamily="49" charset="-127"/>
+                <a:ea typeface="굴림체" pitchFamily="49" charset="-127"/>
+              </a:rPr>
+              <a:t>8</a:t>
+            </a:r>
+            <a:r>
+              <a:rPr lang="ko-KR" altLang="en-US" sz="1400" dirty="0" smtClean="0">
+                <a:latin typeface="굴림체" pitchFamily="49" charset="-127"/>
+                <a:ea typeface="굴림체" pitchFamily="49" charset="-127"/>
+              </a:rPr>
+              <a:t>년 동안 보내게 되는데</a:t>
+            </a:r>
+            <a:r>
+              <a:rPr lang="en-US" altLang="ko-KR" sz="1400" dirty="0" smtClean="0">
+                <a:latin typeface="굴림체" pitchFamily="49" charset="-127"/>
+                <a:ea typeface="굴림체" pitchFamily="49" charset="-127"/>
+              </a:rPr>
+              <a:t>...</a:t>
+            </a:r>
+            <a:r>
+              <a:rPr lang="ko-KR" altLang="en-US" sz="1400" dirty="0" smtClean="0">
+                <a:latin typeface="굴림체" pitchFamily="49" charset="-127"/>
+                <a:ea typeface="굴림체" pitchFamily="49" charset="-127"/>
+              </a:rPr>
+              <a:t>  </a:t>
+            </a:r>
+            <a:endParaRPr lang="en-US" altLang="ko-KR" sz="1400" dirty="0">
+              <a:latin typeface="굴림체" pitchFamily="49" charset="-127"/>
+              <a:ea typeface="굴림체" pitchFamily="49" charset="-127"/>
+            </a:endParaRPr>
+          </a:p>
+          <a:p>
+            <a:pPr marL="457200" indent="-457200">
+              <a:buAutoNum type="arabicPeriod"/>
+            </a:pPr>
+            <a:endParaRPr lang="en-US" altLang="ko-KR" sz="1400" dirty="0" smtClean="0">
+              <a:latin typeface="굴림체" pitchFamily="49" charset="-127"/>
+              <a:ea typeface="굴림체" pitchFamily="49" charset="-127"/>
+            </a:endParaRPr>
+          </a:p>
+          <a:p>
+            <a:pPr marL="0" indent="0">
+              <a:buNone/>
+            </a:pPr>
+            <a:endParaRPr lang="en-US" altLang="ko-KR" sz="1600" dirty="0" smtClean="0">
+              <a:latin typeface="굴림체" pitchFamily="49" charset="-127"/>
+              <a:ea typeface="굴림체" pitchFamily="49" charset="-127"/>
+            </a:endParaRPr>
           </a:p>
         </p:txBody>
       </p:sp>
@@ -4285,7 +4420,7 @@
     </p:spTree>
     <p:extLst>
       <p:ext uri="{BB962C8B-B14F-4D97-AF65-F5344CB8AC3E}">
-        <p14:creationId xmlns:p14="http://schemas.microsoft.com/office/powerpoint/2010/main" val="1863307531"/>
+        <p14:creationId xmlns:p14="http://schemas.microsoft.com/office/powerpoint/2010/main" val="2433871538"/>
       </p:ext>
     </p:extLst>
   </p:cSld>
@@ -4331,7 +4466,7 @@
         </p:nvSpPr>
         <p:spPr>
           <a:xfrm>
-            <a:off x="107504" y="188640"/>
+            <a:off x="107504" y="116632"/>
             <a:ext cx="8928992" cy="6624736"/>
           </a:xfrm>
         </p:spPr>
@@ -4341,81 +4476,27 @@
           </a:bodyPr>
           <a:lstStyle/>
           <a:p>
-            <a:pPr marL="457200" indent="-457200">
-              <a:buAutoNum type="arabicPeriod"/>
+            <a:pPr marL="0" indent="0">
+              <a:buNone/>
             </a:pPr>
             <a:r>
+              <a:rPr lang="en-US" altLang="ko-KR" sz="2000" dirty="0" smtClean="0">
+                <a:latin typeface="굴림체" pitchFamily="49" charset="-127"/>
+                <a:ea typeface="굴림체" pitchFamily="49" charset="-127"/>
+              </a:rPr>
+              <a:t>2. </a:t>
+            </a:r>
+            <a:r>
               <a:rPr lang="ko-KR" altLang="en-US" sz="2000" dirty="0" smtClean="0">
                 <a:latin typeface="굴림체" pitchFamily="49" charset="-127"/>
                 <a:ea typeface="굴림체" pitchFamily="49" charset="-127"/>
               </a:rPr>
-              <a:t>게임 개요</a:t>
-            </a:r>
-            <a:endParaRPr lang="en-US" altLang="ko-KR" sz="1400" dirty="0" smtClean="0">
+              <a:t>캐릭터 설정 및 특징</a:t>
+            </a:r>
+            <a:endParaRPr lang="en-US" altLang="ko-KR" sz="2000" dirty="0" smtClean="0">
               <a:latin typeface="굴림체" pitchFamily="49" charset="-127"/>
               <a:ea typeface="굴림체" pitchFamily="49" charset="-127"/>
             </a:endParaRPr>
-          </a:p>
-          <a:p>
-            <a:pPr marL="0" indent="0">
-              <a:buNone/>
-            </a:pPr>
-            <a:r>
-              <a:rPr lang="ko-KR" altLang="en-US" sz="1400" dirty="0" smtClean="0">
-                <a:latin typeface="굴림체" pitchFamily="49" charset="-127"/>
-                <a:ea typeface="굴림체" pitchFamily="49" charset="-127"/>
-              </a:rPr>
-              <a:t> </a:t>
-            </a:r>
-            <a:endParaRPr lang="en-US" altLang="ko-KR" sz="1400" dirty="0" smtClean="0">
-              <a:latin typeface="굴림체" pitchFamily="49" charset="-127"/>
-              <a:ea typeface="굴림체" pitchFamily="49" charset="-127"/>
-            </a:endParaRPr>
-          </a:p>
-          <a:p>
-            <a:pPr marL="0" indent="0">
-              <a:buNone/>
-            </a:pPr>
-            <a:r>
-              <a:rPr lang="en-US" altLang="ko-KR" sz="1400" dirty="0">
-                <a:latin typeface="굴림체" pitchFamily="49" charset="-127"/>
-                <a:ea typeface="굴림체" pitchFamily="49" charset="-127"/>
-              </a:rPr>
-              <a:t> </a:t>
-            </a:r>
-            <a:r>
-              <a:rPr lang="ko-KR" altLang="en-US" sz="1400" dirty="0" smtClean="0">
-                <a:latin typeface="굴림체" pitchFamily="49" charset="-127"/>
-                <a:ea typeface="굴림체" pitchFamily="49" charset="-127"/>
-              </a:rPr>
-              <a:t>카라마츠의 한마디로 이따이해진 사신이치마츠가 카라마츠를 죽여버렸다</a:t>
-            </a:r>
-            <a:r>
-              <a:rPr lang="en-US" altLang="ko-KR" sz="1400" dirty="0" smtClean="0">
-                <a:latin typeface="굴림체" pitchFamily="49" charset="-127"/>
-                <a:ea typeface="굴림체" pitchFamily="49" charset="-127"/>
-              </a:rPr>
-              <a:t>.</a:t>
-            </a:r>
-          </a:p>
-          <a:p>
-            <a:pPr marL="0" indent="0">
-              <a:buNone/>
-            </a:pPr>
-            <a:r>
-              <a:rPr lang="ko-KR" altLang="en-US" sz="1400" dirty="0" smtClean="0">
-                <a:latin typeface="굴림체" pitchFamily="49" charset="-127"/>
-                <a:ea typeface="굴림체" pitchFamily="49" charset="-127"/>
-              </a:rPr>
-              <a:t>그걸 본 여신쵸로마츠는 그런 카라마츠를 불쌍히 여겨 인간아기로 되살려 플레이어에게 맡긴다</a:t>
-            </a:r>
-            <a:r>
-              <a:rPr lang="en-US" altLang="ko-KR" sz="1400" dirty="0" smtClean="0">
-                <a:latin typeface="굴림체" pitchFamily="49" charset="-127"/>
-                <a:ea typeface="굴림체" pitchFamily="49" charset="-127"/>
-              </a:rPr>
-              <a:t>.</a:t>
-            </a:r>
           </a:p>
           <a:p>
             <a:pPr marL="0" indent="0">
@@ -4431,67 +4512,100 @@
               <a:buNone/>
             </a:pPr>
             <a:r>
+              <a:rPr lang="en-US" altLang="ko-KR" sz="1400" dirty="0" smtClean="0">
+                <a:latin typeface="굴림체" pitchFamily="49" charset="-127"/>
+                <a:ea typeface="굴림체" pitchFamily="49" charset="-127"/>
+              </a:rPr>
+              <a:t>- </a:t>
+            </a:r>
+            <a:r>
               <a:rPr lang="ko-KR" altLang="en-US" sz="1400" dirty="0" smtClean="0">
                 <a:latin typeface="굴림체" pitchFamily="49" charset="-127"/>
                 <a:ea typeface="굴림체" pitchFamily="49" charset="-127"/>
               </a:rPr>
-              <a:t>여신쵸로마츠는 카라마츠가 참된 인간으로 자라게 하기 위해 플레이어 집의 집사가 되기로 한다</a:t>
+              <a:t>나이</a:t>
             </a:r>
             <a:r>
               <a:rPr lang="en-US" altLang="ko-KR" sz="1400" dirty="0" smtClean="0">
                 <a:latin typeface="굴림체" pitchFamily="49" charset="-127"/>
                 <a:ea typeface="굴림체" pitchFamily="49" charset="-127"/>
               </a:rPr>
-              <a:t>.</a:t>
+              <a:t>:</a:t>
+            </a:r>
+            <a:r>
+              <a:rPr lang="ko-KR" altLang="en-US" sz="1400" dirty="0" smtClean="0">
+                <a:latin typeface="굴림체" pitchFamily="49" charset="-127"/>
+                <a:ea typeface="굴림체" pitchFamily="49" charset="-127"/>
+              </a:rPr>
+              <a:t> </a:t>
+            </a:r>
+            <a:r>
+              <a:rPr lang="en-US" altLang="ko-KR" sz="1400" dirty="0" smtClean="0">
+                <a:latin typeface="굴림체" pitchFamily="49" charset="-127"/>
+                <a:ea typeface="굴림체" pitchFamily="49" charset="-127"/>
+              </a:rPr>
+              <a:t>12</a:t>
+            </a:r>
+            <a:r>
+              <a:rPr lang="ko-KR" altLang="en-US" sz="1400" dirty="0" smtClean="0">
+                <a:latin typeface="굴림체" pitchFamily="49" charset="-127"/>
+                <a:ea typeface="굴림체" pitchFamily="49" charset="-127"/>
+              </a:rPr>
+              <a:t>살</a:t>
+            </a:r>
+            <a:r>
+              <a:rPr lang="en-US" altLang="ko-KR" sz="1400" dirty="0" smtClean="0">
+                <a:latin typeface="굴림체" pitchFamily="49" charset="-127"/>
+                <a:ea typeface="굴림체" pitchFamily="49" charset="-127"/>
+              </a:rPr>
+              <a:t>(</a:t>
+            </a:r>
+            <a:r>
+              <a:rPr lang="ko-KR" altLang="en-US" sz="1400" dirty="0" smtClean="0">
+                <a:latin typeface="굴림체" pitchFamily="49" charset="-127"/>
+                <a:ea typeface="굴림체" pitchFamily="49" charset="-127"/>
+              </a:rPr>
+              <a:t>시작 나이</a:t>
+            </a:r>
+            <a:r>
+              <a:rPr lang="en-US" altLang="ko-KR" sz="1400" dirty="0" smtClean="0">
+                <a:latin typeface="굴림체" pitchFamily="49" charset="-127"/>
+                <a:ea typeface="굴림체" pitchFamily="49" charset="-127"/>
+              </a:rPr>
+              <a:t>)~20</a:t>
+            </a:r>
+            <a:r>
+              <a:rPr lang="ko-KR" altLang="en-US" sz="1400" dirty="0" smtClean="0">
+                <a:latin typeface="굴림체" pitchFamily="49" charset="-127"/>
+                <a:ea typeface="굴림체" pitchFamily="49" charset="-127"/>
+              </a:rPr>
+              <a:t>상</a:t>
+            </a:r>
+            <a:r>
+              <a:rPr lang="en-US" altLang="ko-KR" sz="1400" dirty="0" smtClean="0">
+                <a:latin typeface="굴림체" pitchFamily="49" charset="-127"/>
+                <a:ea typeface="굴림체" pitchFamily="49" charset="-127"/>
+              </a:rPr>
+              <a:t>(</a:t>
+            </a:r>
+            <a:r>
+              <a:rPr lang="ko-KR" altLang="en-US" sz="1400" dirty="0" smtClean="0">
+                <a:latin typeface="굴림체" pitchFamily="49" charset="-127"/>
+                <a:ea typeface="굴림체" pitchFamily="49" charset="-127"/>
+              </a:rPr>
+              <a:t>끝나는 나이</a:t>
+            </a:r>
+            <a:r>
+              <a:rPr lang="en-US" altLang="ko-KR" sz="1400" dirty="0" smtClean="0">
+                <a:latin typeface="굴림체" pitchFamily="49" charset="-127"/>
+                <a:ea typeface="굴림체" pitchFamily="49" charset="-127"/>
+              </a:rPr>
+              <a:t>)</a:t>
             </a:r>
           </a:p>
           <a:p>
             <a:pPr marL="0" indent="0">
               <a:buNone/>
-            </a:pPr>
-            <a:r>
-              <a:rPr lang="ko-KR" altLang="en-US" sz="1400" dirty="0" smtClean="0">
-                <a:latin typeface="굴림체" pitchFamily="49" charset="-127"/>
-                <a:ea typeface="굴림체" pitchFamily="49" charset="-127"/>
-              </a:rPr>
-              <a:t>플레이어는 카라마츠를 위해 아르바이트를 시키고 여러 학원을 </a:t>
-            </a:r>
-            <a:r>
-              <a:rPr lang="en-US" altLang="ko-KR" sz="1400" dirty="0" smtClean="0">
-                <a:latin typeface="굴림체" pitchFamily="49" charset="-127"/>
-                <a:ea typeface="굴림체" pitchFamily="49" charset="-127"/>
-              </a:rPr>
-              <a:t>8</a:t>
-            </a:r>
-            <a:r>
-              <a:rPr lang="ko-KR" altLang="en-US" sz="1400" dirty="0" smtClean="0">
-                <a:latin typeface="굴림체" pitchFamily="49" charset="-127"/>
-                <a:ea typeface="굴림체" pitchFamily="49" charset="-127"/>
-              </a:rPr>
-              <a:t>년 동안 보내게 되는데</a:t>
-            </a:r>
-            <a:r>
-              <a:rPr lang="en-US" altLang="ko-KR" sz="1400" dirty="0" smtClean="0">
-                <a:latin typeface="굴림체" pitchFamily="49" charset="-127"/>
-                <a:ea typeface="굴림체" pitchFamily="49" charset="-127"/>
-              </a:rPr>
-              <a:t>...</a:t>
-            </a:r>
-            <a:r>
-              <a:rPr lang="ko-KR" altLang="en-US" sz="1400" dirty="0" smtClean="0">
-                <a:latin typeface="굴림체" pitchFamily="49" charset="-127"/>
-                <a:ea typeface="굴림체" pitchFamily="49" charset="-127"/>
-              </a:rPr>
-              <a:t>  </a:t>
-            </a:r>
-            <a:endParaRPr lang="en-US" altLang="ko-KR" sz="1400" dirty="0">
-              <a:latin typeface="굴림체" pitchFamily="49" charset="-127"/>
-              <a:ea typeface="굴림체" pitchFamily="49" charset="-127"/>
-            </a:endParaRPr>
-          </a:p>
-          <a:p>
-            <a:pPr marL="457200" indent="-457200">
-              <a:buAutoNum type="arabicPeriod"/>
             </a:pPr>
             <a:endParaRPr lang="en-US" altLang="ko-KR" sz="1400" dirty="0" smtClean="0">
               <a:latin typeface="굴림체" pitchFamily="49" charset="-127"/>
@@ -4502,16 +4616,148 @@
             <a:pPr marL="0" indent="0">
               <a:buNone/>
             </a:pPr>
-            <a:endParaRPr lang="en-US" altLang="ko-KR" sz="1600" dirty="0" smtClean="0">
+            <a:r>
+              <a:rPr lang="en-US" altLang="ko-KR" sz="1400" dirty="0" smtClean="0">
+                <a:latin typeface="굴림체" pitchFamily="49" charset="-127"/>
+                <a:ea typeface="굴림체" pitchFamily="49" charset="-127"/>
+              </a:rPr>
+              <a:t>- </a:t>
+            </a:r>
+            <a:r>
+              <a:rPr lang="ko-KR" altLang="en-US" sz="1400" dirty="0" smtClean="0">
+                <a:latin typeface="굴림체" pitchFamily="49" charset="-127"/>
+                <a:ea typeface="굴림체" pitchFamily="49" charset="-127"/>
+              </a:rPr>
+              <a:t>외적 설정</a:t>
+            </a:r>
+            <a:r>
+              <a:rPr lang="en-US" altLang="ko-KR" sz="1400" dirty="0" smtClean="0">
+                <a:latin typeface="굴림체" pitchFamily="49" charset="-127"/>
+                <a:ea typeface="굴림체" pitchFamily="49" charset="-127"/>
+              </a:rPr>
+              <a:t>: </a:t>
+            </a:r>
+            <a:r>
+              <a:rPr lang="ko-KR" altLang="en-US" sz="1400" dirty="0" smtClean="0">
+                <a:latin typeface="굴림체" pitchFamily="49" charset="-127"/>
+                <a:ea typeface="굴림체" pitchFamily="49" charset="-127"/>
+              </a:rPr>
+              <a:t>카라마츠</a:t>
+            </a:r>
+            <a:endParaRPr lang="en-US" altLang="ko-KR" sz="1400" dirty="0">
               <a:latin typeface="굴림체" pitchFamily="49" charset="-127"/>
               <a:ea typeface="굴림체" pitchFamily="49" charset="-127"/>
             </a:endParaRPr>
           </a:p>
-        </p:txBody>
-      </p:sp>
-      <p:sp>
-        <p:nvSpPr>
-          <p:cNvPr id="4" name="슬라이드 번호 개체 틀 3"/>
+          <a:p>
+            <a:pPr marL="0" indent="0">
+              <a:buNone/>
+            </a:pPr>
+            <a:r>
+              <a:rPr lang="en-US" altLang="ko-KR" sz="1400" dirty="0" smtClean="0">
+                <a:latin typeface="굴림체" pitchFamily="49" charset="-127"/>
+                <a:ea typeface="굴림체" pitchFamily="49" charset="-127"/>
+              </a:rPr>
+              <a:t>	 </a:t>
+            </a:r>
+            <a:r>
+              <a:rPr lang="ko-KR" altLang="en-US" sz="1400" dirty="0" smtClean="0">
+                <a:latin typeface="굴림체" pitchFamily="49" charset="-127"/>
+                <a:ea typeface="굴림체" pitchFamily="49" charset="-127"/>
+              </a:rPr>
+              <a:t>후드 티를 입고 있다</a:t>
+            </a:r>
+            <a:r>
+              <a:rPr lang="en-US" altLang="ko-KR" sz="1400" dirty="0" smtClean="0">
+                <a:latin typeface="굴림체" pitchFamily="49" charset="-127"/>
+                <a:ea typeface="굴림체" pitchFamily="49" charset="-127"/>
+              </a:rPr>
+              <a:t>.</a:t>
+            </a:r>
+          </a:p>
+          <a:p>
+            <a:pPr marL="0" indent="0">
+              <a:buNone/>
+            </a:pPr>
+            <a:endParaRPr lang="en-US" altLang="ko-KR" sz="1400" dirty="0" smtClean="0">
+              <a:latin typeface="굴림체" pitchFamily="49" charset="-127"/>
+              <a:ea typeface="굴림체" pitchFamily="49" charset="-127"/>
+            </a:endParaRPr>
+          </a:p>
+          <a:p>
+            <a:pPr marL="0" indent="0">
+              <a:buNone/>
+            </a:pPr>
+            <a:r>
+              <a:rPr lang="en-US" altLang="ko-KR" sz="1400" dirty="0" smtClean="0">
+                <a:latin typeface="굴림체" pitchFamily="49" charset="-127"/>
+                <a:ea typeface="굴림체" pitchFamily="49" charset="-127"/>
+              </a:rPr>
+              <a:t>- </a:t>
+            </a:r>
+            <a:r>
+              <a:rPr lang="ko-KR" altLang="en-US" sz="1400" dirty="0" smtClean="0">
+                <a:latin typeface="굴림체" pitchFamily="49" charset="-127"/>
+                <a:ea typeface="굴림체" pitchFamily="49" charset="-127"/>
+              </a:rPr>
+              <a:t>내적 설정</a:t>
+            </a:r>
+            <a:r>
+              <a:rPr lang="en-US" altLang="ko-KR" sz="1400" dirty="0" smtClean="0">
+                <a:latin typeface="굴림체" pitchFamily="49" charset="-127"/>
+                <a:ea typeface="굴림체" pitchFamily="49" charset="-127"/>
+              </a:rPr>
+              <a:t>: </a:t>
+            </a:r>
+            <a:r>
+              <a:rPr lang="ko-KR" altLang="en-US" sz="1400" dirty="0" smtClean="0">
+                <a:latin typeface="굴림체" pitchFamily="49" charset="-127"/>
+                <a:ea typeface="굴림체" pitchFamily="49" charset="-127"/>
+              </a:rPr>
+              <a:t>카라마츠</a:t>
+            </a:r>
+            <a:endParaRPr lang="en-US" altLang="ko-KR" sz="1400" dirty="0" smtClean="0">
+              <a:latin typeface="굴림체" pitchFamily="49" charset="-127"/>
+              <a:ea typeface="굴림체" pitchFamily="49" charset="-127"/>
+            </a:endParaRPr>
+          </a:p>
+          <a:p>
+            <a:pPr marL="0" indent="0">
+              <a:buNone/>
+            </a:pPr>
+            <a:endParaRPr lang="en-US" altLang="ko-KR" sz="1400" dirty="0" smtClean="0">
+              <a:latin typeface="굴림체" pitchFamily="49" charset="-127"/>
+              <a:ea typeface="굴림체" pitchFamily="49" charset="-127"/>
+            </a:endParaRPr>
+          </a:p>
+          <a:p>
+            <a:pPr marL="0" indent="0">
+              <a:buNone/>
+            </a:pPr>
+            <a:r>
+              <a:rPr lang="en-US" altLang="ko-KR" sz="1400" dirty="0" smtClean="0">
+                <a:latin typeface="굴림체" pitchFamily="49" charset="-127"/>
+                <a:ea typeface="굴림체" pitchFamily="49" charset="-127"/>
+              </a:rPr>
+              <a:t>※</a:t>
+            </a:r>
+            <a:r>
+              <a:rPr lang="ko-KR" altLang="en-US" sz="1400" dirty="0" smtClean="0">
+                <a:latin typeface="굴림체" pitchFamily="49" charset="-127"/>
+                <a:ea typeface="굴림체" pitchFamily="49" charset="-127"/>
+              </a:rPr>
+              <a:t>인선이에게 참고</a:t>
+            </a:r>
+            <a:endParaRPr lang="en-US" altLang="ko-KR" sz="1400" dirty="0">
+              <a:latin typeface="굴림체" pitchFamily="49" charset="-127"/>
+              <a:ea typeface="굴림체" pitchFamily="49" charset="-127"/>
+            </a:endParaRPr>
+          </a:p>
+        </p:txBody>
+      </p:sp>
+      <p:sp>
+        <p:nvSpPr>
+          <p:cNvPr id="2" name="슬라이드 번호 개체 틀 1"/>
           <p:cNvSpPr>
             <a:spLocks noGrp="1"/>
           </p:cNvSpPr>
@@ -4535,7 +4781,7 @@
     </p:spTree>
     <p:extLst>
       <p:ext uri="{BB962C8B-B14F-4D97-AF65-F5344CB8AC3E}">
-        <p14:creationId xmlns:p14="http://schemas.microsoft.com/office/powerpoint/2010/main" val="2433871538"/>
+        <p14:creationId xmlns:p14="http://schemas.microsoft.com/office/powerpoint/2010/main" val="1527275268"/>
       </p:ext>
     </p:extLst>
   </p:cSld>
@@ -4599,16 +4845,287 @@
                 <a:latin typeface="굴림체" pitchFamily="49" charset="-127"/>
                 <a:ea typeface="굴림체" pitchFamily="49" charset="-127"/>
               </a:rPr>
-              <a:t>2. </a:t>
+              <a:t>3. </a:t>
             </a:r>
             <a:r>
               <a:rPr lang="ko-KR" altLang="en-US" sz="2000" dirty="0" smtClean="0">
                 <a:latin typeface="굴림체" pitchFamily="49" charset="-127"/>
                 <a:ea typeface="굴림체" pitchFamily="49" charset="-127"/>
               </a:rPr>
-              <a:t>캐릭터 설정 및 특징</a:t>
+              <a:t>게임 시스템</a:t>
             </a:r>
             <a:endParaRPr lang="en-US" altLang="ko-KR" sz="2000" dirty="0" smtClean="0">
+              <a:latin typeface="굴림체" pitchFamily="49" charset="-127"/>
+              <a:ea typeface="굴림체" pitchFamily="49" charset="-127"/>
+            </a:endParaRPr>
+          </a:p>
+          <a:p>
+            <a:pPr marL="0" indent="0">
+              <a:buNone/>
+            </a:pPr>
+            <a:endParaRPr lang="en-US" altLang="ko-KR" sz="1600" dirty="0" smtClean="0">
+              <a:latin typeface="굴림체" pitchFamily="49" charset="-127"/>
+              <a:ea typeface="굴림체" pitchFamily="49" charset="-127"/>
+            </a:endParaRPr>
+          </a:p>
+          <a:p>
+            <a:pPr marL="0" indent="0">
+              <a:buNone/>
+            </a:pPr>
+            <a:r>
+              <a:rPr lang="en-US" altLang="ko-KR" sz="1400" b="1" dirty="0" smtClean="0">
+                <a:latin typeface="굴림체" pitchFamily="49" charset="-127"/>
+                <a:ea typeface="굴림체" pitchFamily="49" charset="-127"/>
+              </a:rPr>
+              <a:t>3.1 </a:t>
+            </a:r>
+            <a:r>
+              <a:rPr lang="ko-KR" altLang="en-US" sz="1400" b="1" dirty="0" smtClean="0">
+                <a:latin typeface="굴림체" pitchFamily="49" charset="-127"/>
+                <a:ea typeface="굴림체" pitchFamily="49" charset="-127"/>
+              </a:rPr>
+              <a:t>플랫폼</a:t>
+            </a:r>
+            <a:r>
+              <a:rPr lang="en-US" altLang="ko-KR" sz="1400" b="1" dirty="0" smtClean="0">
+                <a:latin typeface="굴림체" pitchFamily="49" charset="-127"/>
+                <a:ea typeface="굴림체" pitchFamily="49" charset="-127"/>
+              </a:rPr>
+              <a:t>: </a:t>
+            </a:r>
+            <a:r>
+              <a:rPr lang="en-US" altLang="ko-KR" sz="1400" dirty="0" smtClean="0">
+                <a:latin typeface="굴림체" pitchFamily="49" charset="-127"/>
+                <a:ea typeface="굴림체" pitchFamily="49" charset="-127"/>
+              </a:rPr>
+              <a:t>PC</a:t>
+            </a:r>
+          </a:p>
+          <a:p>
+            <a:pPr marL="0" indent="0">
+              <a:buNone/>
+            </a:pPr>
+            <a:endParaRPr lang="en-US" altLang="ko-KR" sz="1400" dirty="0">
+              <a:latin typeface="굴림체" pitchFamily="49" charset="-127"/>
+              <a:ea typeface="굴림체" pitchFamily="49" charset="-127"/>
+            </a:endParaRPr>
+          </a:p>
+          <a:p>
+            <a:pPr marL="0" indent="0">
+              <a:buNone/>
+            </a:pPr>
+            <a:r>
+              <a:rPr lang="en-US" altLang="ko-KR" sz="1400" b="1" dirty="0" smtClean="0">
+                <a:latin typeface="굴림체" pitchFamily="49" charset="-127"/>
+                <a:ea typeface="굴림체" pitchFamily="49" charset="-127"/>
+              </a:rPr>
+              <a:t>3.2 UI</a:t>
+            </a:r>
+          </a:p>
+          <a:p>
+            <a:pPr marL="0" indent="0">
+              <a:buNone/>
+            </a:pPr>
+            <a:endParaRPr lang="en-US" altLang="ko-KR" sz="1400" b="1" dirty="0">
+              <a:latin typeface="굴림체" pitchFamily="49" charset="-127"/>
+              <a:ea typeface="굴림체" pitchFamily="49" charset="-127"/>
+            </a:endParaRPr>
+          </a:p>
+          <a:p>
+            <a:pPr marL="0" indent="0">
+              <a:buNone/>
+            </a:pPr>
+            <a:r>
+              <a:rPr lang="en-US" altLang="ko-KR" sz="1400" b="1" dirty="0" smtClean="0">
+                <a:latin typeface="굴림체" pitchFamily="49" charset="-127"/>
+                <a:ea typeface="굴림체" pitchFamily="49" charset="-127"/>
+              </a:rPr>
+              <a:t>3.3 </a:t>
+            </a:r>
+            <a:r>
+              <a:rPr lang="ko-KR" altLang="en-US" sz="1400" b="1" dirty="0" smtClean="0">
+                <a:latin typeface="굴림체" pitchFamily="49" charset="-127"/>
+                <a:ea typeface="굴림체" pitchFamily="49" charset="-127"/>
+              </a:rPr>
+              <a:t>플레이방식</a:t>
+            </a:r>
+            <a:endParaRPr lang="en-US" altLang="ko-KR" sz="1400" b="1" dirty="0" smtClean="0">
+              <a:latin typeface="굴림체" pitchFamily="49" charset="-127"/>
+              <a:ea typeface="굴림체" pitchFamily="49" charset="-127"/>
+            </a:endParaRPr>
+          </a:p>
+          <a:p>
+            <a:pPr marL="0" indent="0">
+              <a:buNone/>
+            </a:pPr>
+            <a:r>
+              <a:rPr lang="en-US" altLang="ko-KR" sz="1400" dirty="0">
+                <a:latin typeface="굴림체" pitchFamily="49" charset="-127"/>
+                <a:ea typeface="굴림체" pitchFamily="49" charset="-127"/>
+              </a:rPr>
+              <a:t> </a:t>
+            </a:r>
+            <a:r>
+              <a:rPr lang="en-US" altLang="ko-KR" sz="1400" dirty="0" smtClean="0">
+                <a:latin typeface="굴림체" pitchFamily="49" charset="-127"/>
+                <a:ea typeface="굴림체" pitchFamily="49" charset="-127"/>
+              </a:rPr>
+              <a:t>   3.3.1 </a:t>
+            </a:r>
+            <a:r>
+              <a:rPr lang="ko-KR" altLang="en-US" sz="1400" dirty="0" smtClean="0">
+                <a:latin typeface="굴림체" pitchFamily="49" charset="-127"/>
+                <a:ea typeface="굴림체" pitchFamily="49" charset="-127"/>
+              </a:rPr>
+              <a:t>능력치 종류</a:t>
+            </a:r>
+            <a:endParaRPr lang="en-US" altLang="ko-KR" sz="1400" dirty="0" smtClean="0">
+              <a:latin typeface="굴림체" pitchFamily="49" charset="-127"/>
+              <a:ea typeface="굴림체" pitchFamily="49" charset="-127"/>
+            </a:endParaRPr>
+          </a:p>
+          <a:p>
+            <a:pPr marL="0" indent="0">
+              <a:buNone/>
+            </a:pPr>
+            <a:r>
+              <a:rPr lang="en-US" altLang="ko-KR" sz="1400" dirty="0" smtClean="0">
+                <a:latin typeface="굴림체" pitchFamily="49" charset="-127"/>
+                <a:ea typeface="굴림체" pitchFamily="49" charset="-127"/>
+              </a:rPr>
+              <a:t>	3.3.1 </a:t>
+            </a:r>
+            <a:r>
+              <a:rPr lang="ko-KR" altLang="en-US" sz="1400" dirty="0" smtClean="0">
+                <a:latin typeface="굴림체" pitchFamily="49" charset="-127"/>
+                <a:ea typeface="굴림체" pitchFamily="49" charset="-127"/>
+              </a:rPr>
+              <a:t>능력치 종류</a:t>
+            </a:r>
+            <a:endParaRPr lang="en-US" altLang="ko-KR" sz="1400" dirty="0" smtClean="0">
+              <a:latin typeface="굴림체" pitchFamily="49" charset="-127"/>
+              <a:ea typeface="굴림체" pitchFamily="49" charset="-127"/>
+            </a:endParaRPr>
+          </a:p>
+          <a:p>
+            <a:pPr marL="0" indent="0">
+              <a:buNone/>
+            </a:pPr>
+            <a:r>
+              <a:rPr lang="en-US" altLang="ko-KR" sz="1400" dirty="0" smtClean="0">
+                <a:latin typeface="굴림체" pitchFamily="49" charset="-127"/>
+                <a:ea typeface="굴림체" pitchFamily="49" charset="-127"/>
+              </a:rPr>
+              <a:t>	3.3.2 </a:t>
+            </a:r>
+            <a:r>
+              <a:rPr lang="ko-KR" altLang="en-US" sz="1400" dirty="0" smtClean="0">
+                <a:latin typeface="굴림체" pitchFamily="49" charset="-127"/>
+                <a:ea typeface="굴림체" pitchFamily="49" charset="-127"/>
+              </a:rPr>
+              <a:t>아르바이트 종류</a:t>
+            </a:r>
+            <a:r>
+              <a:rPr lang="en-US" altLang="ko-KR" sz="1400" dirty="0" smtClean="0">
+                <a:latin typeface="굴림체" pitchFamily="49" charset="-127"/>
+                <a:ea typeface="굴림체" pitchFamily="49" charset="-127"/>
+              </a:rPr>
+              <a:t>/</a:t>
+            </a:r>
+            <a:r>
+              <a:rPr lang="ko-KR" altLang="en-US" sz="1400" dirty="0" smtClean="0">
+                <a:latin typeface="굴림체" pitchFamily="49" charset="-127"/>
+                <a:ea typeface="굴림체" pitchFamily="49" charset="-127"/>
+              </a:rPr>
+              <a:t>조건</a:t>
+            </a:r>
+            <a:r>
+              <a:rPr lang="en-US" altLang="ko-KR" sz="1400" dirty="0" smtClean="0">
+                <a:latin typeface="굴림체" pitchFamily="49" charset="-127"/>
+                <a:ea typeface="굴림체" pitchFamily="49" charset="-127"/>
+              </a:rPr>
+              <a:t>/</a:t>
+            </a:r>
+            <a:r>
+              <a:rPr lang="ko-KR" altLang="en-US" sz="1400" dirty="0" smtClean="0">
+                <a:latin typeface="굴림체" pitchFamily="49" charset="-127"/>
+                <a:ea typeface="굴림체" pitchFamily="49" charset="-127"/>
+              </a:rPr>
+              <a:t>수입금</a:t>
+            </a:r>
+            <a:r>
+              <a:rPr lang="en-US" altLang="ko-KR" sz="1400" dirty="0" smtClean="0">
+                <a:latin typeface="굴림체" pitchFamily="49" charset="-127"/>
+                <a:ea typeface="굴림체" pitchFamily="49" charset="-127"/>
+              </a:rPr>
+              <a:t>/</a:t>
+            </a:r>
+            <a:r>
+              <a:rPr lang="ko-KR" altLang="en-US" sz="1400" dirty="0" smtClean="0">
+                <a:latin typeface="굴림체" pitchFamily="49" charset="-127"/>
+                <a:ea typeface="굴림체" pitchFamily="49" charset="-127"/>
+              </a:rPr>
+              <a:t>성공</a:t>
+            </a:r>
+            <a:r>
+              <a:rPr lang="en-US" altLang="ko-KR" sz="1400" dirty="0" smtClean="0">
+                <a:latin typeface="굴림체" pitchFamily="49" charset="-127"/>
+                <a:ea typeface="굴림체" pitchFamily="49" charset="-127"/>
+              </a:rPr>
+              <a:t>,</a:t>
+            </a:r>
+            <a:r>
+              <a:rPr lang="ko-KR" altLang="en-US" sz="1400" dirty="0" smtClean="0">
+                <a:latin typeface="굴림체" pitchFamily="49" charset="-127"/>
+                <a:ea typeface="굴림체" pitchFamily="49" charset="-127"/>
+              </a:rPr>
+              <a:t>실패 확률</a:t>
+            </a:r>
+            <a:endParaRPr lang="en-US" altLang="ko-KR" sz="1400" dirty="0" smtClean="0">
+              <a:latin typeface="굴림체" pitchFamily="49" charset="-127"/>
+              <a:ea typeface="굴림체" pitchFamily="49" charset="-127"/>
+            </a:endParaRPr>
+          </a:p>
+          <a:p>
+            <a:pPr marL="0" indent="0">
+              <a:buNone/>
+            </a:pPr>
+            <a:r>
+              <a:rPr lang="en-US" altLang="ko-KR" sz="1400" dirty="0" smtClean="0">
+                <a:latin typeface="굴림체" pitchFamily="49" charset="-127"/>
+                <a:ea typeface="굴림체" pitchFamily="49" charset="-127"/>
+              </a:rPr>
+              <a:t>	3.3.3 </a:t>
+            </a:r>
+            <a:r>
+              <a:rPr lang="ko-KR" altLang="en-US" sz="1400" dirty="0" err="1" smtClean="0">
+                <a:latin typeface="굴림체" pitchFamily="49" charset="-127"/>
+                <a:ea typeface="굴림체" pitchFamily="49" charset="-127"/>
+              </a:rPr>
+              <a:t>엔딩</a:t>
+            </a:r>
+            <a:r>
+              <a:rPr lang="ko-KR" altLang="en-US" sz="1400" dirty="0" smtClean="0">
+                <a:latin typeface="굴림체" pitchFamily="49" charset="-127"/>
+                <a:ea typeface="굴림체" pitchFamily="49" charset="-127"/>
+              </a:rPr>
+              <a:t> 종류</a:t>
+            </a:r>
+            <a:r>
+              <a:rPr lang="en-US" altLang="ko-KR" sz="1400" dirty="0" smtClean="0">
+                <a:latin typeface="굴림체" pitchFamily="49" charset="-127"/>
+                <a:ea typeface="굴림체" pitchFamily="49" charset="-127"/>
+              </a:rPr>
+              <a:t>/</a:t>
+            </a:r>
+            <a:r>
+              <a:rPr lang="ko-KR" altLang="en-US" sz="1400" dirty="0" smtClean="0">
+                <a:latin typeface="굴림체" pitchFamily="49" charset="-127"/>
+                <a:ea typeface="굴림체" pitchFamily="49" charset="-127"/>
+              </a:rPr>
+              <a:t>조건</a:t>
+            </a:r>
+            <a:endParaRPr lang="en-US" altLang="ko-KR" sz="1400" dirty="0">
               <a:latin typeface="굴림체" pitchFamily="49" charset="-127"/>
               <a:ea typeface="굴림체" pitchFamily="49" charset="-127"/>
             </a:endParaRPr>
@@ -4626,244 +5143,7 @@
             <a:pPr marL="0" indent="0">
               <a:buNone/>
             </a:pPr>
-            <a:r>
-              <a:rPr lang="en-US" altLang="ko-KR" sz="1400" dirty="0" smtClean="0">
-                <a:latin typeface="굴림체" pitchFamily="49" charset="-127"/>
-                <a:ea typeface="굴림체" pitchFamily="49" charset="-127"/>
-              </a:rPr>
-              <a:t>- </a:t>
-            </a:r>
-            <a:r>
-              <a:rPr lang="ko-KR" altLang="en-US" sz="1400" dirty="0" smtClean="0">
-                <a:latin typeface="굴림체" pitchFamily="49" charset="-127"/>
-                <a:ea typeface="굴림체" pitchFamily="49" charset="-127"/>
-              </a:rPr>
-              <a:t>나이</a:t>
-            </a:r>
-            <a:r>
-              <a:rPr lang="en-US" altLang="ko-KR" sz="1400" dirty="0" smtClean="0">
-                <a:latin typeface="굴림체" pitchFamily="49" charset="-127"/>
-                <a:ea typeface="굴림체" pitchFamily="49" charset="-127"/>
-              </a:rPr>
-              <a:t>:</a:t>
-            </a:r>
-            <a:r>
-              <a:rPr lang="ko-KR" altLang="en-US" sz="1400" dirty="0" smtClean="0">
-                <a:latin typeface="굴림체" pitchFamily="49" charset="-127"/>
-                <a:ea typeface="굴림체" pitchFamily="49" charset="-127"/>
-              </a:rPr>
-              <a:t> </a:t>
-            </a:r>
-            <a:r>
-              <a:rPr lang="en-US" altLang="ko-KR" sz="1400" dirty="0" smtClean="0">
-                <a:latin typeface="굴림체" pitchFamily="49" charset="-127"/>
-                <a:ea typeface="굴림체" pitchFamily="49" charset="-127"/>
-              </a:rPr>
-              <a:t>12</a:t>
-            </a:r>
-            <a:r>
-              <a:rPr lang="ko-KR" altLang="en-US" sz="1400" dirty="0" smtClean="0">
-                <a:latin typeface="굴림체" pitchFamily="49" charset="-127"/>
-                <a:ea typeface="굴림체" pitchFamily="49" charset="-127"/>
-              </a:rPr>
-              <a:t>살</a:t>
-            </a:r>
-            <a:r>
-              <a:rPr lang="en-US" altLang="ko-KR" sz="1400" dirty="0" smtClean="0">
-                <a:latin typeface="굴림체" pitchFamily="49" charset="-127"/>
-                <a:ea typeface="굴림체" pitchFamily="49" charset="-127"/>
-              </a:rPr>
-              <a:t>(</a:t>
-            </a:r>
-            <a:r>
-              <a:rPr lang="ko-KR" altLang="en-US" sz="1400" dirty="0" smtClean="0">
-                <a:latin typeface="굴림체" pitchFamily="49" charset="-127"/>
-                <a:ea typeface="굴림체" pitchFamily="49" charset="-127"/>
-              </a:rPr>
-              <a:t>시작 나이</a:t>
-            </a:r>
-            <a:r>
-              <a:rPr lang="en-US" altLang="ko-KR" sz="1400" dirty="0" smtClean="0">
-                <a:latin typeface="굴림체" pitchFamily="49" charset="-127"/>
-                <a:ea typeface="굴림체" pitchFamily="49" charset="-127"/>
-              </a:rPr>
-              <a:t>)~20</a:t>
-            </a:r>
-            <a:r>
-              <a:rPr lang="ko-KR" altLang="en-US" sz="1400" dirty="0" smtClean="0">
-                <a:latin typeface="굴림체" pitchFamily="49" charset="-127"/>
-                <a:ea typeface="굴림체" pitchFamily="49" charset="-127"/>
-              </a:rPr>
-              <a:t>상</a:t>
-            </a:r>
-            <a:r>
-              <a:rPr lang="en-US" altLang="ko-KR" sz="1400" dirty="0" smtClean="0">
-                <a:latin typeface="굴림체" pitchFamily="49" charset="-127"/>
-                <a:ea typeface="굴림체" pitchFamily="49" charset="-127"/>
-              </a:rPr>
-              <a:t>(</a:t>
-            </a:r>
-            <a:r>
-              <a:rPr lang="ko-KR" altLang="en-US" sz="1400" dirty="0" smtClean="0">
-                <a:latin typeface="굴림체" pitchFamily="49" charset="-127"/>
-                <a:ea typeface="굴림체" pitchFamily="49" charset="-127"/>
-              </a:rPr>
-              <a:t>끝나는 나이</a:t>
-            </a:r>
-            <a:r>
-              <a:rPr lang="en-US" altLang="ko-KR" sz="1400" dirty="0" smtClean="0">
-                <a:latin typeface="굴림체" pitchFamily="49" charset="-127"/>
-                <a:ea typeface="굴림체" pitchFamily="49" charset="-127"/>
-              </a:rPr>
-              <a:t>)</a:t>
-            </a:r>
-          </a:p>
-          <a:p>
-            <a:pPr marL="0" indent="0">
-              <a:buNone/>
-            </a:pPr>
-            <a:endParaRPr lang="en-US" altLang="ko-KR" sz="1400" dirty="0" smtClean="0">
-              <a:latin typeface="굴림체" pitchFamily="49" charset="-127"/>
-              <a:ea typeface="굴림체" pitchFamily="49" charset="-127"/>
-            </a:endParaRPr>
-          </a:p>
-          <a:p>
-            <a:pPr marL="0" indent="0">
-              <a:buNone/>
-            </a:pPr>
-            <a:r>
-              <a:rPr lang="en-US" altLang="ko-KR" sz="1400" dirty="0" smtClean="0">
-                <a:latin typeface="굴림체" pitchFamily="49" charset="-127"/>
-                <a:ea typeface="굴림체" pitchFamily="49" charset="-127"/>
-              </a:rPr>
-              <a:t>- </a:t>
-            </a:r>
-            <a:r>
-              <a:rPr lang="ko-KR" altLang="en-US" sz="1400" dirty="0" smtClean="0">
-                <a:latin typeface="굴림체" pitchFamily="49" charset="-127"/>
-                <a:ea typeface="굴림체" pitchFamily="49" charset="-127"/>
-              </a:rPr>
-              <a:t>외적 설정</a:t>
-            </a:r>
-            <a:r>
-              <a:rPr lang="en-US" altLang="ko-KR" sz="1400" dirty="0" smtClean="0">
-                <a:latin typeface="굴림체" pitchFamily="49" charset="-127"/>
-                <a:ea typeface="굴림체" pitchFamily="49" charset="-127"/>
-              </a:rPr>
-              <a:t>: </a:t>
-            </a:r>
-            <a:r>
-              <a:rPr lang="ko-KR" altLang="en-US" sz="1400" dirty="0" smtClean="0">
-                <a:latin typeface="굴림체" pitchFamily="49" charset="-127"/>
-                <a:ea typeface="굴림체" pitchFamily="49" charset="-127"/>
-              </a:rPr>
-              <a:t>카라마츠</a:t>
-            </a:r>
-            <a:endParaRPr lang="en-US" altLang="ko-KR" sz="1400" dirty="0">
-              <a:latin typeface="굴림체" pitchFamily="49" charset="-127"/>
-              <a:ea typeface="굴림체" pitchFamily="49" charset="-127"/>
-            </a:endParaRPr>
-          </a:p>
-          <a:p>
-            <a:pPr marL="0" indent="0">
-              <a:buNone/>
-            </a:pPr>
-            <a:r>
-              <a:rPr lang="en-US" altLang="ko-KR" sz="1400" dirty="0" smtClean="0">
-                <a:latin typeface="굴림체" pitchFamily="49" charset="-127"/>
-                <a:ea typeface="굴림체" pitchFamily="49" charset="-127"/>
-              </a:rPr>
-              <a:t>	 </a:t>
-            </a:r>
-            <a:r>
-              <a:rPr lang="ko-KR" altLang="en-US" sz="1400" dirty="0" smtClean="0">
-                <a:latin typeface="굴림체" pitchFamily="49" charset="-127"/>
-                <a:ea typeface="굴림체" pitchFamily="49" charset="-127"/>
-              </a:rPr>
-              <a:t>후드 티를 입고 있다</a:t>
-            </a:r>
-            <a:r>
-              <a:rPr lang="en-US" altLang="ko-KR" sz="1400" dirty="0" smtClean="0">
-                <a:latin typeface="굴림체" pitchFamily="49" charset="-127"/>
-                <a:ea typeface="굴림체" pitchFamily="49" charset="-127"/>
-              </a:rPr>
-              <a:t>.</a:t>
-            </a:r>
-          </a:p>
-          <a:p>
-            <a:pPr marL="0" indent="0">
-              <a:buNone/>
-            </a:pPr>
-            <a:endParaRPr lang="en-US" altLang="ko-KR" sz="1400" dirty="0" smtClean="0">
-              <a:latin typeface="굴림체" pitchFamily="49" charset="-127"/>
-              <a:ea typeface="굴림체" pitchFamily="49" charset="-127"/>
-            </a:endParaRPr>
-          </a:p>
-          <a:p>
-            <a:pPr marL="0" indent="0">
-              <a:buNone/>
-            </a:pPr>
-            <a:r>
-              <a:rPr lang="en-US" altLang="ko-KR" sz="1400" dirty="0" smtClean="0">
-                <a:latin typeface="굴림체" pitchFamily="49" charset="-127"/>
-                <a:ea typeface="굴림체" pitchFamily="49" charset="-127"/>
-              </a:rPr>
-              <a:t>- </a:t>
-            </a:r>
-            <a:r>
-              <a:rPr lang="ko-KR" altLang="en-US" sz="1400" dirty="0" smtClean="0">
-                <a:latin typeface="굴림체" pitchFamily="49" charset="-127"/>
-                <a:ea typeface="굴림체" pitchFamily="49" charset="-127"/>
-              </a:rPr>
-              <a:t>내적 설정</a:t>
-            </a:r>
-            <a:r>
-              <a:rPr lang="en-US" altLang="ko-KR" sz="1400" dirty="0" smtClean="0">
-                <a:latin typeface="굴림체" pitchFamily="49" charset="-127"/>
-                <a:ea typeface="굴림체" pitchFamily="49" charset="-127"/>
-              </a:rPr>
-              <a:t>: </a:t>
-            </a:r>
-            <a:r>
-              <a:rPr lang="ko-KR" altLang="en-US" sz="1400" dirty="0" smtClean="0">
-                <a:latin typeface="굴림체" pitchFamily="49" charset="-127"/>
-                <a:ea typeface="굴림체" pitchFamily="49" charset="-127"/>
-              </a:rPr>
-              <a:t>카라마츠</a:t>
-            </a:r>
-            <a:endParaRPr lang="en-US" altLang="ko-KR" sz="1400" dirty="0" smtClean="0">
-              <a:latin typeface="굴림체" pitchFamily="49" charset="-127"/>
-              <a:ea typeface="굴림체" pitchFamily="49" charset="-127"/>
-            </a:endParaRPr>
-          </a:p>
-          <a:p>
-            <a:pPr marL="0" indent="0">
-              <a:buNone/>
-            </a:pPr>
-            <a:endParaRPr lang="en-US" altLang="ko-KR" sz="1400" dirty="0" smtClean="0">
-              <a:latin typeface="굴림체" pitchFamily="49" charset="-127"/>
-              <a:ea typeface="굴림체" pitchFamily="49" charset="-127"/>
-            </a:endParaRPr>
-          </a:p>
-          <a:p>
-            <a:pPr marL="0" indent="0">
-              <a:buNone/>
-            </a:pPr>
-            <a:r>
-              <a:rPr lang="en-US" altLang="ko-KR" sz="1400" dirty="0" smtClean="0">
-                <a:latin typeface="굴림체" pitchFamily="49" charset="-127"/>
-                <a:ea typeface="굴림체" pitchFamily="49" charset="-127"/>
-              </a:rPr>
-              <a:t>※</a:t>
-            </a:r>
-            <a:r>
-              <a:rPr lang="ko-KR" altLang="en-US" sz="1400" dirty="0" smtClean="0">
-                <a:latin typeface="굴림체" pitchFamily="49" charset="-127"/>
-                <a:ea typeface="굴림체" pitchFamily="49" charset="-127"/>
-              </a:rPr>
-              <a:t>인선이에게 참고</a:t>
-            </a:r>
-            <a:endParaRPr lang="en-US" altLang="ko-KR" sz="1400" dirty="0">
+            <a:endParaRPr lang="en-US" altLang="ko-KR" sz="1600" dirty="0" smtClean="0">
               <a:latin typeface="굴림체" pitchFamily="49" charset="-127"/>
               <a:ea typeface="굴림체" pitchFamily="49" charset="-127"/>
             </a:endParaRPr>
@@ -4960,14 +5240,14 @@
                 <a:latin typeface="굴림체" pitchFamily="49" charset="-127"/>
                 <a:ea typeface="굴림체" pitchFamily="49" charset="-127"/>
               </a:rPr>
-              <a:t>3. </a:t>
+              <a:t>4. </a:t>
             </a:r>
             <a:r>
               <a:rPr lang="ko-KR" altLang="en-US" sz="2000" dirty="0" smtClean="0">
                 <a:latin typeface="굴림체" pitchFamily="49" charset="-127"/>
                 <a:ea typeface="굴림체" pitchFamily="49" charset="-127"/>
               </a:rPr>
-              <a:t>게임 시스템</a:t>
+              <a:t>아이템 및 장비</a:t>
             </a:r>
             <a:endParaRPr lang="en-US" altLang="ko-KR" sz="2000" dirty="0" smtClean="0">
               <a:latin typeface="굴림체" pitchFamily="49" charset="-127"/>
@@ -4975,279 +5255,8 @@
             </a:endParaRPr>
           </a:p>
           <a:p>
-            <a:pPr marL="0" indent="0">
-              <a:buNone/>
-            </a:pPr>
-            <a:endParaRPr lang="en-US" altLang="ko-KR" sz="1600" dirty="0" smtClean="0">
-              <a:latin typeface="굴림체" pitchFamily="49" charset="-127"/>
-              <a:ea typeface="굴림체" pitchFamily="49" charset="-127"/>
-            </a:endParaRPr>
-          </a:p>
-          <a:p>
-            <a:pPr marL="0" indent="0">
-              <a:buNone/>
-            </a:pPr>
-            <a:r>
-              <a:rPr lang="en-US" altLang="ko-KR" sz="1400" b="1" dirty="0" smtClean="0">
-                <a:latin typeface="굴림체" pitchFamily="49" charset="-127"/>
-                <a:ea typeface="굴림체" pitchFamily="49" charset="-127"/>
-              </a:rPr>
-              <a:t>3.1 </a:t>
-            </a:r>
-            <a:r>
-              <a:rPr lang="ko-KR" altLang="en-US" sz="1400" b="1" dirty="0" smtClean="0">
-                <a:latin typeface="굴림체" pitchFamily="49" charset="-127"/>
-                <a:ea typeface="굴림체" pitchFamily="49" charset="-127"/>
-              </a:rPr>
-              <a:t>플랫폼</a:t>
-            </a:r>
-            <a:r>
-              <a:rPr lang="en-US" altLang="ko-KR" sz="1400" b="1" dirty="0" smtClean="0">
-                <a:latin typeface="굴림체" pitchFamily="49" charset="-127"/>
-                <a:ea typeface="굴림체" pitchFamily="49" charset="-127"/>
-              </a:rPr>
-              <a:t>: </a:t>
-            </a:r>
-            <a:r>
-              <a:rPr lang="en-US" altLang="ko-KR" sz="1400" dirty="0" smtClean="0">
-                <a:latin typeface="굴림체" pitchFamily="49" charset="-127"/>
-                <a:ea typeface="굴림체" pitchFamily="49" charset="-127"/>
-              </a:rPr>
-              <a:t>PC</a:t>
-            </a:r>
-          </a:p>
-          <a:p>
-            <a:pPr marL="0" indent="0">
-              <a:buNone/>
-            </a:pPr>
-            <a:endParaRPr lang="en-US" altLang="ko-KR" sz="1400" dirty="0">
-              <a:latin typeface="굴림체" pitchFamily="49" charset="-127"/>
-              <a:ea typeface="굴림체" pitchFamily="49" charset="-127"/>
-            </a:endParaRPr>
-          </a:p>
-          <a:p>
-            <a:pPr marL="0" indent="0">
-              <a:buNone/>
-            </a:pPr>
-            <a:r>
-              <a:rPr lang="en-US" altLang="ko-KR" sz="1400" b="1" dirty="0" smtClean="0">
-                <a:latin typeface="굴림체" pitchFamily="49" charset="-127"/>
-                <a:ea typeface="굴림체" pitchFamily="49" charset="-127"/>
-              </a:rPr>
-              <a:t>3.2 UI</a:t>
-            </a:r>
-          </a:p>
-          <a:p>
-            <a:pPr marL="0" indent="0">
-              <a:buNone/>
-            </a:pPr>
-            <a:endParaRPr lang="en-US" altLang="ko-KR" sz="1400" b="1" dirty="0">
-              <a:latin typeface="굴림체" pitchFamily="49" charset="-127"/>
-              <a:ea typeface="굴림체" pitchFamily="49" charset="-127"/>
-            </a:endParaRPr>
-          </a:p>
-          <a:p>
-            <a:pPr marL="0" indent="0">
-              <a:buNone/>
-            </a:pPr>
-            <a:r>
-              <a:rPr lang="en-US" altLang="ko-KR" sz="1400" b="1" dirty="0" smtClean="0">
-                <a:latin typeface="굴림체" pitchFamily="49" charset="-127"/>
-                <a:ea typeface="굴림체" pitchFamily="49" charset="-127"/>
-              </a:rPr>
-              <a:t>3.3 </a:t>
-            </a:r>
-            <a:r>
-              <a:rPr lang="ko-KR" altLang="en-US" sz="1400" b="1" dirty="0" smtClean="0">
-                <a:latin typeface="굴림체" pitchFamily="49" charset="-127"/>
-                <a:ea typeface="굴림체" pitchFamily="49" charset="-127"/>
-              </a:rPr>
-              <a:t>플레이방식</a:t>
-            </a:r>
-            <a:endParaRPr lang="en-US" altLang="ko-KR" sz="1400" b="1" dirty="0" smtClean="0">
-              <a:latin typeface="굴림체" pitchFamily="49" charset="-127"/>
-              <a:ea typeface="굴림체" pitchFamily="49" charset="-127"/>
-            </a:endParaRPr>
-          </a:p>
-          <a:p>
-            <a:pPr marL="0" indent="0">
-              <a:buNone/>
-            </a:pPr>
-            <a:r>
-              <a:rPr lang="en-US" altLang="ko-KR" sz="1400" dirty="0">
-                <a:latin typeface="굴림체" pitchFamily="49" charset="-127"/>
-                <a:ea typeface="굴림체" pitchFamily="49" charset="-127"/>
-              </a:rPr>
-              <a:t> </a:t>
-            </a:r>
-            <a:r>
-              <a:rPr lang="en-US" altLang="ko-KR" sz="1400" dirty="0" smtClean="0">
-                <a:latin typeface="굴림체" pitchFamily="49" charset="-127"/>
-                <a:ea typeface="굴림체" pitchFamily="49" charset="-127"/>
-              </a:rPr>
-              <a:t>   3.3.1 </a:t>
-            </a:r>
-            <a:r>
-              <a:rPr lang="ko-KR" altLang="en-US" sz="1400" dirty="0" smtClean="0">
-                <a:latin typeface="굴림체" pitchFamily="49" charset="-127"/>
-                <a:ea typeface="굴림체" pitchFamily="49" charset="-127"/>
-              </a:rPr>
-              <a:t>능력치 종류</a:t>
-            </a:r>
-            <a:endParaRPr lang="en-US" altLang="ko-KR" sz="1400" dirty="0" smtClean="0">
-              <a:latin typeface="굴림체" pitchFamily="49" charset="-127"/>
-              <a:ea typeface="굴림체" pitchFamily="49" charset="-127"/>
-            </a:endParaRPr>
-          </a:p>
-          <a:p>
-            <a:pPr marL="0" indent="0">
-              <a:buNone/>
-            </a:pPr>
-            <a:r>
-              <a:rPr lang="en-US" altLang="ko-KR" sz="1400" dirty="0" smtClean="0">
-                <a:latin typeface="굴림체" pitchFamily="49" charset="-127"/>
-                <a:ea typeface="굴림체" pitchFamily="49" charset="-127"/>
-              </a:rPr>
-              <a:t>	3.3.1 </a:t>
-            </a:r>
-            <a:r>
-              <a:rPr lang="ko-KR" altLang="en-US" sz="1400" dirty="0" smtClean="0">
-                <a:latin typeface="굴림체" pitchFamily="49" charset="-127"/>
-                <a:ea typeface="굴림체" pitchFamily="49" charset="-127"/>
-              </a:rPr>
-              <a:t>능력치 종류</a:t>
-            </a:r>
-            <a:endParaRPr lang="en-US" altLang="ko-KR" sz="1400" dirty="0" smtClean="0">
-              <a:latin typeface="굴림체" pitchFamily="49" charset="-127"/>
-              <a:ea typeface="굴림체" pitchFamily="49" charset="-127"/>
-            </a:endParaRPr>
-          </a:p>
-          <a:p>
-            <a:pPr marL="0" indent="0">
-              <a:buNone/>
-            </a:pPr>
-            <a:r>
-              <a:rPr lang="en-US" altLang="ko-KR" sz="1400" dirty="0" smtClean="0">
-                <a:latin typeface="굴림체" pitchFamily="49" charset="-127"/>
-                <a:ea typeface="굴림체" pitchFamily="49" charset="-127"/>
-              </a:rPr>
-              <a:t>	3.3.2 </a:t>
-            </a:r>
-            <a:r>
-              <a:rPr lang="ko-KR" altLang="en-US" sz="1400" dirty="0" smtClean="0">
-                <a:latin typeface="굴림체" pitchFamily="49" charset="-127"/>
-                <a:ea typeface="굴림체" pitchFamily="49" charset="-127"/>
-              </a:rPr>
-              <a:t>아르바이트 종류</a:t>
-            </a:r>
-            <a:r>
-              <a:rPr lang="en-US" altLang="ko-KR" sz="1400" dirty="0" smtClean="0">
-                <a:latin typeface="굴림체" pitchFamily="49" charset="-127"/>
-                <a:ea typeface="굴림체" pitchFamily="49" charset="-127"/>
-              </a:rPr>
-              <a:t>/</a:t>
-            </a:r>
-            <a:r>
-              <a:rPr lang="ko-KR" altLang="en-US" sz="1400" dirty="0" smtClean="0">
-                <a:latin typeface="굴림체" pitchFamily="49" charset="-127"/>
-                <a:ea typeface="굴림체" pitchFamily="49" charset="-127"/>
-              </a:rPr>
-              <a:t>조건</a:t>
-            </a:r>
-            <a:r>
-              <a:rPr lang="en-US" altLang="ko-KR" sz="1400" dirty="0" smtClean="0">
-                <a:latin typeface="굴림체" pitchFamily="49" charset="-127"/>
-                <a:ea typeface="굴림체" pitchFamily="49" charset="-127"/>
-              </a:rPr>
-              <a:t>/</a:t>
-            </a:r>
-            <a:r>
-              <a:rPr lang="ko-KR" altLang="en-US" sz="1400" dirty="0" smtClean="0">
-                <a:latin typeface="굴림체" pitchFamily="49" charset="-127"/>
-                <a:ea typeface="굴림체" pitchFamily="49" charset="-127"/>
-              </a:rPr>
-              <a:t>수입금</a:t>
-            </a:r>
-            <a:r>
-              <a:rPr lang="en-US" altLang="ko-KR" sz="1400" dirty="0" smtClean="0">
-                <a:latin typeface="굴림체" pitchFamily="49" charset="-127"/>
-                <a:ea typeface="굴림체" pitchFamily="49" charset="-127"/>
-              </a:rPr>
-              <a:t>/</a:t>
-            </a:r>
-            <a:r>
-              <a:rPr lang="ko-KR" altLang="en-US" sz="1400" dirty="0" smtClean="0">
-                <a:latin typeface="굴림체" pitchFamily="49" charset="-127"/>
-                <a:ea typeface="굴림체" pitchFamily="49" charset="-127"/>
-              </a:rPr>
-              <a:t>성공</a:t>
-            </a:r>
-            <a:r>
-              <a:rPr lang="en-US" altLang="ko-KR" sz="1400" dirty="0" smtClean="0">
-                <a:latin typeface="굴림체" pitchFamily="49" charset="-127"/>
-                <a:ea typeface="굴림체" pitchFamily="49" charset="-127"/>
-              </a:rPr>
-              <a:t>,</a:t>
-            </a:r>
-            <a:r>
-              <a:rPr lang="ko-KR" altLang="en-US" sz="1400" dirty="0" smtClean="0">
-                <a:latin typeface="굴림체" pitchFamily="49" charset="-127"/>
-                <a:ea typeface="굴림체" pitchFamily="49" charset="-127"/>
-              </a:rPr>
-              <a:t>실패 확률</a:t>
-            </a:r>
-            <a:endParaRPr lang="en-US" altLang="ko-KR" sz="1400" dirty="0" smtClean="0">
-              <a:latin typeface="굴림체" pitchFamily="49" charset="-127"/>
-              <a:ea typeface="굴림체" pitchFamily="49" charset="-127"/>
-            </a:endParaRPr>
-          </a:p>
-          <a:p>
-            <a:pPr marL="0" indent="0">
-              <a:buNone/>
-            </a:pPr>
-            <a:r>
-              <a:rPr lang="en-US" altLang="ko-KR" sz="1400" dirty="0" smtClean="0">
-                <a:latin typeface="굴림체" pitchFamily="49" charset="-127"/>
-                <a:ea typeface="굴림체" pitchFamily="49" charset="-127"/>
-              </a:rPr>
-              <a:t>	3.3.3 </a:t>
-            </a:r>
-            <a:r>
-              <a:rPr lang="ko-KR" altLang="en-US" sz="1400" dirty="0" err="1" smtClean="0">
-                <a:latin typeface="굴림체" pitchFamily="49" charset="-127"/>
-                <a:ea typeface="굴림체" pitchFamily="49" charset="-127"/>
-              </a:rPr>
-              <a:t>엔딩</a:t>
-            </a:r>
-            <a:r>
-              <a:rPr lang="ko-KR" altLang="en-US" sz="1400" dirty="0" smtClean="0">
-                <a:latin typeface="굴림체" pitchFamily="49" charset="-127"/>
-                <a:ea typeface="굴림체" pitchFamily="49" charset="-127"/>
-              </a:rPr>
-              <a:t> 종류</a:t>
-            </a:r>
-            <a:r>
-              <a:rPr lang="en-US" altLang="ko-KR" sz="1400" dirty="0" smtClean="0">
-                <a:latin typeface="굴림체" pitchFamily="49" charset="-127"/>
-                <a:ea typeface="굴림체" pitchFamily="49" charset="-127"/>
-              </a:rPr>
-              <a:t>/</a:t>
-            </a:r>
-            <a:r>
-              <a:rPr lang="ko-KR" altLang="en-US" sz="1400" dirty="0" smtClean="0">
-                <a:latin typeface="굴림체" pitchFamily="49" charset="-127"/>
-                <a:ea typeface="굴림체" pitchFamily="49" charset="-127"/>
-              </a:rPr>
-              <a:t>조건</a:t>
-            </a:r>
-            <a:endParaRPr lang="en-US" altLang="ko-KR" sz="1400" dirty="0">
-              <a:latin typeface="굴림체" pitchFamily="49" charset="-127"/>
-              <a:ea typeface="굴림체" pitchFamily="49" charset="-127"/>
-            </a:endParaRPr>
-          </a:p>
-          <a:p>
-            <a:pPr marL="0" indent="0">
-              <a:buNone/>
+            <a:pPr marL="457200" indent="-457200">
+              <a:buAutoNum type="arabicPeriod"/>
             </a:pPr>
             <a:endParaRPr lang="en-US" altLang="ko-KR" sz="1400" dirty="0" smtClean="0">
               <a:latin typeface="굴림체" pitchFamily="49" charset="-127"/>
@@ -5258,7 +5267,7 @@
             <a:pPr marL="0" indent="0">
               <a:buNone/>
             </a:pPr>
-            <a:endParaRPr lang="en-US" altLang="ko-KR" sz="1600" dirty="0" smtClean="0">
+            <a:endParaRPr lang="en-US" altLang="ko-KR" sz="1400" dirty="0" smtClean="0">
               <a:latin typeface="굴림체" pitchFamily="49" charset="-127"/>
               <a:ea typeface="굴림체" pitchFamily="49" charset="-127"/>
             </a:endParaRPr>
@@ -5355,14 +5364,14 @@
                 <a:latin typeface="굴림체" pitchFamily="49" charset="-127"/>
                 <a:ea typeface="굴림체" pitchFamily="49" charset="-127"/>
               </a:rPr>
-              <a:t>4. </a:t>
+              <a:t>5. </a:t>
             </a:r>
             <a:r>
               <a:rPr lang="ko-KR" altLang="en-US" sz="2000" dirty="0" smtClean="0">
                 <a:latin typeface="굴림체" pitchFamily="49" charset="-127"/>
                 <a:ea typeface="굴림체" pitchFamily="49" charset="-127"/>
               </a:rPr>
-              <a:t>아이템 및 장비</a:t>
+              <a:t>본 게임의 주요 시스템</a:t>
             </a:r>
             <a:endParaRPr lang="en-US" altLang="ko-KR" sz="2000" dirty="0" smtClean="0">
               <a:latin typeface="굴림체" pitchFamily="49" charset="-127"/>
@@ -5382,7 +5391,91 @@
             <a:pPr marL="0" indent="0">
               <a:buNone/>
             </a:pPr>
+            <a:r>
+              <a:rPr lang="ko-KR" altLang="en-US" sz="1400" dirty="0" err="1" smtClean="0">
+                <a:latin typeface="굴림체" pitchFamily="49" charset="-127"/>
+                <a:ea typeface="굴림체" pitchFamily="49" charset="-127"/>
+              </a:rPr>
+              <a:t>카라마치의</a:t>
+            </a:r>
+            <a:r>
+              <a:rPr lang="ko-KR" altLang="en-US" sz="1400" dirty="0" smtClean="0">
+                <a:latin typeface="굴림체" pitchFamily="49" charset="-127"/>
+                <a:ea typeface="굴림체" pitchFamily="49" charset="-127"/>
+              </a:rPr>
+              <a:t> 한마디로 이따이해진 사신이치마츠가 카라마츠를 죽여버렸다</a:t>
+            </a:r>
+            <a:r>
+              <a:rPr lang="en-US" altLang="ko-KR" sz="1400" dirty="0" smtClean="0">
+                <a:latin typeface="굴림체" pitchFamily="49" charset="-127"/>
+                <a:ea typeface="굴림체" pitchFamily="49" charset="-127"/>
+              </a:rPr>
+              <a:t>.</a:t>
+            </a:r>
+          </a:p>
+          <a:p>
+            <a:pPr marL="0" indent="0">
+              <a:buNone/>
+            </a:pPr>
+            <a:r>
+              <a:rPr lang="ko-KR" altLang="en-US" sz="1400" dirty="0" smtClean="0">
+                <a:latin typeface="굴림체" pitchFamily="49" charset="-127"/>
+                <a:ea typeface="굴림체" pitchFamily="49" charset="-127"/>
+              </a:rPr>
+              <a:t>그걸 본 여신쵸로마츠는 그런 카라마츠를 불쌍히 여겨 인간아기로 되살려 플레이어에게 맡긴다</a:t>
+            </a:r>
+            <a:r>
+              <a:rPr lang="en-US" altLang="ko-KR" sz="1400" dirty="0" smtClean="0">
+                <a:latin typeface="굴림체" pitchFamily="49" charset="-127"/>
+                <a:ea typeface="굴림체" pitchFamily="49" charset="-127"/>
+              </a:rPr>
+              <a:t>.</a:t>
+            </a:r>
+          </a:p>
+          <a:p>
+            <a:pPr marL="0" indent="0">
+              <a:buNone/>
+            </a:pPr>
+            <a:r>
+              <a:rPr lang="ko-KR" altLang="en-US" sz="1400" dirty="0" smtClean="0">
+                <a:latin typeface="굴림체" pitchFamily="49" charset="-127"/>
+                <a:ea typeface="굴림체" pitchFamily="49" charset="-127"/>
+              </a:rPr>
+              <a:t>여신쵸로마츠는 카라마츠가 참된 인간으로 자라게 하기 위해 플레이어 집의 집사가 되기로 한다</a:t>
+            </a:r>
+            <a:r>
+              <a:rPr lang="en-US" altLang="ko-KR" sz="1400" dirty="0" smtClean="0">
+                <a:latin typeface="굴림체" pitchFamily="49" charset="-127"/>
+                <a:ea typeface="굴림체" pitchFamily="49" charset="-127"/>
+              </a:rPr>
+              <a:t>.</a:t>
+            </a:r>
+            <a:r>
+              <a:rPr lang="ko-KR" altLang="en-US" sz="1400" dirty="0" smtClean="0">
+                <a:latin typeface="굴림체" pitchFamily="49" charset="-127"/>
+                <a:ea typeface="굴림체" pitchFamily="49" charset="-127"/>
+              </a:rPr>
+              <a:t>  </a:t>
+            </a:r>
+            <a:endParaRPr lang="en-US" altLang="ko-KR" sz="1400" dirty="0">
+              <a:latin typeface="굴림체" pitchFamily="49" charset="-127"/>
+              <a:ea typeface="굴림체" pitchFamily="49" charset="-127"/>
+            </a:endParaRPr>
+          </a:p>
+          <a:p>
+            <a:pPr marL="457200" indent="-457200">
+              <a:buAutoNum type="arabicPeriod"/>
+            </a:pPr>
             <a:endParaRPr lang="en-US" altLang="ko-KR" sz="1400" dirty="0" smtClean="0">
+              <a:latin typeface="굴림체" pitchFamily="49" charset="-127"/>
+              <a:ea typeface="굴림체" pitchFamily="49" charset="-127"/>
+            </a:endParaRPr>
+          </a:p>
+          <a:p>
+            <a:pPr marL="0" indent="0">
+              <a:buNone/>
+            </a:pPr>
+            <a:endParaRPr lang="en-US" altLang="ko-KR" sz="1600" dirty="0" smtClean="0">
               <a:latin typeface="굴림체" pitchFamily="49" charset="-127"/>
               <a:ea typeface="굴림체" pitchFamily="49" charset="-127"/>
             </a:endParaRPr>
@@ -5479,16 +5572,100 @@
                 <a:latin typeface="굴림체" pitchFamily="49" charset="-127"/>
                 <a:ea typeface="굴림체" pitchFamily="49" charset="-127"/>
               </a:rPr>
-              <a:t>5. </a:t>
+              <a:t>6. </a:t>
             </a:r>
             <a:r>
               <a:rPr lang="ko-KR" altLang="en-US" sz="2000" dirty="0" smtClean="0">
                 <a:latin typeface="굴림체" pitchFamily="49" charset="-127"/>
                 <a:ea typeface="굴림체" pitchFamily="49" charset="-127"/>
               </a:rPr>
-              <a:t>본 게임의 주요 시스템</a:t>
+              <a:t>유료화 모델</a:t>
             </a:r>
             <a:endParaRPr lang="en-US" altLang="ko-KR" sz="2000" dirty="0" smtClean="0">
+              <a:latin typeface="굴림체" pitchFamily="49" charset="-127"/>
+              <a:ea typeface="굴림체" pitchFamily="49" charset="-127"/>
+            </a:endParaRPr>
+          </a:p>
+          <a:p>
+            <a:pPr marL="0" indent="0">
+              <a:buNone/>
+            </a:pPr>
+            <a:endParaRPr lang="en-US" altLang="ko-KR" sz="1400" dirty="0" smtClean="0">
+              <a:latin typeface="굴림체" pitchFamily="49" charset="-127"/>
+              <a:ea typeface="굴림체" pitchFamily="49" charset="-127"/>
+            </a:endParaRPr>
+          </a:p>
+          <a:p>
+            <a:pPr marL="0" indent="0">
+              <a:buNone/>
+            </a:pPr>
+            <a:r>
+              <a:rPr lang="ko-KR" altLang="en-US" sz="1400" dirty="0" err="1" smtClean="0">
+                <a:latin typeface="굴림체" pitchFamily="49" charset="-127"/>
+                <a:ea typeface="굴림체" pitchFamily="49" charset="-127"/>
+              </a:rPr>
+              <a:t>카라마치의</a:t>
+            </a:r>
+            <a:r>
+              <a:rPr lang="ko-KR" altLang="en-US" sz="1400" dirty="0" smtClean="0">
+                <a:latin typeface="굴림체" pitchFamily="49" charset="-127"/>
+                <a:ea typeface="굴림체" pitchFamily="49" charset="-127"/>
+              </a:rPr>
+              <a:t> 한마디로 이따이해진 사신이치마츠가 카라마츠를 죽여버렸다</a:t>
+            </a:r>
+            <a:r>
+              <a:rPr lang="en-US" altLang="ko-KR" sz="1400" dirty="0" smtClean="0">
+                <a:latin typeface="굴림체" pitchFamily="49" charset="-127"/>
+                <a:ea typeface="굴림체" pitchFamily="49" charset="-127"/>
+              </a:rPr>
+              <a:t>.</a:t>
+            </a:r>
+          </a:p>
+          <a:p>
+            <a:pPr marL="0" indent="0">
+              <a:buNone/>
+            </a:pPr>
+            <a:r>
+              <a:rPr lang="ko-KR" altLang="en-US" sz="1400" dirty="0" smtClean="0">
+                <a:latin typeface="굴림체" pitchFamily="49" charset="-127"/>
+                <a:ea typeface="굴림체" pitchFamily="49" charset="-127"/>
+              </a:rPr>
+              <a:t>그걸 본 여신쵸로마츠는 그런 카라마츠를 불쌍히 여겨 인간아기로 되살려 플레이어에게 맡긴다</a:t>
+            </a:r>
+            <a:r>
+              <a:rPr lang="en-US" altLang="ko-KR" sz="1400" dirty="0" smtClean="0">
+                <a:latin typeface="굴림체" pitchFamily="49" charset="-127"/>
+                <a:ea typeface="굴림체" pitchFamily="49" charset="-127"/>
+              </a:rPr>
+              <a:t>.</a:t>
+            </a:r>
+          </a:p>
+          <a:p>
+            <a:pPr marL="0" indent="0">
+              <a:buNone/>
+            </a:pPr>
+            <a:r>
+              <a:rPr lang="ko-KR" altLang="en-US" sz="1400" dirty="0" smtClean="0">
+                <a:latin typeface="굴림체" pitchFamily="49" charset="-127"/>
+                <a:ea typeface="굴림체" pitchFamily="49" charset="-127"/>
+              </a:rPr>
+              <a:t>여신쵸로마츠는 카라마츠가 참된 인간으로 자라게 하기 위해 플레이어 집의 집사가 되기로 한다</a:t>
+            </a:r>
+            <a:r>
+              <a:rPr lang="en-US" altLang="ko-KR" sz="1400" dirty="0" smtClean="0">
+                <a:latin typeface="굴림체" pitchFamily="49" charset="-127"/>
+                <a:ea typeface="굴림체" pitchFamily="49" charset="-127"/>
+              </a:rPr>
+              <a:t>.</a:t>
+            </a:r>
+            <a:r>
+              <a:rPr lang="ko-KR" altLang="en-US" sz="1400" dirty="0" smtClean="0">
+                <a:latin typeface="굴림체" pitchFamily="49" charset="-127"/>
+                <a:ea typeface="굴림체" pitchFamily="49" charset="-127"/>
+              </a:rPr>
+              <a:t>  </a:t>
+            </a:r>
+            <a:endParaRPr lang="en-US" altLang="ko-KR" sz="1400" dirty="0">
               <a:latin typeface="굴림체" pitchFamily="49" charset="-127"/>
               <a:ea typeface="굴림체" pitchFamily="49" charset="-127"/>
             </a:endParaRPr>
@@ -5506,90 +5683,6 @@
             <a:pPr marL="0" indent="0">
               <a:buNone/>
             </a:pPr>
-            <a:r>
-              <a:rPr lang="ko-KR" altLang="en-US" sz="1400" dirty="0" err="1" smtClean="0">
-                <a:latin typeface="굴림체" pitchFamily="49" charset="-127"/>
-                <a:ea typeface="굴림체" pitchFamily="49" charset="-127"/>
-              </a:rPr>
-              <a:t>카라마치의</a:t>
-            </a:r>
-            <a:r>
-              <a:rPr lang="ko-KR" altLang="en-US" sz="1400" dirty="0" smtClean="0">
-                <a:latin typeface="굴림체" pitchFamily="49" charset="-127"/>
-                <a:ea typeface="굴림체" pitchFamily="49" charset="-127"/>
-              </a:rPr>
-              <a:t> 한마디로 이따이해진 사신이치마츠가 카라마츠를 죽여버렸다</a:t>
-            </a:r>
-            <a:r>
-              <a:rPr lang="en-US" altLang="ko-KR" sz="1400" dirty="0" smtClean="0">
-                <a:latin typeface="굴림체" pitchFamily="49" charset="-127"/>
-                <a:ea typeface="굴림체" pitchFamily="49" charset="-127"/>
-              </a:rPr>
-              <a:t>.</a:t>
-            </a:r>
-          </a:p>
-          <a:p>
-            <a:pPr marL="0" indent="0">
-              <a:buNone/>
-            </a:pPr>
-            <a:r>
-              <a:rPr lang="ko-KR" altLang="en-US" sz="1400" dirty="0" smtClean="0">
-                <a:latin typeface="굴림체" pitchFamily="49" charset="-127"/>
-                <a:ea typeface="굴림체" pitchFamily="49" charset="-127"/>
-              </a:rPr>
-              <a:t>그걸 본 여신쵸로마츠는 그런 카라마츠를 불쌍히 여겨 인간아기로 되살려 플레이어에게 맡긴다</a:t>
-            </a:r>
-            <a:r>
-              <a:rPr lang="en-US" altLang="ko-KR" sz="1400" dirty="0" smtClean="0">
-                <a:latin typeface="굴림체" pitchFamily="49" charset="-127"/>
-                <a:ea typeface="굴림체" pitchFamily="49" charset="-127"/>
-              </a:rPr>
-              <a:t>.</a:t>
-            </a:r>
-          </a:p>
-          <a:p>
-            <a:pPr marL="0" indent="0">
-              <a:buNone/>
-            </a:pPr>
-            <a:r>
-              <a:rPr lang="ko-KR" altLang="en-US" sz="1400" dirty="0" smtClean="0">
-                <a:latin typeface="굴림체" pitchFamily="49" charset="-127"/>
-                <a:ea typeface="굴림체" pitchFamily="49" charset="-127"/>
-              </a:rPr>
-              <a:t>여신쵸로마츠는 카라마츠가 참된 인간으로 자라게 하기 위해 플레이어 집의 집사가 되기로 한다</a:t>
-            </a:r>
-            <a:r>
-              <a:rPr lang="en-US" altLang="ko-KR" sz="1400" dirty="0" smtClean="0">
-                <a:latin typeface="굴림체" pitchFamily="49" charset="-127"/>
-                <a:ea typeface="굴림체" pitchFamily="49" charset="-127"/>
-              </a:rPr>
-              <a:t>.</a:t>
-            </a:r>
-            <a:r>
-              <a:rPr lang="ko-KR" altLang="en-US" sz="1400" dirty="0" smtClean="0">
-                <a:latin typeface="굴림체" pitchFamily="49" charset="-127"/>
-                <a:ea typeface="굴림체" pitchFamily="49" charset="-127"/>
-              </a:rPr>
-              <a:t>  </a:t>
-            </a:r>
-            <a:endParaRPr lang="en-US" altLang="ko-KR" sz="1400" dirty="0">
-              <a:latin typeface="굴림체" pitchFamily="49" charset="-127"/>
-              <a:ea typeface="굴림체" pitchFamily="49" charset="-127"/>
-            </a:endParaRPr>
-          </a:p>
-          <a:p>
-            <a:pPr marL="457200" indent="-457200">
-              <a:buAutoNum type="arabicPeriod"/>
-            </a:pPr>
-            <a:endParaRPr lang="en-US" altLang="ko-KR" sz="1400" dirty="0" smtClean="0">
-              <a:latin typeface="굴림체" pitchFamily="49" charset="-127"/>
-              <a:ea typeface="굴림체" pitchFamily="49" charset="-127"/>
-            </a:endParaRPr>
-          </a:p>
-          <a:p>
-            <a:pPr marL="0" indent="0">
-              <a:buNone/>
-            </a:pPr>
             <a:endParaRPr lang="en-US" altLang="ko-KR" sz="1600" dirty="0" smtClean="0">
               <a:latin typeface="굴림체" pitchFamily="49" charset="-127"/>
               <a:ea typeface="굴림체" pitchFamily="49" charset="-127"/>
@@ -5615,214 +5708,6 @@
             <a:fld id="{5078E833-DA21-410B-97BB-1AB410559DE8}" type="slidenum">
               <a:rPr lang="ko-KR" altLang="en-US" smtClean="0"/>
               <a:t>8</a:t>
-            </a:fld>
-            <a:endParaRPr lang="ko-KR" altLang="en-US"/>
-          </a:p>
-        </p:txBody>
-      </p:sp>
-    </p:spTree>
-    <p:extLst>
-      <p:ext uri="{BB962C8B-B14F-4D97-AF65-F5344CB8AC3E}">
-        <p14:creationId xmlns:p14="http://schemas.microsoft.com/office/powerpoint/2010/main" val="1527275268"/>
-      </p:ext>
-    </p:extLst>
-  </p:cSld>
-  <p:clrMapOvr>
-    <a:masterClrMapping/>
-  </p:clrMapOvr>
-  <p:timing>
-    <p:tnLst>
-      <p:par>
-        <p:cTn id="1" dur="indefinite" restart="never" nodeType="tmRoot"/>
-      </p:par>
-    </p:tnLst>
-  </p:timing>
-</p:sld>
-</file>
-
-<file path=ppt/slides/slide9.xml><?xml version="1.0" encoding="utf-8"?>
-<p:sld xmlns:a="http://schemas.openxmlformats.org/drawingml/2006/main" xmlns:r="http://schemas.openxmlformats.org/officeDocument/2006/relationships" xmlns:p="http://schemas.openxmlformats.org/presentationml/2006/main">
-  <p:cSld>
-    <p:spTree>
-      <p:nvGrpSpPr>
-        <p:cNvPr id="1" name=""/>
-        <p:cNvGrpSpPr/>
-        <p:nvPr/>
-      </p:nvGrpSpPr>
-      <p:grpSpPr>
-        <a:xfrm>
-          <a:off x="0" y="0"/>
-          <a:ext cx="0" cy="0"/>
-          <a:chOff x="0" y="0"/>
-          <a:chExt cx="0" cy="0"/>
-        </a:xfrm>
-      </p:grpSpPr>
-      <p:sp>
-        <p:nvSpPr>
-          <p:cNvPr id="3" name="내용 개체 틀 2"/>
-          <p:cNvSpPr>
-            <a:spLocks noGrp="1"/>
-          </p:cNvSpPr>
-          <p:nvPr>
-            <p:ph idx="1"/>
-          </p:nvPr>
-        </p:nvSpPr>
-        <p:spPr>
-          <a:xfrm>
-            <a:off x="107504" y="116632"/>
-            <a:ext cx="8928992" cy="6624736"/>
-          </a:xfrm>
-        </p:spPr>
-        <p:txBody>
-          <a:bodyPr>
-            <a:normAutofit/>
-          </a:bodyPr>
-          <a:lstStyle/>
-          <a:p>
-            <a:pPr marL="0" indent="0">
-              <a:buNone/>
-            </a:pPr>
-            <a:r>
-              <a:rPr lang="en-US" altLang="ko-KR" sz="2000" dirty="0" smtClean="0">
-                <a:latin typeface="굴림체" pitchFamily="49" charset="-127"/>
-                <a:ea typeface="굴림체" pitchFamily="49" charset="-127"/>
-              </a:rPr>
-              <a:t>6. </a:t>
-            </a:r>
-            <a:r>
-              <a:rPr lang="ko-KR" altLang="en-US" sz="2000" dirty="0" smtClean="0">
-                <a:latin typeface="굴림체" pitchFamily="49" charset="-127"/>
-                <a:ea typeface="굴림체" pitchFamily="49" charset="-127"/>
-              </a:rPr>
-              <a:t>유료화 모델</a:t>
-            </a:r>
-            <a:endParaRPr lang="en-US" altLang="ko-KR" sz="2000" dirty="0" smtClean="0">
-              <a:latin typeface="굴림체" pitchFamily="49" charset="-127"/>
-              <a:ea typeface="굴림체" pitchFamily="49" charset="-127"/>
-            </a:endParaRPr>
-          </a:p>
-          <a:p>
-            <a:pPr marL="0" indent="0">
-              <a:buNone/>
-            </a:pPr>
-            <a:endParaRPr lang="en-US" altLang="ko-KR" sz="1400" dirty="0" smtClean="0">
-              <a:latin typeface="굴림체" pitchFamily="49" charset="-127"/>
-              <a:ea typeface="굴림체" pitchFamily="49" charset="-127"/>
-            </a:endParaRPr>
-          </a:p>
-          <a:p>
-            <a:pPr marL="0" indent="0">
-              <a:buNone/>
-            </a:pPr>
-            <a:r>
-              <a:rPr lang="ko-KR" altLang="en-US" sz="1400" dirty="0" err="1" smtClean="0">
-                <a:latin typeface="굴림체" pitchFamily="49" charset="-127"/>
-                <a:ea typeface="굴림체" pitchFamily="49" charset="-127"/>
-              </a:rPr>
-              <a:t>카라마치의</a:t>
-            </a:r>
-            <a:r>
-              <a:rPr lang="ko-KR" altLang="en-US" sz="1400" dirty="0" smtClean="0">
-                <a:latin typeface="굴림체" pitchFamily="49" charset="-127"/>
-                <a:ea typeface="굴림체" pitchFamily="49" charset="-127"/>
-              </a:rPr>
-              <a:t> 한마디로 이따이해진 사신이치마츠가 카라마츠를 죽여버렸다</a:t>
-            </a:r>
-            <a:r>
-              <a:rPr lang="en-US" altLang="ko-KR" sz="1400" dirty="0" smtClean="0">
-                <a:latin typeface="굴림체" pitchFamily="49" charset="-127"/>
-                <a:ea typeface="굴림체" pitchFamily="49" charset="-127"/>
-              </a:rPr>
-              <a:t>.</a:t>
-            </a:r>
-          </a:p>
-          <a:p>
-            <a:pPr marL="0" indent="0">
-              <a:buNone/>
-            </a:pPr>
-            <a:r>
-              <a:rPr lang="ko-KR" altLang="en-US" sz="1400" dirty="0" smtClean="0">
-                <a:latin typeface="굴림체" pitchFamily="49" charset="-127"/>
-                <a:ea typeface="굴림체" pitchFamily="49" charset="-127"/>
-              </a:rPr>
-              <a:t>그걸 본 여신쵸로마츠는 그런 카라마츠를 불쌍히 여겨 인간아기로 되살려 플레이어에게 맡긴다</a:t>
-            </a:r>
-            <a:r>
-              <a:rPr lang="en-US" altLang="ko-KR" sz="1400" dirty="0" smtClean="0">
-                <a:latin typeface="굴림체" pitchFamily="49" charset="-127"/>
-                <a:ea typeface="굴림체" pitchFamily="49" charset="-127"/>
-              </a:rPr>
-              <a:t>.</a:t>
-            </a:r>
-          </a:p>
-          <a:p>
-            <a:pPr marL="0" indent="0">
-              <a:buNone/>
-            </a:pPr>
-            <a:r>
-              <a:rPr lang="ko-KR" altLang="en-US" sz="1400" dirty="0" smtClean="0">
-                <a:latin typeface="굴림체" pitchFamily="49" charset="-127"/>
-                <a:ea typeface="굴림체" pitchFamily="49" charset="-127"/>
-              </a:rPr>
-              <a:t>여신쵸로마츠는 카라마츠가 참된 인간으로 자라게 하기 위해 플레이어 집의 집사가 되기로 한다</a:t>
-            </a:r>
-            <a:r>
-              <a:rPr lang="en-US" altLang="ko-KR" sz="1400" dirty="0" smtClean="0">
-                <a:latin typeface="굴림체" pitchFamily="49" charset="-127"/>
-                <a:ea typeface="굴림체" pitchFamily="49" charset="-127"/>
-              </a:rPr>
-              <a:t>.</a:t>
-            </a:r>
-            <a:r>
-              <a:rPr lang="ko-KR" altLang="en-US" sz="1400" dirty="0" smtClean="0">
-                <a:latin typeface="굴림체" pitchFamily="49" charset="-127"/>
-                <a:ea typeface="굴림체" pitchFamily="49" charset="-127"/>
-              </a:rPr>
-              <a:t>  </a:t>
-            </a:r>
-            <a:endParaRPr lang="en-US" altLang="ko-KR" sz="1400" dirty="0">
-              <a:latin typeface="굴림체" pitchFamily="49" charset="-127"/>
-              <a:ea typeface="굴림체" pitchFamily="49" charset="-127"/>
-            </a:endParaRPr>
-          </a:p>
-          <a:p>
-            <a:pPr marL="457200" indent="-457200">
-              <a:buAutoNum type="arabicPeriod"/>
-            </a:pPr>
-            <a:endParaRPr lang="en-US" altLang="ko-KR" sz="1400" dirty="0" smtClean="0">
-              <a:latin typeface="굴림체" pitchFamily="49" charset="-127"/>
-              <a:ea typeface="굴림체" pitchFamily="49" charset="-127"/>
-            </a:endParaRPr>
-          </a:p>
-          <a:p>
-            <a:pPr marL="0" indent="0">
-              <a:buNone/>
-            </a:pPr>
-            <a:endParaRPr lang="en-US" altLang="ko-KR" sz="1600" dirty="0" smtClean="0">
-              <a:latin typeface="굴림체" pitchFamily="49" charset="-127"/>
-              <a:ea typeface="굴림체" pitchFamily="49" charset="-127"/>
-            </a:endParaRPr>
-          </a:p>
-        </p:txBody>
-      </p:sp>
-      <p:sp>
-        <p:nvSpPr>
-          <p:cNvPr id="2" name="슬라이드 번호 개체 틀 1"/>
-          <p:cNvSpPr>
-            <a:spLocks noGrp="1"/>
-          </p:cNvSpPr>
-          <p:nvPr>
-            <p:ph type="sldNum" sz="quarter" idx="12"/>
-          </p:nvPr>
-        </p:nvSpPr>
-        <p:spPr/>
-        <p:txBody>
-          <a:bodyPr/>
-          <a:lstStyle/>
-          <a:p>
-            <a:fld id="{5078E833-DA21-410B-97BB-1AB410559DE8}" type="slidenum">
-              <a:rPr lang="ko-KR" altLang="en-US" smtClean="0"/>
-              <a:t>9</a:t>
             </a:fld>
             <a:endParaRPr lang="ko-KR" altLang="en-US"/>
           </a:p>

</xml_diff>

<commit_message>
Revert "Revert "회의 한 뒤""
This reverts commit ccb5396629cdccb4ced51ba8264afd7911e49735.
</commit_message>
<xml_diff>
--- a/아악아아악!!!.pptx
+++ b/아악아아악!!!.pptx
@@ -5,17 +5,18 @@
     <p:sldMasterId id="2147483648" r:id="rId1"/>
   </p:sldMasterIdLst>
   <p:notesMasterIdLst>
-    <p:notesMasterId r:id="rId10"/>
+    <p:notesMasterId r:id="rId11"/>
   </p:notesMasterIdLst>
   <p:sldIdLst>
     <p:sldId id="256" r:id="rId2"/>
     <p:sldId id="257" r:id="rId3"/>
-    <p:sldId id="258" r:id="rId4"/>
-    <p:sldId id="259" r:id="rId5"/>
-    <p:sldId id="260" r:id="rId6"/>
-    <p:sldId id="261" r:id="rId7"/>
-    <p:sldId id="263" r:id="rId8"/>
-    <p:sldId id="264" r:id="rId9"/>
+    <p:sldId id="265" r:id="rId4"/>
+    <p:sldId id="258" r:id="rId5"/>
+    <p:sldId id="259" r:id="rId6"/>
+    <p:sldId id="260" r:id="rId7"/>
+    <p:sldId id="261" r:id="rId8"/>
+    <p:sldId id="263" r:id="rId9"/>
+    <p:sldId id="264" r:id="rId10"/>
   </p:sldIdLst>
   <p:sldSz cx="9144000" cy="6858000" type="screen4x3"/>
   <p:notesSz cx="6858000" cy="9144000"/>
@@ -114,6 +115,22 @@
       </a:defRPr>
     </a:lvl9pPr>
   </p:defaultTextStyle>
+  <p:extLst>
+    <p:ext uri="{EFAFB233-063F-42B5-8137-9DF3F51BA10A}">
+      <p15:sldGuideLst xmlns:p15="http://schemas.microsoft.com/office/powerpoint/2012/main">
+        <p15:guide id="1" orient="horz" pos="2160">
+          <p15:clr>
+            <a:srgbClr val="A4A3A4"/>
+          </p15:clr>
+        </p15:guide>
+        <p15:guide id="2" pos="2880">
+          <p15:clr>
+            <a:srgbClr val="A4A3A4"/>
+          </p15:clr>
+        </p15:guide>
+      </p15:sldGuideLst>
+    </p:ext>
+  </p:extLst>
 </p:presentation>
 </file>
 
@@ -199,7 +216,7 @@
           <a:p>
             <a:fld id="{322BE6E1-CBFE-4D75-A5D9-91F6B131BAA3}" type="datetimeFigureOut">
               <a:rPr lang="ko-KR" altLang="en-US" smtClean="0"/>
-              <a:t>2017-02-12</a:t>
+              <a:t>2017-03-11</a:t>
             </a:fld>
             <a:endParaRPr lang="ko-KR" altLang="en-US"/>
           </a:p>
@@ -648,7 +665,7 @@
           <a:p>
             <a:fld id="{1807FEBA-1443-444E-9049-49E05385B20A}" type="datetime1">
               <a:rPr lang="ko-KR" altLang="en-US" smtClean="0"/>
-              <a:t>2017-02-12</a:t>
+              <a:t>2017-03-11</a:t>
             </a:fld>
             <a:endParaRPr lang="ko-KR" altLang="en-US"/>
           </a:p>
@@ -818,7 +835,7 @@
           <a:p>
             <a:fld id="{9D6C62C2-7F97-4687-BF1D-12F476B68085}" type="datetime1">
               <a:rPr lang="ko-KR" altLang="en-US" smtClean="0"/>
-              <a:t>2017-02-12</a:t>
+              <a:t>2017-03-11</a:t>
             </a:fld>
             <a:endParaRPr lang="ko-KR" altLang="en-US"/>
           </a:p>
@@ -998,7 +1015,7 @@
           <a:p>
             <a:fld id="{0A22CA48-77A4-4CAC-9A82-254432CDD5AB}" type="datetime1">
               <a:rPr lang="ko-KR" altLang="en-US" smtClean="0"/>
-              <a:t>2017-02-12</a:t>
+              <a:t>2017-03-11</a:t>
             </a:fld>
             <a:endParaRPr lang="ko-KR" altLang="en-US"/>
           </a:p>
@@ -1168,7 +1185,7 @@
           <a:p>
             <a:fld id="{29358A36-97FB-414B-A9E3-C04C49525799}" type="datetime1">
               <a:rPr lang="ko-KR" altLang="en-US" smtClean="0"/>
-              <a:t>2017-02-12</a:t>
+              <a:t>2017-03-11</a:t>
             </a:fld>
             <a:endParaRPr lang="ko-KR" altLang="en-US"/>
           </a:p>
@@ -1414,7 +1431,7 @@
           <a:p>
             <a:fld id="{8DE8D64E-C2A3-41CD-928B-772DB2EF815D}" type="datetime1">
               <a:rPr lang="ko-KR" altLang="en-US" smtClean="0"/>
-              <a:t>2017-02-12</a:t>
+              <a:t>2017-03-11</a:t>
             </a:fld>
             <a:endParaRPr lang="ko-KR" altLang="en-US"/>
           </a:p>
@@ -1702,7 +1719,7 @@
           <a:p>
             <a:fld id="{B2ACD634-D3E2-4AC5-BB0B-ADDF2C3C8AE5}" type="datetime1">
               <a:rPr lang="ko-KR" altLang="en-US" smtClean="0"/>
-              <a:t>2017-02-12</a:t>
+              <a:t>2017-03-11</a:t>
             </a:fld>
             <a:endParaRPr lang="ko-KR" altLang="en-US"/>
           </a:p>
@@ -2124,7 +2141,7 @@
           <a:p>
             <a:fld id="{8125A497-46BF-4A15-A06C-5A4C903ADD0D}" type="datetime1">
               <a:rPr lang="ko-KR" altLang="en-US" smtClean="0"/>
-              <a:t>2017-02-12</a:t>
+              <a:t>2017-03-11</a:t>
             </a:fld>
             <a:endParaRPr lang="ko-KR" altLang="en-US"/>
           </a:p>
@@ -2242,7 +2259,7 @@
           <a:p>
             <a:fld id="{9577B026-5B5C-4407-A631-4861A6B29EDE}" type="datetime1">
               <a:rPr lang="ko-KR" altLang="en-US" smtClean="0"/>
-              <a:t>2017-02-12</a:t>
+              <a:t>2017-03-11</a:t>
             </a:fld>
             <a:endParaRPr lang="ko-KR" altLang="en-US"/>
           </a:p>
@@ -2337,7 +2354,7 @@
           <a:p>
             <a:fld id="{9533E79F-763E-46A1-A0E4-B03A594183F9}" type="datetime1">
               <a:rPr lang="ko-KR" altLang="en-US" smtClean="0"/>
-              <a:t>2017-02-12</a:t>
+              <a:t>2017-03-11</a:t>
             </a:fld>
             <a:endParaRPr lang="ko-KR" altLang="en-US"/>
           </a:p>
@@ -2614,7 +2631,7 @@
           <a:p>
             <a:fld id="{2938D0DC-F944-4121-AE2B-A6AC932CFF17}" type="datetime1">
               <a:rPr lang="ko-KR" altLang="en-US" smtClean="0"/>
-              <a:t>2017-02-12</a:t>
+              <a:t>2017-03-11</a:t>
             </a:fld>
             <a:endParaRPr lang="ko-KR" altLang="en-US"/>
           </a:p>
@@ -2867,7 +2884,7 @@
           <a:p>
             <a:fld id="{83D605B8-9783-4CE4-BB46-BD02B01AAF1D}" type="datetime1">
               <a:rPr lang="ko-KR" altLang="en-US" smtClean="0"/>
-              <a:t>2017-02-12</a:t>
+              <a:t>2017-03-11</a:t>
             </a:fld>
             <a:endParaRPr lang="ko-KR" altLang="en-US"/>
           </a:p>
@@ -3080,7 +3097,7 @@
           <a:p>
             <a:fld id="{35EE7B1C-8E4A-407E-B83F-2C2F9304F21E}" type="datetime1">
               <a:rPr lang="ko-KR" altLang="en-US" smtClean="0"/>
-              <a:t>2017-02-12</a:t>
+              <a:t>2017-03-11</a:t>
             </a:fld>
             <a:endParaRPr lang="ko-KR" altLang="en-US"/>
           </a:p>
@@ -4206,6 +4223,25 @@
       </p:grpSpPr>
       <p:sp>
         <p:nvSpPr>
+          <p:cNvPr id="2" name="제목 1"/>
+          <p:cNvSpPr>
+            <a:spLocks noGrp="1"/>
+          </p:cNvSpPr>
+          <p:nvPr>
+            <p:ph type="title"/>
+          </p:nvPr>
+        </p:nvSpPr>
+        <p:spPr/>
+        <p:txBody>
+          <a:bodyPr/>
+          <a:lstStyle/>
+          <a:p>
+            <a:endParaRPr lang="ko-KR" altLang="en-US"/>
+          </a:p>
+        </p:txBody>
+      </p:sp>
+      <p:sp>
+        <p:nvSpPr>
           <p:cNvPr id="3" name="내용 개체 틀 2"/>
           <p:cNvSpPr>
             <a:spLocks noGrp="1"/>
@@ -4214,183 +4250,12 @@
             <p:ph idx="1"/>
           </p:nvPr>
         </p:nvSpPr>
-        <p:spPr>
-          <a:xfrm>
-            <a:off x="107504" y="116632"/>
-            <a:ext cx="8928992" cy="6624736"/>
-          </a:xfrm>
-        </p:spPr>
-        <p:txBody>
-          <a:bodyPr>
-            <a:normAutofit/>
-          </a:bodyPr>
-          <a:lstStyle/>
-          <a:p>
-            <a:pPr marL="457200" indent="-457200">
-              <a:buAutoNum type="arabicPeriod"/>
-            </a:pPr>
-            <a:r>
-              <a:rPr lang="ko-KR" altLang="en-US" sz="2000" dirty="0" smtClean="0">
-                <a:latin typeface="굴림체" pitchFamily="49" charset="-127"/>
-                <a:ea typeface="굴림체" pitchFamily="49" charset="-127"/>
-              </a:rPr>
-              <a:t>게임 개요</a:t>
-            </a:r>
-            <a:endParaRPr lang="en-US" altLang="ko-KR" sz="1400" dirty="0" smtClean="0">
-              <a:latin typeface="굴림체" pitchFamily="49" charset="-127"/>
-              <a:ea typeface="굴림체" pitchFamily="49" charset="-127"/>
-            </a:endParaRPr>
-          </a:p>
-          <a:p>
-            <a:pPr marL="0" indent="0">
-              <a:buNone/>
-            </a:pPr>
-            <a:r>
-              <a:rPr lang="ko-KR" altLang="en-US" sz="1400" dirty="0" smtClean="0">
-                <a:latin typeface="굴림체" pitchFamily="49" charset="-127"/>
-                <a:ea typeface="굴림체" pitchFamily="49" charset="-127"/>
-              </a:rPr>
-              <a:t> </a:t>
-            </a:r>
-            <a:endParaRPr lang="en-US" altLang="ko-KR" sz="1400" dirty="0" smtClean="0">
-              <a:latin typeface="굴림체" pitchFamily="49" charset="-127"/>
-              <a:ea typeface="굴림체" pitchFamily="49" charset="-127"/>
-            </a:endParaRPr>
-          </a:p>
-          <a:p>
-            <a:pPr marL="0" indent="0">
-              <a:buNone/>
-            </a:pPr>
-            <a:r>
-              <a:rPr lang="en-US" altLang="ko-KR" sz="1400" dirty="0">
-                <a:latin typeface="굴림체" pitchFamily="49" charset="-127"/>
-                <a:ea typeface="굴림체" pitchFamily="49" charset="-127"/>
-              </a:rPr>
-              <a:t> </a:t>
-            </a:r>
-            <a:r>
-              <a:rPr lang="ko-KR" altLang="en-US" sz="1400" dirty="0" smtClean="0">
-                <a:latin typeface="굴림체" pitchFamily="49" charset="-127"/>
-                <a:ea typeface="굴림체" pitchFamily="49" charset="-127"/>
-              </a:rPr>
-              <a:t>카라마츠의 한마디로 이따이해진 사신이치마츠가 카라마츠를 죽여버렸다</a:t>
-            </a:r>
-            <a:r>
-              <a:rPr lang="en-US" altLang="ko-KR" sz="1400" dirty="0" smtClean="0">
-                <a:latin typeface="굴림체" pitchFamily="49" charset="-127"/>
-                <a:ea typeface="굴림체" pitchFamily="49" charset="-127"/>
-              </a:rPr>
-              <a:t>.</a:t>
-            </a:r>
-          </a:p>
-          <a:p>
-            <a:pPr marL="0" indent="0">
-              <a:buNone/>
-            </a:pPr>
-            <a:r>
-              <a:rPr lang="ko-KR" altLang="en-US" sz="1400" dirty="0" smtClean="0">
-                <a:latin typeface="굴림체" pitchFamily="49" charset="-127"/>
-                <a:ea typeface="굴림체" pitchFamily="49" charset="-127"/>
-              </a:rPr>
-              <a:t>그걸 본 여신쵸로마츠는 그런 카라마츠를 불쌍히 여겨 인간아기로 되살려 플레이어에게 맡긴다</a:t>
-            </a:r>
-            <a:r>
-              <a:rPr lang="en-US" altLang="ko-KR" sz="1400" dirty="0" smtClean="0">
-                <a:latin typeface="굴림체" pitchFamily="49" charset="-127"/>
-                <a:ea typeface="굴림체" pitchFamily="49" charset="-127"/>
-              </a:rPr>
-              <a:t>.</a:t>
-            </a:r>
-          </a:p>
-          <a:p>
-            <a:pPr marL="0" indent="0">
-              <a:buNone/>
-            </a:pPr>
-            <a:endParaRPr lang="en-US" altLang="ko-KR" sz="1400" dirty="0" smtClean="0">
-              <a:latin typeface="굴림체" pitchFamily="49" charset="-127"/>
-              <a:ea typeface="굴림체" pitchFamily="49" charset="-127"/>
-            </a:endParaRPr>
-          </a:p>
-          <a:p>
-            <a:pPr marL="0" indent="0">
-              <a:buNone/>
-            </a:pPr>
-            <a:r>
-              <a:rPr lang="ko-KR" altLang="en-US" sz="1400" dirty="0" smtClean="0">
-                <a:latin typeface="굴림체" pitchFamily="49" charset="-127"/>
-                <a:ea typeface="굴림체" pitchFamily="49" charset="-127"/>
-              </a:rPr>
-              <a:t>여신쵸로마츠는 카라마츠가 참된 인간으로 자라게 하기 위해 플레이어 집의 집사가 되기로 한다</a:t>
-            </a:r>
-            <a:r>
-              <a:rPr lang="en-US" altLang="ko-KR" sz="1400" dirty="0" smtClean="0">
-                <a:latin typeface="굴림체" pitchFamily="49" charset="-127"/>
-                <a:ea typeface="굴림체" pitchFamily="49" charset="-127"/>
-              </a:rPr>
-              <a:t>.</a:t>
-            </a:r>
-          </a:p>
-          <a:p>
-            <a:pPr marL="0" indent="0">
-              <a:buNone/>
-            </a:pPr>
-            <a:r>
-              <a:rPr lang="ko-KR" altLang="en-US" sz="1400" dirty="0" smtClean="0">
-                <a:latin typeface="굴림체" pitchFamily="49" charset="-127"/>
-                <a:ea typeface="굴림체" pitchFamily="49" charset="-127"/>
-              </a:rPr>
-              <a:t>플레이어는 카라마츠를 위해 아르바이트를 시키고 여러 학원을 </a:t>
-            </a:r>
-            <a:r>
-              <a:rPr lang="en-US" altLang="ko-KR" sz="1400" dirty="0" smtClean="0">
-                <a:latin typeface="굴림체" pitchFamily="49" charset="-127"/>
-                <a:ea typeface="굴림체" pitchFamily="49" charset="-127"/>
-              </a:rPr>
-              <a:t>8</a:t>
-            </a:r>
-            <a:r>
-              <a:rPr lang="ko-KR" altLang="en-US" sz="1400" dirty="0" smtClean="0">
-                <a:latin typeface="굴림체" pitchFamily="49" charset="-127"/>
-                <a:ea typeface="굴림체" pitchFamily="49" charset="-127"/>
-              </a:rPr>
-              <a:t>년 동안 보내게 되는데</a:t>
-            </a:r>
-            <a:r>
-              <a:rPr lang="en-US" altLang="ko-KR" sz="1400" dirty="0" smtClean="0">
-                <a:latin typeface="굴림체" pitchFamily="49" charset="-127"/>
-                <a:ea typeface="굴림체" pitchFamily="49" charset="-127"/>
-              </a:rPr>
-              <a:t>...</a:t>
-            </a:r>
-            <a:r>
-              <a:rPr lang="ko-KR" altLang="en-US" sz="1400" dirty="0" smtClean="0">
-                <a:latin typeface="굴림체" pitchFamily="49" charset="-127"/>
-                <a:ea typeface="굴림체" pitchFamily="49" charset="-127"/>
-              </a:rPr>
-              <a:t>  </a:t>
-            </a:r>
-            <a:endParaRPr lang="en-US" altLang="ko-KR" sz="1400" dirty="0">
-              <a:latin typeface="굴림체" pitchFamily="49" charset="-127"/>
-              <a:ea typeface="굴림체" pitchFamily="49" charset="-127"/>
-            </a:endParaRPr>
-          </a:p>
-          <a:p>
-            <a:pPr marL="457200" indent="-457200">
-              <a:buAutoNum type="arabicPeriod"/>
-            </a:pPr>
-            <a:endParaRPr lang="en-US" altLang="ko-KR" sz="1400" dirty="0" smtClean="0">
-              <a:latin typeface="굴림체" pitchFamily="49" charset="-127"/>
-              <a:ea typeface="굴림체" pitchFamily="49" charset="-127"/>
-            </a:endParaRPr>
-          </a:p>
-          <a:p>
-            <a:pPr marL="0" indent="0">
-              <a:buNone/>
-            </a:pPr>
-            <a:endParaRPr lang="en-US" altLang="ko-KR" sz="1600" dirty="0" smtClean="0">
-              <a:latin typeface="굴림체" pitchFamily="49" charset="-127"/>
-              <a:ea typeface="굴림체" pitchFamily="49" charset="-127"/>
-            </a:endParaRPr>
+        <p:spPr/>
+        <p:txBody>
+          <a:bodyPr/>
+          <a:lstStyle/>
+          <a:p>
+            <a:endParaRPr lang="ko-KR" altLang="en-US"/>
           </a:p>
         </p:txBody>
       </p:sp>
@@ -4420,7 +4285,7 @@
     </p:spTree>
     <p:extLst>
       <p:ext uri="{BB962C8B-B14F-4D97-AF65-F5344CB8AC3E}">
-        <p14:creationId xmlns:p14="http://schemas.microsoft.com/office/powerpoint/2010/main" val="2433871538"/>
+        <p14:creationId xmlns:p14="http://schemas.microsoft.com/office/powerpoint/2010/main" val="1863307531"/>
       </p:ext>
     </p:extLst>
   </p:cSld>
@@ -4466,7 +4331,7 @@
         </p:nvSpPr>
         <p:spPr>
           <a:xfrm>
-            <a:off x="107504" y="116632"/>
+            <a:off x="107504" y="188640"/>
             <a:ext cx="8928992" cy="6624736"/>
           </a:xfrm>
         </p:spPr>
@@ -4476,27 +4341,81 @@
           </a:bodyPr>
           <a:lstStyle/>
           <a:p>
-            <a:pPr marL="0" indent="0">
-              <a:buNone/>
+            <a:pPr marL="457200" indent="-457200">
+              <a:buAutoNum type="arabicPeriod"/>
             </a:pPr>
             <a:r>
-              <a:rPr lang="en-US" altLang="ko-KR" sz="2000" dirty="0" smtClean="0">
-                <a:latin typeface="굴림체" pitchFamily="49" charset="-127"/>
-                <a:ea typeface="굴림체" pitchFamily="49" charset="-127"/>
-              </a:rPr>
-              <a:t>2. </a:t>
-            </a:r>
-            <a:r>
               <a:rPr lang="ko-KR" altLang="en-US" sz="2000" dirty="0" smtClean="0">
                 <a:latin typeface="굴림체" pitchFamily="49" charset="-127"/>
                 <a:ea typeface="굴림체" pitchFamily="49" charset="-127"/>
               </a:rPr>
-              <a:t>캐릭터 설정 및 특징</a:t>
-            </a:r>
-            <a:endParaRPr lang="en-US" altLang="ko-KR" sz="2000" dirty="0" smtClean="0">
+              <a:t>게임 개요</a:t>
+            </a:r>
+            <a:endParaRPr lang="en-US" altLang="ko-KR" sz="1400" dirty="0" smtClean="0">
               <a:latin typeface="굴림체" pitchFamily="49" charset="-127"/>
               <a:ea typeface="굴림체" pitchFamily="49" charset="-127"/>
             </a:endParaRPr>
+          </a:p>
+          <a:p>
+            <a:pPr marL="0" indent="0">
+              <a:buNone/>
+            </a:pPr>
+            <a:r>
+              <a:rPr lang="ko-KR" altLang="en-US" sz="1400" dirty="0" smtClean="0">
+                <a:latin typeface="굴림체" pitchFamily="49" charset="-127"/>
+                <a:ea typeface="굴림체" pitchFamily="49" charset="-127"/>
+              </a:rPr>
+              <a:t> </a:t>
+            </a:r>
+            <a:endParaRPr lang="en-US" altLang="ko-KR" sz="1400" dirty="0" smtClean="0">
+              <a:latin typeface="굴림체" pitchFamily="49" charset="-127"/>
+              <a:ea typeface="굴림체" pitchFamily="49" charset="-127"/>
+            </a:endParaRPr>
+          </a:p>
+          <a:p>
+            <a:pPr marL="0" indent="0">
+              <a:buNone/>
+            </a:pPr>
+            <a:r>
+              <a:rPr lang="en-US" altLang="ko-KR" sz="1400" dirty="0">
+                <a:latin typeface="굴림체" pitchFamily="49" charset="-127"/>
+                <a:ea typeface="굴림체" pitchFamily="49" charset="-127"/>
+              </a:rPr>
+              <a:t> </a:t>
+            </a:r>
+            <a:r>
+              <a:rPr lang="ko-KR" altLang="en-US" sz="1400" dirty="0" smtClean="0">
+                <a:latin typeface="굴림체" pitchFamily="49" charset="-127"/>
+                <a:ea typeface="굴림체" pitchFamily="49" charset="-127"/>
+              </a:rPr>
+              <a:t>카라마츠의 한마디로 이따이해진 사신이치마츠가 카라마츠를 죽여버렸다</a:t>
+            </a:r>
+            <a:r>
+              <a:rPr lang="en-US" altLang="ko-KR" sz="1400" dirty="0" smtClean="0">
+                <a:latin typeface="굴림체" pitchFamily="49" charset="-127"/>
+                <a:ea typeface="굴림체" pitchFamily="49" charset="-127"/>
+              </a:rPr>
+              <a:t>.</a:t>
+            </a:r>
+          </a:p>
+          <a:p>
+            <a:pPr marL="0" indent="0">
+              <a:buNone/>
+            </a:pPr>
+            <a:r>
+              <a:rPr lang="ko-KR" altLang="en-US" sz="1400" dirty="0" smtClean="0">
+                <a:latin typeface="굴림체" pitchFamily="49" charset="-127"/>
+                <a:ea typeface="굴림체" pitchFamily="49" charset="-127"/>
+              </a:rPr>
+              <a:t>그걸 본 여신쵸로마츠는 그런 카라마츠를 불쌍히 여겨 인간아기로 되살려 플레이어에게 맡긴다</a:t>
+            </a:r>
+            <a:r>
+              <a:rPr lang="en-US" altLang="ko-KR" sz="1400" dirty="0" smtClean="0">
+                <a:latin typeface="굴림체" pitchFamily="49" charset="-127"/>
+                <a:ea typeface="굴림체" pitchFamily="49" charset="-127"/>
+              </a:rPr>
+              <a:t>.</a:t>
+            </a:r>
           </a:p>
           <a:p>
             <a:pPr marL="0" indent="0">
@@ -4512,100 +4431,67 @@
               <a:buNone/>
             </a:pPr>
             <a:r>
+              <a:rPr lang="ko-KR" altLang="en-US" sz="1400" dirty="0" smtClean="0">
+                <a:latin typeface="굴림체" pitchFamily="49" charset="-127"/>
+                <a:ea typeface="굴림체" pitchFamily="49" charset="-127"/>
+              </a:rPr>
+              <a:t>여신쵸로마츠는 카라마츠가 참된 인간으로 자라게 하기 위해 플레이어 집의 집사가 되기로 한다</a:t>
+            </a:r>
+            <a:r>
               <a:rPr lang="en-US" altLang="ko-KR" sz="1400" dirty="0" smtClean="0">
                 <a:latin typeface="굴림체" pitchFamily="49" charset="-127"/>
                 <a:ea typeface="굴림체" pitchFamily="49" charset="-127"/>
               </a:rPr>
-              <a:t>- </a:t>
-            </a:r>
+              <a:t>.</a:t>
+            </a:r>
+          </a:p>
+          <a:p>
+            <a:pPr marL="0" indent="0">
+              <a:buNone/>
+            </a:pPr>
             <a:r>
               <a:rPr lang="ko-KR" altLang="en-US" sz="1400" dirty="0" smtClean="0">
                 <a:latin typeface="굴림체" pitchFamily="49" charset="-127"/>
                 <a:ea typeface="굴림체" pitchFamily="49" charset="-127"/>
               </a:rPr>
-              <a:t>나이</a:t>
+              <a:t>플레이어는 카라마츠를 위해 아르바이트를 시키고 여러 학원을 </a:t>
             </a:r>
             <a:r>
               <a:rPr lang="en-US" altLang="ko-KR" sz="1400" dirty="0" smtClean="0">
                 <a:latin typeface="굴림체" pitchFamily="49" charset="-127"/>
                 <a:ea typeface="굴림체" pitchFamily="49" charset="-127"/>
               </a:rPr>
-              <a:t>:</a:t>
+              <a:t>8</a:t>
             </a:r>
             <a:r>
               <a:rPr lang="ko-KR" altLang="en-US" sz="1400" dirty="0" smtClean="0">
                 <a:latin typeface="굴림체" pitchFamily="49" charset="-127"/>
                 <a:ea typeface="굴림체" pitchFamily="49" charset="-127"/>
               </a:rPr>
-              <a:t> </a:t>
+              <a:t>년 동안 보내게 되는데</a:t>
             </a:r>
             <a:r>
               <a:rPr lang="en-US" altLang="ko-KR" sz="1400" dirty="0" smtClean="0">
                 <a:latin typeface="굴림체" pitchFamily="49" charset="-127"/>
                 <a:ea typeface="굴림체" pitchFamily="49" charset="-127"/>
               </a:rPr>
-              <a:t>12</a:t>
+              <a:t>...</a:t>
             </a:r>
             <a:r>
               <a:rPr lang="ko-KR" altLang="en-US" sz="1400" dirty="0" smtClean="0">
                 <a:latin typeface="굴림체" pitchFamily="49" charset="-127"/>
                 <a:ea typeface="굴림체" pitchFamily="49" charset="-127"/>
               </a:rPr>
-              <a:t>살</a:t>
-            </a:r>
-            <a:r>
-              <a:rPr lang="en-US" altLang="ko-KR" sz="1400" dirty="0" smtClean="0">
-                <a:latin typeface="굴림체" pitchFamily="49" charset="-127"/>
-                <a:ea typeface="굴림체" pitchFamily="49" charset="-127"/>
-              </a:rPr>
-              <a:t>(</a:t>
-            </a:r>
-            <a:r>
-              <a:rPr lang="ko-KR" altLang="en-US" sz="1400" dirty="0" smtClean="0">
-                <a:latin typeface="굴림체" pitchFamily="49" charset="-127"/>
-                <a:ea typeface="굴림체" pitchFamily="49" charset="-127"/>
-              </a:rPr>
-              <a:t>시작 나이</a:t>
-            </a:r>
-            <a:r>
-              <a:rPr lang="en-US" altLang="ko-KR" sz="1400" dirty="0" smtClean="0">
-                <a:latin typeface="굴림체" pitchFamily="49" charset="-127"/>
-                <a:ea typeface="굴림체" pitchFamily="49" charset="-127"/>
-              </a:rPr>
-              <a:t>)~20</a:t>
-            </a:r>
-            <a:r>
-              <a:rPr lang="ko-KR" altLang="en-US" sz="1400" dirty="0" smtClean="0">
-                <a:latin typeface="굴림체" pitchFamily="49" charset="-127"/>
-                <a:ea typeface="굴림체" pitchFamily="49" charset="-127"/>
-              </a:rPr>
-              <a:t>상</a:t>
-            </a:r>
-            <a:r>
-              <a:rPr lang="en-US" altLang="ko-KR" sz="1400" dirty="0" smtClean="0">
-                <a:latin typeface="굴림체" pitchFamily="49" charset="-127"/>
-                <a:ea typeface="굴림체" pitchFamily="49" charset="-127"/>
-              </a:rPr>
-              <a:t>(</a:t>
-            </a:r>
-            <a:r>
-              <a:rPr lang="ko-KR" altLang="en-US" sz="1400" dirty="0" smtClean="0">
-                <a:latin typeface="굴림체" pitchFamily="49" charset="-127"/>
-                <a:ea typeface="굴림체" pitchFamily="49" charset="-127"/>
-              </a:rPr>
-              <a:t>끝나는 나이</a:t>
-            </a:r>
-            <a:r>
-              <a:rPr lang="en-US" altLang="ko-KR" sz="1400" dirty="0" smtClean="0">
-                <a:latin typeface="굴림체" pitchFamily="49" charset="-127"/>
-                <a:ea typeface="굴림체" pitchFamily="49" charset="-127"/>
-              </a:rPr>
-              <a:t>)</a:t>
-            </a:r>
-          </a:p>
-          <a:p>
-            <a:pPr marL="0" indent="0">
-              <a:buNone/>
+              <a:t>  </a:t>
+            </a:r>
+            <a:endParaRPr lang="en-US" altLang="ko-KR" sz="1400" dirty="0">
+              <a:latin typeface="굴림체" pitchFamily="49" charset="-127"/>
+              <a:ea typeface="굴림체" pitchFamily="49" charset="-127"/>
+            </a:endParaRPr>
+          </a:p>
+          <a:p>
+            <a:pPr marL="457200" indent="-457200">
+              <a:buAutoNum type="arabicPeriod"/>
             </a:pPr>
             <a:endParaRPr lang="en-US" altLang="ko-KR" sz="1400" dirty="0" smtClean="0">
               <a:latin typeface="굴림체" pitchFamily="49" charset="-127"/>
@@ -4616,148 +4502,16 @@
             <a:pPr marL="0" indent="0">
               <a:buNone/>
             </a:pPr>
-            <a:r>
-              <a:rPr lang="en-US" altLang="ko-KR" sz="1400" dirty="0" smtClean="0">
-                <a:latin typeface="굴림체" pitchFamily="49" charset="-127"/>
-                <a:ea typeface="굴림체" pitchFamily="49" charset="-127"/>
-              </a:rPr>
-              <a:t>- </a:t>
-            </a:r>
-            <a:r>
-              <a:rPr lang="ko-KR" altLang="en-US" sz="1400" dirty="0" smtClean="0">
-                <a:latin typeface="굴림체" pitchFamily="49" charset="-127"/>
-                <a:ea typeface="굴림체" pitchFamily="49" charset="-127"/>
-              </a:rPr>
-              <a:t>외적 설정</a:t>
-            </a:r>
-            <a:r>
-              <a:rPr lang="en-US" altLang="ko-KR" sz="1400" dirty="0" smtClean="0">
-                <a:latin typeface="굴림체" pitchFamily="49" charset="-127"/>
-                <a:ea typeface="굴림체" pitchFamily="49" charset="-127"/>
-              </a:rPr>
-              <a:t>: </a:t>
-            </a:r>
-            <a:r>
-              <a:rPr lang="ko-KR" altLang="en-US" sz="1400" dirty="0" smtClean="0">
-                <a:latin typeface="굴림체" pitchFamily="49" charset="-127"/>
-                <a:ea typeface="굴림체" pitchFamily="49" charset="-127"/>
-              </a:rPr>
-              <a:t>카라마츠</a:t>
-            </a:r>
-            <a:endParaRPr lang="en-US" altLang="ko-KR" sz="1400" dirty="0">
+            <a:endParaRPr lang="en-US" altLang="ko-KR" sz="1600" dirty="0" smtClean="0">
               <a:latin typeface="굴림체" pitchFamily="49" charset="-127"/>
               <a:ea typeface="굴림체" pitchFamily="49" charset="-127"/>
             </a:endParaRPr>
           </a:p>
-          <a:p>
-            <a:pPr marL="0" indent="0">
-              <a:buNone/>
-            </a:pPr>
-            <a:r>
-              <a:rPr lang="en-US" altLang="ko-KR" sz="1400" dirty="0" smtClean="0">
-                <a:latin typeface="굴림체" pitchFamily="49" charset="-127"/>
-                <a:ea typeface="굴림체" pitchFamily="49" charset="-127"/>
-              </a:rPr>
-              <a:t>	 </a:t>
-            </a:r>
-            <a:r>
-              <a:rPr lang="ko-KR" altLang="en-US" sz="1400" dirty="0" smtClean="0">
-                <a:latin typeface="굴림체" pitchFamily="49" charset="-127"/>
-                <a:ea typeface="굴림체" pitchFamily="49" charset="-127"/>
-              </a:rPr>
-              <a:t>후드 티를 입고 있다</a:t>
-            </a:r>
-            <a:r>
-              <a:rPr lang="en-US" altLang="ko-KR" sz="1400" dirty="0" smtClean="0">
-                <a:latin typeface="굴림체" pitchFamily="49" charset="-127"/>
-                <a:ea typeface="굴림체" pitchFamily="49" charset="-127"/>
-              </a:rPr>
-              <a:t>.</a:t>
-            </a:r>
-          </a:p>
-          <a:p>
-            <a:pPr marL="0" indent="0">
-              <a:buNone/>
-            </a:pPr>
-            <a:endParaRPr lang="en-US" altLang="ko-KR" sz="1400" dirty="0" smtClean="0">
-              <a:latin typeface="굴림체" pitchFamily="49" charset="-127"/>
-              <a:ea typeface="굴림체" pitchFamily="49" charset="-127"/>
-            </a:endParaRPr>
-          </a:p>
-          <a:p>
-            <a:pPr marL="0" indent="0">
-              <a:buNone/>
-            </a:pPr>
-            <a:r>
-              <a:rPr lang="en-US" altLang="ko-KR" sz="1400" dirty="0" smtClean="0">
-                <a:latin typeface="굴림체" pitchFamily="49" charset="-127"/>
-                <a:ea typeface="굴림체" pitchFamily="49" charset="-127"/>
-              </a:rPr>
-              <a:t>- </a:t>
-            </a:r>
-            <a:r>
-              <a:rPr lang="ko-KR" altLang="en-US" sz="1400" dirty="0" smtClean="0">
-                <a:latin typeface="굴림체" pitchFamily="49" charset="-127"/>
-                <a:ea typeface="굴림체" pitchFamily="49" charset="-127"/>
-              </a:rPr>
-              <a:t>내적 설정</a:t>
-            </a:r>
-            <a:r>
-              <a:rPr lang="en-US" altLang="ko-KR" sz="1400" dirty="0" smtClean="0">
-                <a:latin typeface="굴림체" pitchFamily="49" charset="-127"/>
-                <a:ea typeface="굴림체" pitchFamily="49" charset="-127"/>
-              </a:rPr>
-              <a:t>: </a:t>
-            </a:r>
-            <a:r>
-              <a:rPr lang="ko-KR" altLang="en-US" sz="1400" dirty="0" smtClean="0">
-                <a:latin typeface="굴림체" pitchFamily="49" charset="-127"/>
-                <a:ea typeface="굴림체" pitchFamily="49" charset="-127"/>
-              </a:rPr>
-              <a:t>카라마츠</a:t>
-            </a:r>
-            <a:endParaRPr lang="en-US" altLang="ko-KR" sz="1400" dirty="0" smtClean="0">
-              <a:latin typeface="굴림체" pitchFamily="49" charset="-127"/>
-              <a:ea typeface="굴림체" pitchFamily="49" charset="-127"/>
-            </a:endParaRPr>
-          </a:p>
-          <a:p>
-            <a:pPr marL="0" indent="0">
-              <a:buNone/>
-            </a:pPr>
-            <a:endParaRPr lang="en-US" altLang="ko-KR" sz="1400" dirty="0" smtClean="0">
-              <a:latin typeface="굴림체" pitchFamily="49" charset="-127"/>
-              <a:ea typeface="굴림체" pitchFamily="49" charset="-127"/>
-            </a:endParaRPr>
-          </a:p>
-          <a:p>
-            <a:pPr marL="0" indent="0">
-              <a:buNone/>
-            </a:pPr>
-            <a:r>
-              <a:rPr lang="en-US" altLang="ko-KR" sz="1400" dirty="0" smtClean="0">
-                <a:latin typeface="굴림체" pitchFamily="49" charset="-127"/>
-                <a:ea typeface="굴림체" pitchFamily="49" charset="-127"/>
-              </a:rPr>
-              <a:t>※</a:t>
-            </a:r>
-            <a:r>
-              <a:rPr lang="ko-KR" altLang="en-US" sz="1400" dirty="0" smtClean="0">
-                <a:latin typeface="굴림체" pitchFamily="49" charset="-127"/>
-                <a:ea typeface="굴림체" pitchFamily="49" charset="-127"/>
-              </a:rPr>
-              <a:t>인선이에게 참고</a:t>
-            </a:r>
-            <a:endParaRPr lang="en-US" altLang="ko-KR" sz="1400" dirty="0">
-              <a:latin typeface="굴림체" pitchFamily="49" charset="-127"/>
-              <a:ea typeface="굴림체" pitchFamily="49" charset="-127"/>
-            </a:endParaRPr>
-          </a:p>
-        </p:txBody>
-      </p:sp>
-      <p:sp>
-        <p:nvSpPr>
-          <p:cNvPr id="2" name="슬라이드 번호 개체 틀 1"/>
+        </p:txBody>
+      </p:sp>
+      <p:sp>
+        <p:nvSpPr>
+          <p:cNvPr id="4" name="슬라이드 번호 개체 틀 3"/>
           <p:cNvSpPr>
             <a:spLocks noGrp="1"/>
           </p:cNvSpPr>
@@ -4781,7 +4535,7 @@
     </p:spTree>
     <p:extLst>
       <p:ext uri="{BB962C8B-B14F-4D97-AF65-F5344CB8AC3E}">
-        <p14:creationId xmlns:p14="http://schemas.microsoft.com/office/powerpoint/2010/main" val="1527275268"/>
+        <p14:creationId xmlns:p14="http://schemas.microsoft.com/office/powerpoint/2010/main" val="2433871538"/>
       </p:ext>
     </p:extLst>
   </p:cSld>
@@ -4845,287 +4599,16 @@
                 <a:latin typeface="굴림체" pitchFamily="49" charset="-127"/>
                 <a:ea typeface="굴림체" pitchFamily="49" charset="-127"/>
               </a:rPr>
-              <a:t>3. </a:t>
+              <a:t>2. </a:t>
             </a:r>
             <a:r>
               <a:rPr lang="ko-KR" altLang="en-US" sz="2000" dirty="0" smtClean="0">
                 <a:latin typeface="굴림체" pitchFamily="49" charset="-127"/>
                 <a:ea typeface="굴림체" pitchFamily="49" charset="-127"/>
               </a:rPr>
-              <a:t>게임 시스템</a:t>
+              <a:t>캐릭터 설정 및 특징</a:t>
             </a:r>
             <a:endParaRPr lang="en-US" altLang="ko-KR" sz="2000" dirty="0" smtClean="0">
-              <a:latin typeface="굴림체" pitchFamily="49" charset="-127"/>
-              <a:ea typeface="굴림체" pitchFamily="49" charset="-127"/>
-            </a:endParaRPr>
-          </a:p>
-          <a:p>
-            <a:pPr marL="0" indent="0">
-              <a:buNone/>
-            </a:pPr>
-            <a:endParaRPr lang="en-US" altLang="ko-KR" sz="1600" dirty="0" smtClean="0">
-              <a:latin typeface="굴림체" pitchFamily="49" charset="-127"/>
-              <a:ea typeface="굴림체" pitchFamily="49" charset="-127"/>
-            </a:endParaRPr>
-          </a:p>
-          <a:p>
-            <a:pPr marL="0" indent="0">
-              <a:buNone/>
-            </a:pPr>
-            <a:r>
-              <a:rPr lang="en-US" altLang="ko-KR" sz="1400" b="1" dirty="0" smtClean="0">
-                <a:latin typeface="굴림체" pitchFamily="49" charset="-127"/>
-                <a:ea typeface="굴림체" pitchFamily="49" charset="-127"/>
-              </a:rPr>
-              <a:t>3.1 </a:t>
-            </a:r>
-            <a:r>
-              <a:rPr lang="ko-KR" altLang="en-US" sz="1400" b="1" dirty="0" smtClean="0">
-                <a:latin typeface="굴림체" pitchFamily="49" charset="-127"/>
-                <a:ea typeface="굴림체" pitchFamily="49" charset="-127"/>
-              </a:rPr>
-              <a:t>플랫폼</a:t>
-            </a:r>
-            <a:r>
-              <a:rPr lang="en-US" altLang="ko-KR" sz="1400" b="1" dirty="0" smtClean="0">
-                <a:latin typeface="굴림체" pitchFamily="49" charset="-127"/>
-                <a:ea typeface="굴림체" pitchFamily="49" charset="-127"/>
-              </a:rPr>
-              <a:t>: </a:t>
-            </a:r>
-            <a:r>
-              <a:rPr lang="en-US" altLang="ko-KR" sz="1400" dirty="0" smtClean="0">
-                <a:latin typeface="굴림체" pitchFamily="49" charset="-127"/>
-                <a:ea typeface="굴림체" pitchFamily="49" charset="-127"/>
-              </a:rPr>
-              <a:t>PC</a:t>
-            </a:r>
-          </a:p>
-          <a:p>
-            <a:pPr marL="0" indent="0">
-              <a:buNone/>
-            </a:pPr>
-            <a:endParaRPr lang="en-US" altLang="ko-KR" sz="1400" dirty="0">
-              <a:latin typeface="굴림체" pitchFamily="49" charset="-127"/>
-              <a:ea typeface="굴림체" pitchFamily="49" charset="-127"/>
-            </a:endParaRPr>
-          </a:p>
-          <a:p>
-            <a:pPr marL="0" indent="0">
-              <a:buNone/>
-            </a:pPr>
-            <a:r>
-              <a:rPr lang="en-US" altLang="ko-KR" sz="1400" b="1" dirty="0" smtClean="0">
-                <a:latin typeface="굴림체" pitchFamily="49" charset="-127"/>
-                <a:ea typeface="굴림체" pitchFamily="49" charset="-127"/>
-              </a:rPr>
-              <a:t>3.2 UI</a:t>
-            </a:r>
-          </a:p>
-          <a:p>
-            <a:pPr marL="0" indent="0">
-              <a:buNone/>
-            </a:pPr>
-            <a:endParaRPr lang="en-US" altLang="ko-KR" sz="1400" b="1" dirty="0">
-              <a:latin typeface="굴림체" pitchFamily="49" charset="-127"/>
-              <a:ea typeface="굴림체" pitchFamily="49" charset="-127"/>
-            </a:endParaRPr>
-          </a:p>
-          <a:p>
-            <a:pPr marL="0" indent="0">
-              <a:buNone/>
-            </a:pPr>
-            <a:r>
-              <a:rPr lang="en-US" altLang="ko-KR" sz="1400" b="1" dirty="0" smtClean="0">
-                <a:latin typeface="굴림체" pitchFamily="49" charset="-127"/>
-                <a:ea typeface="굴림체" pitchFamily="49" charset="-127"/>
-              </a:rPr>
-              <a:t>3.3 </a:t>
-            </a:r>
-            <a:r>
-              <a:rPr lang="ko-KR" altLang="en-US" sz="1400" b="1" dirty="0" smtClean="0">
-                <a:latin typeface="굴림체" pitchFamily="49" charset="-127"/>
-                <a:ea typeface="굴림체" pitchFamily="49" charset="-127"/>
-              </a:rPr>
-              <a:t>플레이방식</a:t>
-            </a:r>
-            <a:endParaRPr lang="en-US" altLang="ko-KR" sz="1400" b="1" dirty="0" smtClean="0">
-              <a:latin typeface="굴림체" pitchFamily="49" charset="-127"/>
-              <a:ea typeface="굴림체" pitchFamily="49" charset="-127"/>
-            </a:endParaRPr>
-          </a:p>
-          <a:p>
-            <a:pPr marL="0" indent="0">
-              <a:buNone/>
-            </a:pPr>
-            <a:r>
-              <a:rPr lang="en-US" altLang="ko-KR" sz="1400" dirty="0">
-                <a:latin typeface="굴림체" pitchFamily="49" charset="-127"/>
-                <a:ea typeface="굴림체" pitchFamily="49" charset="-127"/>
-              </a:rPr>
-              <a:t> </a:t>
-            </a:r>
-            <a:r>
-              <a:rPr lang="en-US" altLang="ko-KR" sz="1400" dirty="0" smtClean="0">
-                <a:latin typeface="굴림체" pitchFamily="49" charset="-127"/>
-                <a:ea typeface="굴림체" pitchFamily="49" charset="-127"/>
-              </a:rPr>
-              <a:t>   3.3.1 </a:t>
-            </a:r>
-            <a:r>
-              <a:rPr lang="ko-KR" altLang="en-US" sz="1400" dirty="0" smtClean="0">
-                <a:latin typeface="굴림체" pitchFamily="49" charset="-127"/>
-                <a:ea typeface="굴림체" pitchFamily="49" charset="-127"/>
-              </a:rPr>
-              <a:t>능력치 종류</a:t>
-            </a:r>
-            <a:endParaRPr lang="en-US" altLang="ko-KR" sz="1400" dirty="0" smtClean="0">
-              <a:latin typeface="굴림체" pitchFamily="49" charset="-127"/>
-              <a:ea typeface="굴림체" pitchFamily="49" charset="-127"/>
-            </a:endParaRPr>
-          </a:p>
-          <a:p>
-            <a:pPr marL="0" indent="0">
-              <a:buNone/>
-            </a:pPr>
-            <a:r>
-              <a:rPr lang="en-US" altLang="ko-KR" sz="1400" dirty="0" smtClean="0">
-                <a:latin typeface="굴림체" pitchFamily="49" charset="-127"/>
-                <a:ea typeface="굴림체" pitchFamily="49" charset="-127"/>
-              </a:rPr>
-              <a:t>	3.3.1 </a:t>
-            </a:r>
-            <a:r>
-              <a:rPr lang="ko-KR" altLang="en-US" sz="1400" dirty="0" smtClean="0">
-                <a:latin typeface="굴림체" pitchFamily="49" charset="-127"/>
-                <a:ea typeface="굴림체" pitchFamily="49" charset="-127"/>
-              </a:rPr>
-              <a:t>능력치 종류</a:t>
-            </a:r>
-            <a:endParaRPr lang="en-US" altLang="ko-KR" sz="1400" dirty="0" smtClean="0">
-              <a:latin typeface="굴림체" pitchFamily="49" charset="-127"/>
-              <a:ea typeface="굴림체" pitchFamily="49" charset="-127"/>
-            </a:endParaRPr>
-          </a:p>
-          <a:p>
-            <a:pPr marL="0" indent="0">
-              <a:buNone/>
-            </a:pPr>
-            <a:r>
-              <a:rPr lang="en-US" altLang="ko-KR" sz="1400" dirty="0" smtClean="0">
-                <a:latin typeface="굴림체" pitchFamily="49" charset="-127"/>
-                <a:ea typeface="굴림체" pitchFamily="49" charset="-127"/>
-              </a:rPr>
-              <a:t>	3.3.2 </a:t>
-            </a:r>
-            <a:r>
-              <a:rPr lang="ko-KR" altLang="en-US" sz="1400" dirty="0" smtClean="0">
-                <a:latin typeface="굴림체" pitchFamily="49" charset="-127"/>
-                <a:ea typeface="굴림체" pitchFamily="49" charset="-127"/>
-              </a:rPr>
-              <a:t>아르바이트 종류</a:t>
-            </a:r>
-            <a:r>
-              <a:rPr lang="en-US" altLang="ko-KR" sz="1400" dirty="0" smtClean="0">
-                <a:latin typeface="굴림체" pitchFamily="49" charset="-127"/>
-                <a:ea typeface="굴림체" pitchFamily="49" charset="-127"/>
-              </a:rPr>
-              <a:t>/</a:t>
-            </a:r>
-            <a:r>
-              <a:rPr lang="ko-KR" altLang="en-US" sz="1400" dirty="0" smtClean="0">
-                <a:latin typeface="굴림체" pitchFamily="49" charset="-127"/>
-                <a:ea typeface="굴림체" pitchFamily="49" charset="-127"/>
-              </a:rPr>
-              <a:t>조건</a:t>
-            </a:r>
-            <a:r>
-              <a:rPr lang="en-US" altLang="ko-KR" sz="1400" dirty="0" smtClean="0">
-                <a:latin typeface="굴림체" pitchFamily="49" charset="-127"/>
-                <a:ea typeface="굴림체" pitchFamily="49" charset="-127"/>
-              </a:rPr>
-              <a:t>/</a:t>
-            </a:r>
-            <a:r>
-              <a:rPr lang="ko-KR" altLang="en-US" sz="1400" dirty="0" smtClean="0">
-                <a:latin typeface="굴림체" pitchFamily="49" charset="-127"/>
-                <a:ea typeface="굴림체" pitchFamily="49" charset="-127"/>
-              </a:rPr>
-              <a:t>수입금</a:t>
-            </a:r>
-            <a:r>
-              <a:rPr lang="en-US" altLang="ko-KR" sz="1400" dirty="0" smtClean="0">
-                <a:latin typeface="굴림체" pitchFamily="49" charset="-127"/>
-                <a:ea typeface="굴림체" pitchFamily="49" charset="-127"/>
-              </a:rPr>
-              <a:t>/</a:t>
-            </a:r>
-            <a:r>
-              <a:rPr lang="ko-KR" altLang="en-US" sz="1400" dirty="0" smtClean="0">
-                <a:latin typeface="굴림체" pitchFamily="49" charset="-127"/>
-                <a:ea typeface="굴림체" pitchFamily="49" charset="-127"/>
-              </a:rPr>
-              <a:t>성공</a:t>
-            </a:r>
-            <a:r>
-              <a:rPr lang="en-US" altLang="ko-KR" sz="1400" dirty="0" smtClean="0">
-                <a:latin typeface="굴림체" pitchFamily="49" charset="-127"/>
-                <a:ea typeface="굴림체" pitchFamily="49" charset="-127"/>
-              </a:rPr>
-              <a:t>,</a:t>
-            </a:r>
-            <a:r>
-              <a:rPr lang="ko-KR" altLang="en-US" sz="1400" dirty="0" smtClean="0">
-                <a:latin typeface="굴림체" pitchFamily="49" charset="-127"/>
-                <a:ea typeface="굴림체" pitchFamily="49" charset="-127"/>
-              </a:rPr>
-              <a:t>실패 확률</a:t>
-            </a:r>
-            <a:endParaRPr lang="en-US" altLang="ko-KR" sz="1400" dirty="0" smtClean="0">
-              <a:latin typeface="굴림체" pitchFamily="49" charset="-127"/>
-              <a:ea typeface="굴림체" pitchFamily="49" charset="-127"/>
-            </a:endParaRPr>
-          </a:p>
-          <a:p>
-            <a:pPr marL="0" indent="0">
-              <a:buNone/>
-            </a:pPr>
-            <a:r>
-              <a:rPr lang="en-US" altLang="ko-KR" sz="1400" dirty="0" smtClean="0">
-                <a:latin typeface="굴림체" pitchFamily="49" charset="-127"/>
-                <a:ea typeface="굴림체" pitchFamily="49" charset="-127"/>
-              </a:rPr>
-              <a:t>	3.3.3 </a:t>
-            </a:r>
-            <a:r>
-              <a:rPr lang="ko-KR" altLang="en-US" sz="1400" dirty="0" err="1" smtClean="0">
-                <a:latin typeface="굴림체" pitchFamily="49" charset="-127"/>
-                <a:ea typeface="굴림체" pitchFamily="49" charset="-127"/>
-              </a:rPr>
-              <a:t>엔딩</a:t>
-            </a:r>
-            <a:r>
-              <a:rPr lang="ko-KR" altLang="en-US" sz="1400" dirty="0" smtClean="0">
-                <a:latin typeface="굴림체" pitchFamily="49" charset="-127"/>
-                <a:ea typeface="굴림체" pitchFamily="49" charset="-127"/>
-              </a:rPr>
-              <a:t> 종류</a:t>
-            </a:r>
-            <a:r>
-              <a:rPr lang="en-US" altLang="ko-KR" sz="1400" dirty="0" smtClean="0">
-                <a:latin typeface="굴림체" pitchFamily="49" charset="-127"/>
-                <a:ea typeface="굴림체" pitchFamily="49" charset="-127"/>
-              </a:rPr>
-              <a:t>/</a:t>
-            </a:r>
-            <a:r>
-              <a:rPr lang="ko-KR" altLang="en-US" sz="1400" dirty="0" smtClean="0">
-                <a:latin typeface="굴림체" pitchFamily="49" charset="-127"/>
-                <a:ea typeface="굴림체" pitchFamily="49" charset="-127"/>
-              </a:rPr>
-              <a:t>조건</a:t>
-            </a:r>
-            <a:endParaRPr lang="en-US" altLang="ko-KR" sz="1400" dirty="0">
               <a:latin typeface="굴림체" pitchFamily="49" charset="-127"/>
               <a:ea typeface="굴림체" pitchFamily="49" charset="-127"/>
             </a:endParaRPr>
@@ -5143,7 +4626,244 @@
             <a:pPr marL="0" indent="0">
               <a:buNone/>
             </a:pPr>
-            <a:endParaRPr lang="en-US" altLang="ko-KR" sz="1600" dirty="0" smtClean="0">
+            <a:r>
+              <a:rPr lang="en-US" altLang="ko-KR" sz="1400" dirty="0" smtClean="0">
+                <a:latin typeface="굴림체" pitchFamily="49" charset="-127"/>
+                <a:ea typeface="굴림체" pitchFamily="49" charset="-127"/>
+              </a:rPr>
+              <a:t>- </a:t>
+            </a:r>
+            <a:r>
+              <a:rPr lang="ko-KR" altLang="en-US" sz="1400" dirty="0" smtClean="0">
+                <a:latin typeface="굴림체" pitchFamily="49" charset="-127"/>
+                <a:ea typeface="굴림체" pitchFamily="49" charset="-127"/>
+              </a:rPr>
+              <a:t>나이</a:t>
+            </a:r>
+            <a:r>
+              <a:rPr lang="en-US" altLang="ko-KR" sz="1400" dirty="0" smtClean="0">
+                <a:latin typeface="굴림체" pitchFamily="49" charset="-127"/>
+                <a:ea typeface="굴림체" pitchFamily="49" charset="-127"/>
+              </a:rPr>
+              <a:t>:</a:t>
+            </a:r>
+            <a:r>
+              <a:rPr lang="ko-KR" altLang="en-US" sz="1400" dirty="0" smtClean="0">
+                <a:latin typeface="굴림체" pitchFamily="49" charset="-127"/>
+                <a:ea typeface="굴림체" pitchFamily="49" charset="-127"/>
+              </a:rPr>
+              <a:t> </a:t>
+            </a:r>
+            <a:r>
+              <a:rPr lang="en-US" altLang="ko-KR" sz="1400" dirty="0" smtClean="0">
+                <a:latin typeface="굴림체" pitchFamily="49" charset="-127"/>
+                <a:ea typeface="굴림체" pitchFamily="49" charset="-127"/>
+              </a:rPr>
+              <a:t>12</a:t>
+            </a:r>
+            <a:r>
+              <a:rPr lang="ko-KR" altLang="en-US" sz="1400" dirty="0" smtClean="0">
+                <a:latin typeface="굴림체" pitchFamily="49" charset="-127"/>
+                <a:ea typeface="굴림체" pitchFamily="49" charset="-127"/>
+              </a:rPr>
+              <a:t>살</a:t>
+            </a:r>
+            <a:r>
+              <a:rPr lang="en-US" altLang="ko-KR" sz="1400" dirty="0" smtClean="0">
+                <a:latin typeface="굴림체" pitchFamily="49" charset="-127"/>
+                <a:ea typeface="굴림체" pitchFamily="49" charset="-127"/>
+              </a:rPr>
+              <a:t>(</a:t>
+            </a:r>
+            <a:r>
+              <a:rPr lang="ko-KR" altLang="en-US" sz="1400" dirty="0" smtClean="0">
+                <a:latin typeface="굴림체" pitchFamily="49" charset="-127"/>
+                <a:ea typeface="굴림체" pitchFamily="49" charset="-127"/>
+              </a:rPr>
+              <a:t>시작 나이</a:t>
+            </a:r>
+            <a:r>
+              <a:rPr lang="en-US" altLang="ko-KR" sz="1400" dirty="0" smtClean="0">
+                <a:latin typeface="굴림체" pitchFamily="49" charset="-127"/>
+                <a:ea typeface="굴림체" pitchFamily="49" charset="-127"/>
+              </a:rPr>
+              <a:t>)~20</a:t>
+            </a:r>
+            <a:r>
+              <a:rPr lang="ko-KR" altLang="en-US" sz="1400" dirty="0" smtClean="0">
+                <a:latin typeface="굴림체" pitchFamily="49" charset="-127"/>
+                <a:ea typeface="굴림체" pitchFamily="49" charset="-127"/>
+              </a:rPr>
+              <a:t>상</a:t>
+            </a:r>
+            <a:r>
+              <a:rPr lang="en-US" altLang="ko-KR" sz="1400" dirty="0" smtClean="0">
+                <a:latin typeface="굴림체" pitchFamily="49" charset="-127"/>
+                <a:ea typeface="굴림체" pitchFamily="49" charset="-127"/>
+              </a:rPr>
+              <a:t>(</a:t>
+            </a:r>
+            <a:r>
+              <a:rPr lang="ko-KR" altLang="en-US" sz="1400" dirty="0" smtClean="0">
+                <a:latin typeface="굴림체" pitchFamily="49" charset="-127"/>
+                <a:ea typeface="굴림체" pitchFamily="49" charset="-127"/>
+              </a:rPr>
+              <a:t>끝나는 나이</a:t>
+            </a:r>
+            <a:r>
+              <a:rPr lang="en-US" altLang="ko-KR" sz="1400" dirty="0" smtClean="0">
+                <a:latin typeface="굴림체" pitchFamily="49" charset="-127"/>
+                <a:ea typeface="굴림체" pitchFamily="49" charset="-127"/>
+              </a:rPr>
+              <a:t>)</a:t>
+            </a:r>
+          </a:p>
+          <a:p>
+            <a:pPr marL="0" indent="0">
+              <a:buNone/>
+            </a:pPr>
+            <a:endParaRPr lang="en-US" altLang="ko-KR" sz="1400" dirty="0" smtClean="0">
+              <a:latin typeface="굴림체" pitchFamily="49" charset="-127"/>
+              <a:ea typeface="굴림체" pitchFamily="49" charset="-127"/>
+            </a:endParaRPr>
+          </a:p>
+          <a:p>
+            <a:pPr marL="0" indent="0">
+              <a:buNone/>
+            </a:pPr>
+            <a:r>
+              <a:rPr lang="en-US" altLang="ko-KR" sz="1400" dirty="0" smtClean="0">
+                <a:latin typeface="굴림체" pitchFamily="49" charset="-127"/>
+                <a:ea typeface="굴림체" pitchFamily="49" charset="-127"/>
+              </a:rPr>
+              <a:t>- </a:t>
+            </a:r>
+            <a:r>
+              <a:rPr lang="ko-KR" altLang="en-US" sz="1400" dirty="0" smtClean="0">
+                <a:latin typeface="굴림체" pitchFamily="49" charset="-127"/>
+                <a:ea typeface="굴림체" pitchFamily="49" charset="-127"/>
+              </a:rPr>
+              <a:t>외적 설정</a:t>
+            </a:r>
+            <a:r>
+              <a:rPr lang="en-US" altLang="ko-KR" sz="1400" dirty="0" smtClean="0">
+                <a:latin typeface="굴림체" pitchFamily="49" charset="-127"/>
+                <a:ea typeface="굴림체" pitchFamily="49" charset="-127"/>
+              </a:rPr>
+              <a:t>: </a:t>
+            </a:r>
+            <a:r>
+              <a:rPr lang="ko-KR" altLang="en-US" sz="1400" dirty="0" smtClean="0">
+                <a:latin typeface="굴림체" pitchFamily="49" charset="-127"/>
+                <a:ea typeface="굴림체" pitchFamily="49" charset="-127"/>
+              </a:rPr>
+              <a:t>카라마츠</a:t>
+            </a:r>
+            <a:endParaRPr lang="en-US" altLang="ko-KR" sz="1400" dirty="0">
+              <a:latin typeface="굴림체" pitchFamily="49" charset="-127"/>
+              <a:ea typeface="굴림체" pitchFamily="49" charset="-127"/>
+            </a:endParaRPr>
+          </a:p>
+          <a:p>
+            <a:pPr marL="0" indent="0">
+              <a:buNone/>
+            </a:pPr>
+            <a:r>
+              <a:rPr lang="en-US" altLang="ko-KR" sz="1400" dirty="0" smtClean="0">
+                <a:latin typeface="굴림체" pitchFamily="49" charset="-127"/>
+                <a:ea typeface="굴림체" pitchFamily="49" charset="-127"/>
+              </a:rPr>
+              <a:t>	 </a:t>
+            </a:r>
+            <a:r>
+              <a:rPr lang="ko-KR" altLang="en-US" sz="1400" dirty="0" smtClean="0">
+                <a:latin typeface="굴림체" pitchFamily="49" charset="-127"/>
+                <a:ea typeface="굴림체" pitchFamily="49" charset="-127"/>
+              </a:rPr>
+              <a:t>후드 티를 입고 있다</a:t>
+            </a:r>
+            <a:r>
+              <a:rPr lang="en-US" altLang="ko-KR" sz="1400" dirty="0" smtClean="0">
+                <a:latin typeface="굴림체" pitchFamily="49" charset="-127"/>
+                <a:ea typeface="굴림체" pitchFamily="49" charset="-127"/>
+              </a:rPr>
+              <a:t>.</a:t>
+            </a:r>
+          </a:p>
+          <a:p>
+            <a:pPr marL="0" indent="0">
+              <a:buNone/>
+            </a:pPr>
+            <a:endParaRPr lang="en-US" altLang="ko-KR" sz="1400" dirty="0" smtClean="0">
+              <a:latin typeface="굴림체" pitchFamily="49" charset="-127"/>
+              <a:ea typeface="굴림체" pitchFamily="49" charset="-127"/>
+            </a:endParaRPr>
+          </a:p>
+          <a:p>
+            <a:pPr marL="0" indent="0">
+              <a:buNone/>
+            </a:pPr>
+            <a:r>
+              <a:rPr lang="en-US" altLang="ko-KR" sz="1400" dirty="0" smtClean="0">
+                <a:latin typeface="굴림체" pitchFamily="49" charset="-127"/>
+                <a:ea typeface="굴림체" pitchFamily="49" charset="-127"/>
+              </a:rPr>
+              <a:t>- </a:t>
+            </a:r>
+            <a:r>
+              <a:rPr lang="ko-KR" altLang="en-US" sz="1400" dirty="0" smtClean="0">
+                <a:latin typeface="굴림체" pitchFamily="49" charset="-127"/>
+                <a:ea typeface="굴림체" pitchFamily="49" charset="-127"/>
+              </a:rPr>
+              <a:t>내적 설정</a:t>
+            </a:r>
+            <a:r>
+              <a:rPr lang="en-US" altLang="ko-KR" sz="1400" dirty="0" smtClean="0">
+                <a:latin typeface="굴림체" pitchFamily="49" charset="-127"/>
+                <a:ea typeface="굴림체" pitchFamily="49" charset="-127"/>
+              </a:rPr>
+              <a:t>: </a:t>
+            </a:r>
+            <a:r>
+              <a:rPr lang="ko-KR" altLang="en-US" sz="1400" dirty="0" smtClean="0">
+                <a:latin typeface="굴림체" pitchFamily="49" charset="-127"/>
+                <a:ea typeface="굴림체" pitchFamily="49" charset="-127"/>
+              </a:rPr>
+              <a:t>카라마츠</a:t>
+            </a:r>
+            <a:endParaRPr lang="en-US" altLang="ko-KR" sz="1400" dirty="0" smtClean="0">
+              <a:latin typeface="굴림체" pitchFamily="49" charset="-127"/>
+              <a:ea typeface="굴림체" pitchFamily="49" charset="-127"/>
+            </a:endParaRPr>
+          </a:p>
+          <a:p>
+            <a:pPr marL="0" indent="0">
+              <a:buNone/>
+            </a:pPr>
+            <a:endParaRPr lang="en-US" altLang="ko-KR" sz="1400" dirty="0" smtClean="0">
+              <a:latin typeface="굴림체" pitchFamily="49" charset="-127"/>
+              <a:ea typeface="굴림체" pitchFamily="49" charset="-127"/>
+            </a:endParaRPr>
+          </a:p>
+          <a:p>
+            <a:pPr marL="0" indent="0">
+              <a:buNone/>
+            </a:pPr>
+            <a:r>
+              <a:rPr lang="en-US" altLang="ko-KR" sz="1400" dirty="0" smtClean="0">
+                <a:latin typeface="굴림체" pitchFamily="49" charset="-127"/>
+                <a:ea typeface="굴림체" pitchFamily="49" charset="-127"/>
+              </a:rPr>
+              <a:t>※</a:t>
+            </a:r>
+            <a:r>
+              <a:rPr lang="ko-KR" altLang="en-US" sz="1400" dirty="0" smtClean="0">
+                <a:latin typeface="굴림체" pitchFamily="49" charset="-127"/>
+                <a:ea typeface="굴림체" pitchFamily="49" charset="-127"/>
+              </a:rPr>
+              <a:t>인선이에게 참고</a:t>
+            </a:r>
+            <a:endParaRPr lang="en-US" altLang="ko-KR" sz="1400" dirty="0">
               <a:latin typeface="굴림체" pitchFamily="49" charset="-127"/>
               <a:ea typeface="굴림체" pitchFamily="49" charset="-127"/>
             </a:endParaRPr>
@@ -5240,14 +4960,14 @@
                 <a:latin typeface="굴림체" pitchFamily="49" charset="-127"/>
                 <a:ea typeface="굴림체" pitchFamily="49" charset="-127"/>
               </a:rPr>
-              <a:t>4. </a:t>
+              <a:t>3. </a:t>
             </a:r>
             <a:r>
               <a:rPr lang="ko-KR" altLang="en-US" sz="2000" dirty="0" smtClean="0">
                 <a:latin typeface="굴림체" pitchFamily="49" charset="-127"/>
                 <a:ea typeface="굴림체" pitchFamily="49" charset="-127"/>
               </a:rPr>
-              <a:t>아이템 및 장비</a:t>
+              <a:t>게임 시스템</a:t>
             </a:r>
             <a:endParaRPr lang="en-US" altLang="ko-KR" sz="2000" dirty="0" smtClean="0">
               <a:latin typeface="굴림체" pitchFamily="49" charset="-127"/>
@@ -5255,8 +4975,279 @@
             </a:endParaRPr>
           </a:p>
           <a:p>
-            <a:pPr marL="457200" indent="-457200">
-              <a:buAutoNum type="arabicPeriod"/>
+            <a:pPr marL="0" indent="0">
+              <a:buNone/>
+            </a:pPr>
+            <a:endParaRPr lang="en-US" altLang="ko-KR" sz="1600" dirty="0" smtClean="0">
+              <a:latin typeface="굴림체" pitchFamily="49" charset="-127"/>
+              <a:ea typeface="굴림체" pitchFamily="49" charset="-127"/>
+            </a:endParaRPr>
+          </a:p>
+          <a:p>
+            <a:pPr marL="0" indent="0">
+              <a:buNone/>
+            </a:pPr>
+            <a:r>
+              <a:rPr lang="en-US" altLang="ko-KR" sz="1400" b="1" dirty="0" smtClean="0">
+                <a:latin typeface="굴림체" pitchFamily="49" charset="-127"/>
+                <a:ea typeface="굴림체" pitchFamily="49" charset="-127"/>
+              </a:rPr>
+              <a:t>3.1 </a:t>
+            </a:r>
+            <a:r>
+              <a:rPr lang="ko-KR" altLang="en-US" sz="1400" b="1" dirty="0" smtClean="0">
+                <a:latin typeface="굴림체" pitchFamily="49" charset="-127"/>
+                <a:ea typeface="굴림체" pitchFamily="49" charset="-127"/>
+              </a:rPr>
+              <a:t>플랫폼</a:t>
+            </a:r>
+            <a:r>
+              <a:rPr lang="en-US" altLang="ko-KR" sz="1400" b="1" dirty="0" smtClean="0">
+                <a:latin typeface="굴림체" pitchFamily="49" charset="-127"/>
+                <a:ea typeface="굴림체" pitchFamily="49" charset="-127"/>
+              </a:rPr>
+              <a:t>: </a:t>
+            </a:r>
+            <a:r>
+              <a:rPr lang="en-US" altLang="ko-KR" sz="1400" dirty="0" smtClean="0">
+                <a:latin typeface="굴림체" pitchFamily="49" charset="-127"/>
+                <a:ea typeface="굴림체" pitchFamily="49" charset="-127"/>
+              </a:rPr>
+              <a:t>PC</a:t>
+            </a:r>
+          </a:p>
+          <a:p>
+            <a:pPr marL="0" indent="0">
+              <a:buNone/>
+            </a:pPr>
+            <a:endParaRPr lang="en-US" altLang="ko-KR" sz="1400" dirty="0">
+              <a:latin typeface="굴림체" pitchFamily="49" charset="-127"/>
+              <a:ea typeface="굴림체" pitchFamily="49" charset="-127"/>
+            </a:endParaRPr>
+          </a:p>
+          <a:p>
+            <a:pPr marL="0" indent="0">
+              <a:buNone/>
+            </a:pPr>
+            <a:r>
+              <a:rPr lang="en-US" altLang="ko-KR" sz="1400" b="1" dirty="0" smtClean="0">
+                <a:latin typeface="굴림체" pitchFamily="49" charset="-127"/>
+                <a:ea typeface="굴림체" pitchFamily="49" charset="-127"/>
+              </a:rPr>
+              <a:t>3.2 UI</a:t>
+            </a:r>
+          </a:p>
+          <a:p>
+            <a:pPr marL="0" indent="0">
+              <a:buNone/>
+            </a:pPr>
+            <a:endParaRPr lang="en-US" altLang="ko-KR" sz="1400" b="1" dirty="0">
+              <a:latin typeface="굴림체" pitchFamily="49" charset="-127"/>
+              <a:ea typeface="굴림체" pitchFamily="49" charset="-127"/>
+            </a:endParaRPr>
+          </a:p>
+          <a:p>
+            <a:pPr marL="0" indent="0">
+              <a:buNone/>
+            </a:pPr>
+            <a:r>
+              <a:rPr lang="en-US" altLang="ko-KR" sz="1400" b="1" dirty="0" smtClean="0">
+                <a:latin typeface="굴림체" pitchFamily="49" charset="-127"/>
+                <a:ea typeface="굴림체" pitchFamily="49" charset="-127"/>
+              </a:rPr>
+              <a:t>3.3 </a:t>
+            </a:r>
+            <a:r>
+              <a:rPr lang="ko-KR" altLang="en-US" sz="1400" b="1" dirty="0" smtClean="0">
+                <a:latin typeface="굴림체" pitchFamily="49" charset="-127"/>
+                <a:ea typeface="굴림체" pitchFamily="49" charset="-127"/>
+              </a:rPr>
+              <a:t>플레이방식</a:t>
+            </a:r>
+            <a:endParaRPr lang="en-US" altLang="ko-KR" sz="1400" b="1" dirty="0" smtClean="0">
+              <a:latin typeface="굴림체" pitchFamily="49" charset="-127"/>
+              <a:ea typeface="굴림체" pitchFamily="49" charset="-127"/>
+            </a:endParaRPr>
+          </a:p>
+          <a:p>
+            <a:pPr marL="0" indent="0">
+              <a:buNone/>
+            </a:pPr>
+            <a:r>
+              <a:rPr lang="en-US" altLang="ko-KR" sz="1400" dirty="0">
+                <a:latin typeface="굴림체" pitchFamily="49" charset="-127"/>
+                <a:ea typeface="굴림체" pitchFamily="49" charset="-127"/>
+              </a:rPr>
+              <a:t> </a:t>
+            </a:r>
+            <a:r>
+              <a:rPr lang="en-US" altLang="ko-KR" sz="1400" dirty="0" smtClean="0">
+                <a:latin typeface="굴림체" pitchFamily="49" charset="-127"/>
+                <a:ea typeface="굴림체" pitchFamily="49" charset="-127"/>
+              </a:rPr>
+              <a:t>   3.3.1 </a:t>
+            </a:r>
+            <a:r>
+              <a:rPr lang="ko-KR" altLang="en-US" sz="1400" dirty="0" smtClean="0">
+                <a:latin typeface="굴림체" pitchFamily="49" charset="-127"/>
+                <a:ea typeface="굴림체" pitchFamily="49" charset="-127"/>
+              </a:rPr>
+              <a:t>능력치 종류</a:t>
+            </a:r>
+            <a:endParaRPr lang="en-US" altLang="ko-KR" sz="1400" dirty="0" smtClean="0">
+              <a:latin typeface="굴림체" pitchFamily="49" charset="-127"/>
+              <a:ea typeface="굴림체" pitchFamily="49" charset="-127"/>
+            </a:endParaRPr>
+          </a:p>
+          <a:p>
+            <a:pPr marL="0" indent="0">
+              <a:buNone/>
+            </a:pPr>
+            <a:r>
+              <a:rPr lang="en-US" altLang="ko-KR" sz="1400" dirty="0" smtClean="0">
+                <a:latin typeface="굴림체" pitchFamily="49" charset="-127"/>
+                <a:ea typeface="굴림체" pitchFamily="49" charset="-127"/>
+              </a:rPr>
+              <a:t>	3.3.1 </a:t>
+            </a:r>
+            <a:r>
+              <a:rPr lang="ko-KR" altLang="en-US" sz="1400" dirty="0" smtClean="0">
+                <a:latin typeface="굴림체" pitchFamily="49" charset="-127"/>
+                <a:ea typeface="굴림체" pitchFamily="49" charset="-127"/>
+              </a:rPr>
+              <a:t>능력치 종류</a:t>
+            </a:r>
+            <a:endParaRPr lang="en-US" altLang="ko-KR" sz="1400" dirty="0" smtClean="0">
+              <a:latin typeface="굴림체" pitchFamily="49" charset="-127"/>
+              <a:ea typeface="굴림체" pitchFamily="49" charset="-127"/>
+            </a:endParaRPr>
+          </a:p>
+          <a:p>
+            <a:pPr marL="0" indent="0">
+              <a:buNone/>
+            </a:pPr>
+            <a:r>
+              <a:rPr lang="en-US" altLang="ko-KR" sz="1400" dirty="0" smtClean="0">
+                <a:latin typeface="굴림체" pitchFamily="49" charset="-127"/>
+                <a:ea typeface="굴림체" pitchFamily="49" charset="-127"/>
+              </a:rPr>
+              <a:t>	3.3.2 </a:t>
+            </a:r>
+            <a:r>
+              <a:rPr lang="ko-KR" altLang="en-US" sz="1400" dirty="0" smtClean="0">
+                <a:latin typeface="굴림체" pitchFamily="49" charset="-127"/>
+                <a:ea typeface="굴림체" pitchFamily="49" charset="-127"/>
+              </a:rPr>
+              <a:t>아르바이트 종류</a:t>
+            </a:r>
+            <a:r>
+              <a:rPr lang="en-US" altLang="ko-KR" sz="1400" dirty="0" smtClean="0">
+                <a:latin typeface="굴림체" pitchFamily="49" charset="-127"/>
+                <a:ea typeface="굴림체" pitchFamily="49" charset="-127"/>
+              </a:rPr>
+              <a:t>/</a:t>
+            </a:r>
+            <a:r>
+              <a:rPr lang="ko-KR" altLang="en-US" sz="1400" dirty="0" smtClean="0">
+                <a:latin typeface="굴림체" pitchFamily="49" charset="-127"/>
+                <a:ea typeface="굴림체" pitchFamily="49" charset="-127"/>
+              </a:rPr>
+              <a:t>조건</a:t>
+            </a:r>
+            <a:r>
+              <a:rPr lang="en-US" altLang="ko-KR" sz="1400" dirty="0" smtClean="0">
+                <a:latin typeface="굴림체" pitchFamily="49" charset="-127"/>
+                <a:ea typeface="굴림체" pitchFamily="49" charset="-127"/>
+              </a:rPr>
+              <a:t>/</a:t>
+            </a:r>
+            <a:r>
+              <a:rPr lang="ko-KR" altLang="en-US" sz="1400" dirty="0" smtClean="0">
+                <a:latin typeface="굴림체" pitchFamily="49" charset="-127"/>
+                <a:ea typeface="굴림체" pitchFamily="49" charset="-127"/>
+              </a:rPr>
+              <a:t>수입금</a:t>
+            </a:r>
+            <a:r>
+              <a:rPr lang="en-US" altLang="ko-KR" sz="1400" dirty="0" smtClean="0">
+                <a:latin typeface="굴림체" pitchFamily="49" charset="-127"/>
+                <a:ea typeface="굴림체" pitchFamily="49" charset="-127"/>
+              </a:rPr>
+              <a:t>/</a:t>
+            </a:r>
+            <a:r>
+              <a:rPr lang="ko-KR" altLang="en-US" sz="1400" dirty="0" smtClean="0">
+                <a:latin typeface="굴림체" pitchFamily="49" charset="-127"/>
+                <a:ea typeface="굴림체" pitchFamily="49" charset="-127"/>
+              </a:rPr>
+              <a:t>성공</a:t>
+            </a:r>
+            <a:r>
+              <a:rPr lang="en-US" altLang="ko-KR" sz="1400" dirty="0" smtClean="0">
+                <a:latin typeface="굴림체" pitchFamily="49" charset="-127"/>
+                <a:ea typeface="굴림체" pitchFamily="49" charset="-127"/>
+              </a:rPr>
+              <a:t>,</a:t>
+            </a:r>
+            <a:r>
+              <a:rPr lang="ko-KR" altLang="en-US" sz="1400" dirty="0" smtClean="0">
+                <a:latin typeface="굴림체" pitchFamily="49" charset="-127"/>
+                <a:ea typeface="굴림체" pitchFamily="49" charset="-127"/>
+              </a:rPr>
+              <a:t>실패 확률</a:t>
+            </a:r>
+            <a:endParaRPr lang="en-US" altLang="ko-KR" sz="1400" dirty="0" smtClean="0">
+              <a:latin typeface="굴림체" pitchFamily="49" charset="-127"/>
+              <a:ea typeface="굴림체" pitchFamily="49" charset="-127"/>
+            </a:endParaRPr>
+          </a:p>
+          <a:p>
+            <a:pPr marL="0" indent="0">
+              <a:buNone/>
+            </a:pPr>
+            <a:r>
+              <a:rPr lang="en-US" altLang="ko-KR" sz="1400" dirty="0" smtClean="0">
+                <a:latin typeface="굴림체" pitchFamily="49" charset="-127"/>
+                <a:ea typeface="굴림체" pitchFamily="49" charset="-127"/>
+              </a:rPr>
+              <a:t>	3.3.3 </a:t>
+            </a:r>
+            <a:r>
+              <a:rPr lang="ko-KR" altLang="en-US" sz="1400" dirty="0" err="1" smtClean="0">
+                <a:latin typeface="굴림체" pitchFamily="49" charset="-127"/>
+                <a:ea typeface="굴림체" pitchFamily="49" charset="-127"/>
+              </a:rPr>
+              <a:t>엔딩</a:t>
+            </a:r>
+            <a:r>
+              <a:rPr lang="ko-KR" altLang="en-US" sz="1400" dirty="0" smtClean="0">
+                <a:latin typeface="굴림체" pitchFamily="49" charset="-127"/>
+                <a:ea typeface="굴림체" pitchFamily="49" charset="-127"/>
+              </a:rPr>
+              <a:t> 종류</a:t>
+            </a:r>
+            <a:r>
+              <a:rPr lang="en-US" altLang="ko-KR" sz="1400" dirty="0" smtClean="0">
+                <a:latin typeface="굴림체" pitchFamily="49" charset="-127"/>
+                <a:ea typeface="굴림체" pitchFamily="49" charset="-127"/>
+              </a:rPr>
+              <a:t>/</a:t>
+            </a:r>
+            <a:r>
+              <a:rPr lang="ko-KR" altLang="en-US" sz="1400" dirty="0" smtClean="0">
+                <a:latin typeface="굴림체" pitchFamily="49" charset="-127"/>
+                <a:ea typeface="굴림체" pitchFamily="49" charset="-127"/>
+              </a:rPr>
+              <a:t>조건</a:t>
+            </a:r>
+            <a:endParaRPr lang="en-US" altLang="ko-KR" sz="1400" dirty="0">
+              <a:latin typeface="굴림체" pitchFamily="49" charset="-127"/>
+              <a:ea typeface="굴림체" pitchFamily="49" charset="-127"/>
+            </a:endParaRPr>
+          </a:p>
+          <a:p>
+            <a:pPr marL="0" indent="0">
+              <a:buNone/>
             </a:pPr>
             <a:endParaRPr lang="en-US" altLang="ko-KR" sz="1400" dirty="0" smtClean="0">
               <a:latin typeface="굴림체" pitchFamily="49" charset="-127"/>
@@ -5267,7 +5258,7 @@
             <a:pPr marL="0" indent="0">
               <a:buNone/>
             </a:pPr>
-            <a:endParaRPr lang="en-US" altLang="ko-KR" sz="1400" dirty="0" smtClean="0">
+            <a:endParaRPr lang="en-US" altLang="ko-KR" sz="1600" dirty="0" smtClean="0">
               <a:latin typeface="굴림체" pitchFamily="49" charset="-127"/>
               <a:ea typeface="굴림체" pitchFamily="49" charset="-127"/>
             </a:endParaRPr>
@@ -5364,14 +5355,14 @@
                 <a:latin typeface="굴림체" pitchFamily="49" charset="-127"/>
                 <a:ea typeface="굴림체" pitchFamily="49" charset="-127"/>
               </a:rPr>
-              <a:t>5. </a:t>
+              <a:t>4. </a:t>
             </a:r>
             <a:r>
               <a:rPr lang="ko-KR" altLang="en-US" sz="2000" dirty="0" smtClean="0">
                 <a:latin typeface="굴림체" pitchFamily="49" charset="-127"/>
                 <a:ea typeface="굴림체" pitchFamily="49" charset="-127"/>
               </a:rPr>
-              <a:t>본 게임의 주요 시스템</a:t>
+              <a:t>아이템 및 장비</a:t>
             </a:r>
             <a:endParaRPr lang="en-US" altLang="ko-KR" sz="2000" dirty="0" smtClean="0">
               <a:latin typeface="굴림체" pitchFamily="49" charset="-127"/>
@@ -5391,91 +5382,7 @@
             <a:pPr marL="0" indent="0">
               <a:buNone/>
             </a:pPr>
-            <a:r>
-              <a:rPr lang="ko-KR" altLang="en-US" sz="1400" dirty="0" err="1" smtClean="0">
-                <a:latin typeface="굴림체" pitchFamily="49" charset="-127"/>
-                <a:ea typeface="굴림체" pitchFamily="49" charset="-127"/>
-              </a:rPr>
-              <a:t>카라마치의</a:t>
-            </a:r>
-            <a:r>
-              <a:rPr lang="ko-KR" altLang="en-US" sz="1400" dirty="0" smtClean="0">
-                <a:latin typeface="굴림체" pitchFamily="49" charset="-127"/>
-                <a:ea typeface="굴림체" pitchFamily="49" charset="-127"/>
-              </a:rPr>
-              <a:t> 한마디로 이따이해진 사신이치마츠가 카라마츠를 죽여버렸다</a:t>
-            </a:r>
-            <a:r>
-              <a:rPr lang="en-US" altLang="ko-KR" sz="1400" dirty="0" smtClean="0">
-                <a:latin typeface="굴림체" pitchFamily="49" charset="-127"/>
-                <a:ea typeface="굴림체" pitchFamily="49" charset="-127"/>
-              </a:rPr>
-              <a:t>.</a:t>
-            </a:r>
-          </a:p>
-          <a:p>
-            <a:pPr marL="0" indent="0">
-              <a:buNone/>
-            </a:pPr>
-            <a:r>
-              <a:rPr lang="ko-KR" altLang="en-US" sz="1400" dirty="0" smtClean="0">
-                <a:latin typeface="굴림체" pitchFamily="49" charset="-127"/>
-                <a:ea typeface="굴림체" pitchFamily="49" charset="-127"/>
-              </a:rPr>
-              <a:t>그걸 본 여신쵸로마츠는 그런 카라마츠를 불쌍히 여겨 인간아기로 되살려 플레이어에게 맡긴다</a:t>
-            </a:r>
-            <a:r>
-              <a:rPr lang="en-US" altLang="ko-KR" sz="1400" dirty="0" smtClean="0">
-                <a:latin typeface="굴림체" pitchFamily="49" charset="-127"/>
-                <a:ea typeface="굴림체" pitchFamily="49" charset="-127"/>
-              </a:rPr>
-              <a:t>.</a:t>
-            </a:r>
-          </a:p>
-          <a:p>
-            <a:pPr marL="0" indent="0">
-              <a:buNone/>
-            </a:pPr>
-            <a:r>
-              <a:rPr lang="ko-KR" altLang="en-US" sz="1400" dirty="0" smtClean="0">
-                <a:latin typeface="굴림체" pitchFamily="49" charset="-127"/>
-                <a:ea typeface="굴림체" pitchFamily="49" charset="-127"/>
-              </a:rPr>
-              <a:t>여신쵸로마츠는 카라마츠가 참된 인간으로 자라게 하기 위해 플레이어 집의 집사가 되기로 한다</a:t>
-            </a:r>
-            <a:r>
-              <a:rPr lang="en-US" altLang="ko-KR" sz="1400" dirty="0" smtClean="0">
-                <a:latin typeface="굴림체" pitchFamily="49" charset="-127"/>
-                <a:ea typeface="굴림체" pitchFamily="49" charset="-127"/>
-              </a:rPr>
-              <a:t>.</a:t>
-            </a:r>
-            <a:r>
-              <a:rPr lang="ko-KR" altLang="en-US" sz="1400" dirty="0" smtClean="0">
-                <a:latin typeface="굴림체" pitchFamily="49" charset="-127"/>
-                <a:ea typeface="굴림체" pitchFamily="49" charset="-127"/>
-              </a:rPr>
-              <a:t>  </a:t>
-            </a:r>
-            <a:endParaRPr lang="en-US" altLang="ko-KR" sz="1400" dirty="0">
-              <a:latin typeface="굴림체" pitchFamily="49" charset="-127"/>
-              <a:ea typeface="굴림체" pitchFamily="49" charset="-127"/>
-            </a:endParaRPr>
-          </a:p>
-          <a:p>
-            <a:pPr marL="457200" indent="-457200">
-              <a:buAutoNum type="arabicPeriod"/>
-            </a:pPr>
             <a:endParaRPr lang="en-US" altLang="ko-KR" sz="1400" dirty="0" smtClean="0">
-              <a:latin typeface="굴림체" pitchFamily="49" charset="-127"/>
-              <a:ea typeface="굴림체" pitchFamily="49" charset="-127"/>
-            </a:endParaRPr>
-          </a:p>
-          <a:p>
-            <a:pPr marL="0" indent="0">
-              <a:buNone/>
-            </a:pPr>
-            <a:endParaRPr lang="en-US" altLang="ko-KR" sz="1600" dirty="0" smtClean="0">
               <a:latin typeface="굴림체" pitchFamily="49" charset="-127"/>
               <a:ea typeface="굴림체" pitchFamily="49" charset="-127"/>
             </a:endParaRPr>
@@ -5572,100 +5479,16 @@
                 <a:latin typeface="굴림체" pitchFamily="49" charset="-127"/>
                 <a:ea typeface="굴림체" pitchFamily="49" charset="-127"/>
               </a:rPr>
-              <a:t>6. </a:t>
+              <a:t>5. </a:t>
             </a:r>
             <a:r>
               <a:rPr lang="ko-KR" altLang="en-US" sz="2000" dirty="0" smtClean="0">
                 <a:latin typeface="굴림체" pitchFamily="49" charset="-127"/>
                 <a:ea typeface="굴림체" pitchFamily="49" charset="-127"/>
               </a:rPr>
-              <a:t>유료화 모델</a:t>
+              <a:t>본 게임의 주요 시스템</a:t>
             </a:r>
             <a:endParaRPr lang="en-US" altLang="ko-KR" sz="2000" dirty="0" smtClean="0">
-              <a:latin typeface="굴림체" pitchFamily="49" charset="-127"/>
-              <a:ea typeface="굴림체" pitchFamily="49" charset="-127"/>
-            </a:endParaRPr>
-          </a:p>
-          <a:p>
-            <a:pPr marL="0" indent="0">
-              <a:buNone/>
-            </a:pPr>
-            <a:endParaRPr lang="en-US" altLang="ko-KR" sz="1400" dirty="0" smtClean="0">
-              <a:latin typeface="굴림체" pitchFamily="49" charset="-127"/>
-              <a:ea typeface="굴림체" pitchFamily="49" charset="-127"/>
-            </a:endParaRPr>
-          </a:p>
-          <a:p>
-            <a:pPr marL="0" indent="0">
-              <a:buNone/>
-            </a:pPr>
-            <a:r>
-              <a:rPr lang="ko-KR" altLang="en-US" sz="1400" dirty="0" err="1" smtClean="0">
-                <a:latin typeface="굴림체" pitchFamily="49" charset="-127"/>
-                <a:ea typeface="굴림체" pitchFamily="49" charset="-127"/>
-              </a:rPr>
-              <a:t>카라마치의</a:t>
-            </a:r>
-            <a:r>
-              <a:rPr lang="ko-KR" altLang="en-US" sz="1400" dirty="0" smtClean="0">
-                <a:latin typeface="굴림체" pitchFamily="49" charset="-127"/>
-                <a:ea typeface="굴림체" pitchFamily="49" charset="-127"/>
-              </a:rPr>
-              <a:t> 한마디로 이따이해진 사신이치마츠가 카라마츠를 죽여버렸다</a:t>
-            </a:r>
-            <a:r>
-              <a:rPr lang="en-US" altLang="ko-KR" sz="1400" dirty="0" smtClean="0">
-                <a:latin typeface="굴림체" pitchFamily="49" charset="-127"/>
-                <a:ea typeface="굴림체" pitchFamily="49" charset="-127"/>
-              </a:rPr>
-              <a:t>.</a:t>
-            </a:r>
-          </a:p>
-          <a:p>
-            <a:pPr marL="0" indent="0">
-              <a:buNone/>
-            </a:pPr>
-            <a:r>
-              <a:rPr lang="ko-KR" altLang="en-US" sz="1400" dirty="0" smtClean="0">
-                <a:latin typeface="굴림체" pitchFamily="49" charset="-127"/>
-                <a:ea typeface="굴림체" pitchFamily="49" charset="-127"/>
-              </a:rPr>
-              <a:t>그걸 본 여신쵸로마츠는 그런 카라마츠를 불쌍히 여겨 인간아기로 되살려 플레이어에게 맡긴다</a:t>
-            </a:r>
-            <a:r>
-              <a:rPr lang="en-US" altLang="ko-KR" sz="1400" dirty="0" smtClean="0">
-                <a:latin typeface="굴림체" pitchFamily="49" charset="-127"/>
-                <a:ea typeface="굴림체" pitchFamily="49" charset="-127"/>
-              </a:rPr>
-              <a:t>.</a:t>
-            </a:r>
-          </a:p>
-          <a:p>
-            <a:pPr marL="0" indent="0">
-              <a:buNone/>
-            </a:pPr>
-            <a:r>
-              <a:rPr lang="ko-KR" altLang="en-US" sz="1400" dirty="0" smtClean="0">
-                <a:latin typeface="굴림체" pitchFamily="49" charset="-127"/>
-                <a:ea typeface="굴림체" pitchFamily="49" charset="-127"/>
-              </a:rPr>
-              <a:t>여신쵸로마츠는 카라마츠가 참된 인간으로 자라게 하기 위해 플레이어 집의 집사가 되기로 한다</a:t>
-            </a:r>
-            <a:r>
-              <a:rPr lang="en-US" altLang="ko-KR" sz="1400" dirty="0" smtClean="0">
-                <a:latin typeface="굴림체" pitchFamily="49" charset="-127"/>
-                <a:ea typeface="굴림체" pitchFamily="49" charset="-127"/>
-              </a:rPr>
-              <a:t>.</a:t>
-            </a:r>
-            <a:r>
-              <a:rPr lang="ko-KR" altLang="en-US" sz="1400" dirty="0" smtClean="0">
-                <a:latin typeface="굴림체" pitchFamily="49" charset="-127"/>
-                <a:ea typeface="굴림체" pitchFamily="49" charset="-127"/>
-              </a:rPr>
-              <a:t>  </a:t>
-            </a:r>
-            <a:endParaRPr lang="en-US" altLang="ko-KR" sz="1400" dirty="0">
               <a:latin typeface="굴림체" pitchFamily="49" charset="-127"/>
               <a:ea typeface="굴림체" pitchFamily="49" charset="-127"/>
             </a:endParaRPr>
@@ -5683,6 +5506,90 @@
             <a:pPr marL="0" indent="0">
               <a:buNone/>
             </a:pPr>
+            <a:r>
+              <a:rPr lang="ko-KR" altLang="en-US" sz="1400" dirty="0" err="1" smtClean="0">
+                <a:latin typeface="굴림체" pitchFamily="49" charset="-127"/>
+                <a:ea typeface="굴림체" pitchFamily="49" charset="-127"/>
+              </a:rPr>
+              <a:t>카라마치의</a:t>
+            </a:r>
+            <a:r>
+              <a:rPr lang="ko-KR" altLang="en-US" sz="1400" dirty="0" smtClean="0">
+                <a:latin typeface="굴림체" pitchFamily="49" charset="-127"/>
+                <a:ea typeface="굴림체" pitchFamily="49" charset="-127"/>
+              </a:rPr>
+              <a:t> 한마디로 이따이해진 사신이치마츠가 카라마츠를 죽여버렸다</a:t>
+            </a:r>
+            <a:r>
+              <a:rPr lang="en-US" altLang="ko-KR" sz="1400" dirty="0" smtClean="0">
+                <a:latin typeface="굴림체" pitchFamily="49" charset="-127"/>
+                <a:ea typeface="굴림체" pitchFamily="49" charset="-127"/>
+              </a:rPr>
+              <a:t>.</a:t>
+            </a:r>
+          </a:p>
+          <a:p>
+            <a:pPr marL="0" indent="0">
+              <a:buNone/>
+            </a:pPr>
+            <a:r>
+              <a:rPr lang="ko-KR" altLang="en-US" sz="1400" dirty="0" smtClean="0">
+                <a:latin typeface="굴림체" pitchFamily="49" charset="-127"/>
+                <a:ea typeface="굴림체" pitchFamily="49" charset="-127"/>
+              </a:rPr>
+              <a:t>그걸 본 여신쵸로마츠는 그런 카라마츠를 불쌍히 여겨 인간아기로 되살려 플레이어에게 맡긴다</a:t>
+            </a:r>
+            <a:r>
+              <a:rPr lang="en-US" altLang="ko-KR" sz="1400" dirty="0" smtClean="0">
+                <a:latin typeface="굴림체" pitchFamily="49" charset="-127"/>
+                <a:ea typeface="굴림체" pitchFamily="49" charset="-127"/>
+              </a:rPr>
+              <a:t>.</a:t>
+            </a:r>
+          </a:p>
+          <a:p>
+            <a:pPr marL="0" indent="0">
+              <a:buNone/>
+            </a:pPr>
+            <a:r>
+              <a:rPr lang="ko-KR" altLang="en-US" sz="1400" dirty="0" smtClean="0">
+                <a:latin typeface="굴림체" pitchFamily="49" charset="-127"/>
+                <a:ea typeface="굴림체" pitchFamily="49" charset="-127"/>
+              </a:rPr>
+              <a:t>여신쵸로마츠는 카라마츠가 참된 인간으로 자라게 하기 위해 플레이어 집의 집사가 되기로 한다</a:t>
+            </a:r>
+            <a:r>
+              <a:rPr lang="en-US" altLang="ko-KR" sz="1400" dirty="0" smtClean="0">
+                <a:latin typeface="굴림체" pitchFamily="49" charset="-127"/>
+                <a:ea typeface="굴림체" pitchFamily="49" charset="-127"/>
+              </a:rPr>
+              <a:t>.</a:t>
+            </a:r>
+            <a:r>
+              <a:rPr lang="ko-KR" altLang="en-US" sz="1400" dirty="0" smtClean="0">
+                <a:latin typeface="굴림체" pitchFamily="49" charset="-127"/>
+                <a:ea typeface="굴림체" pitchFamily="49" charset="-127"/>
+              </a:rPr>
+              <a:t>  </a:t>
+            </a:r>
+            <a:endParaRPr lang="en-US" altLang="ko-KR" sz="1400" dirty="0">
+              <a:latin typeface="굴림체" pitchFamily="49" charset="-127"/>
+              <a:ea typeface="굴림체" pitchFamily="49" charset="-127"/>
+            </a:endParaRPr>
+          </a:p>
+          <a:p>
+            <a:pPr marL="457200" indent="-457200">
+              <a:buAutoNum type="arabicPeriod"/>
+            </a:pPr>
+            <a:endParaRPr lang="en-US" altLang="ko-KR" sz="1400" dirty="0" smtClean="0">
+              <a:latin typeface="굴림체" pitchFamily="49" charset="-127"/>
+              <a:ea typeface="굴림체" pitchFamily="49" charset="-127"/>
+            </a:endParaRPr>
+          </a:p>
+          <a:p>
+            <a:pPr marL="0" indent="0">
+              <a:buNone/>
+            </a:pPr>
             <a:endParaRPr lang="en-US" altLang="ko-KR" sz="1600" dirty="0" smtClean="0">
               <a:latin typeface="굴림체" pitchFamily="49" charset="-127"/>
               <a:ea typeface="굴림체" pitchFamily="49" charset="-127"/>
@@ -5708,6 +5615,214 @@
             <a:fld id="{5078E833-DA21-410B-97BB-1AB410559DE8}" type="slidenum">
               <a:rPr lang="ko-KR" altLang="en-US" smtClean="0"/>
               <a:t>8</a:t>
+            </a:fld>
+            <a:endParaRPr lang="ko-KR" altLang="en-US"/>
+          </a:p>
+        </p:txBody>
+      </p:sp>
+    </p:spTree>
+    <p:extLst>
+      <p:ext uri="{BB962C8B-B14F-4D97-AF65-F5344CB8AC3E}">
+        <p14:creationId xmlns:p14="http://schemas.microsoft.com/office/powerpoint/2010/main" val="1527275268"/>
+      </p:ext>
+    </p:extLst>
+  </p:cSld>
+  <p:clrMapOvr>
+    <a:masterClrMapping/>
+  </p:clrMapOvr>
+  <p:timing>
+    <p:tnLst>
+      <p:par>
+        <p:cTn id="1" dur="indefinite" restart="never" nodeType="tmRoot"/>
+      </p:par>
+    </p:tnLst>
+  </p:timing>
+</p:sld>
+</file>
+
+<file path=ppt/slides/slide9.xml><?xml version="1.0" encoding="utf-8"?>
+<p:sld xmlns:a="http://schemas.openxmlformats.org/drawingml/2006/main" xmlns:r="http://schemas.openxmlformats.org/officeDocument/2006/relationships" xmlns:p="http://schemas.openxmlformats.org/presentationml/2006/main">
+  <p:cSld>
+    <p:spTree>
+      <p:nvGrpSpPr>
+        <p:cNvPr id="1" name=""/>
+        <p:cNvGrpSpPr/>
+        <p:nvPr/>
+      </p:nvGrpSpPr>
+      <p:grpSpPr>
+        <a:xfrm>
+          <a:off x="0" y="0"/>
+          <a:ext cx="0" cy="0"/>
+          <a:chOff x="0" y="0"/>
+          <a:chExt cx="0" cy="0"/>
+        </a:xfrm>
+      </p:grpSpPr>
+      <p:sp>
+        <p:nvSpPr>
+          <p:cNvPr id="3" name="내용 개체 틀 2"/>
+          <p:cNvSpPr>
+            <a:spLocks noGrp="1"/>
+          </p:cNvSpPr>
+          <p:nvPr>
+            <p:ph idx="1"/>
+          </p:nvPr>
+        </p:nvSpPr>
+        <p:spPr>
+          <a:xfrm>
+            <a:off x="107504" y="116632"/>
+            <a:ext cx="8928992" cy="6624736"/>
+          </a:xfrm>
+        </p:spPr>
+        <p:txBody>
+          <a:bodyPr>
+            <a:normAutofit/>
+          </a:bodyPr>
+          <a:lstStyle/>
+          <a:p>
+            <a:pPr marL="0" indent="0">
+              <a:buNone/>
+            </a:pPr>
+            <a:r>
+              <a:rPr lang="en-US" altLang="ko-KR" sz="2000" dirty="0" smtClean="0">
+                <a:latin typeface="굴림체" pitchFamily="49" charset="-127"/>
+                <a:ea typeface="굴림체" pitchFamily="49" charset="-127"/>
+              </a:rPr>
+              <a:t>6. </a:t>
+            </a:r>
+            <a:r>
+              <a:rPr lang="ko-KR" altLang="en-US" sz="2000" dirty="0" smtClean="0">
+                <a:latin typeface="굴림체" pitchFamily="49" charset="-127"/>
+                <a:ea typeface="굴림체" pitchFamily="49" charset="-127"/>
+              </a:rPr>
+              <a:t>유료화 모델</a:t>
+            </a:r>
+            <a:endParaRPr lang="en-US" altLang="ko-KR" sz="2000" dirty="0" smtClean="0">
+              <a:latin typeface="굴림체" pitchFamily="49" charset="-127"/>
+              <a:ea typeface="굴림체" pitchFamily="49" charset="-127"/>
+            </a:endParaRPr>
+          </a:p>
+          <a:p>
+            <a:pPr marL="0" indent="0">
+              <a:buNone/>
+            </a:pPr>
+            <a:endParaRPr lang="en-US" altLang="ko-KR" sz="1400" dirty="0" smtClean="0">
+              <a:latin typeface="굴림체" pitchFamily="49" charset="-127"/>
+              <a:ea typeface="굴림체" pitchFamily="49" charset="-127"/>
+            </a:endParaRPr>
+          </a:p>
+          <a:p>
+            <a:pPr marL="0" indent="0">
+              <a:buNone/>
+            </a:pPr>
+            <a:r>
+              <a:rPr lang="ko-KR" altLang="en-US" sz="1400" dirty="0" err="1" smtClean="0">
+                <a:latin typeface="굴림체" pitchFamily="49" charset="-127"/>
+                <a:ea typeface="굴림체" pitchFamily="49" charset="-127"/>
+              </a:rPr>
+              <a:t>카라마치의</a:t>
+            </a:r>
+            <a:r>
+              <a:rPr lang="ko-KR" altLang="en-US" sz="1400" dirty="0" smtClean="0">
+                <a:latin typeface="굴림체" pitchFamily="49" charset="-127"/>
+                <a:ea typeface="굴림체" pitchFamily="49" charset="-127"/>
+              </a:rPr>
+              <a:t> 한마디로 이따이해진 사신이치마츠가 카라마츠를 죽여버렸다</a:t>
+            </a:r>
+            <a:r>
+              <a:rPr lang="en-US" altLang="ko-KR" sz="1400" dirty="0" smtClean="0">
+                <a:latin typeface="굴림체" pitchFamily="49" charset="-127"/>
+                <a:ea typeface="굴림체" pitchFamily="49" charset="-127"/>
+              </a:rPr>
+              <a:t>.</a:t>
+            </a:r>
+          </a:p>
+          <a:p>
+            <a:pPr marL="0" indent="0">
+              <a:buNone/>
+            </a:pPr>
+            <a:r>
+              <a:rPr lang="ko-KR" altLang="en-US" sz="1400" dirty="0" smtClean="0">
+                <a:latin typeface="굴림체" pitchFamily="49" charset="-127"/>
+                <a:ea typeface="굴림체" pitchFamily="49" charset="-127"/>
+              </a:rPr>
+              <a:t>그걸 본 여신쵸로마츠는 그런 카라마츠를 불쌍히 여겨 인간아기로 되살려 플레이어에게 맡긴다</a:t>
+            </a:r>
+            <a:r>
+              <a:rPr lang="en-US" altLang="ko-KR" sz="1400" dirty="0" smtClean="0">
+                <a:latin typeface="굴림체" pitchFamily="49" charset="-127"/>
+                <a:ea typeface="굴림체" pitchFamily="49" charset="-127"/>
+              </a:rPr>
+              <a:t>.</a:t>
+            </a:r>
+          </a:p>
+          <a:p>
+            <a:pPr marL="0" indent="0">
+              <a:buNone/>
+            </a:pPr>
+            <a:r>
+              <a:rPr lang="ko-KR" altLang="en-US" sz="1400" dirty="0" smtClean="0">
+                <a:latin typeface="굴림체" pitchFamily="49" charset="-127"/>
+                <a:ea typeface="굴림체" pitchFamily="49" charset="-127"/>
+              </a:rPr>
+              <a:t>여신쵸로마츠는 카라마츠가 참된 인간으로 자라게 하기 위해 플레이어 집의 집사가 되기로 한다</a:t>
+            </a:r>
+            <a:r>
+              <a:rPr lang="en-US" altLang="ko-KR" sz="1400" dirty="0" smtClean="0">
+                <a:latin typeface="굴림체" pitchFamily="49" charset="-127"/>
+                <a:ea typeface="굴림체" pitchFamily="49" charset="-127"/>
+              </a:rPr>
+              <a:t>.</a:t>
+            </a:r>
+            <a:r>
+              <a:rPr lang="ko-KR" altLang="en-US" sz="1400" dirty="0" smtClean="0">
+                <a:latin typeface="굴림체" pitchFamily="49" charset="-127"/>
+                <a:ea typeface="굴림체" pitchFamily="49" charset="-127"/>
+              </a:rPr>
+              <a:t>  </a:t>
+            </a:r>
+            <a:endParaRPr lang="en-US" altLang="ko-KR" sz="1400" dirty="0">
+              <a:latin typeface="굴림체" pitchFamily="49" charset="-127"/>
+              <a:ea typeface="굴림체" pitchFamily="49" charset="-127"/>
+            </a:endParaRPr>
+          </a:p>
+          <a:p>
+            <a:pPr marL="457200" indent="-457200">
+              <a:buAutoNum type="arabicPeriod"/>
+            </a:pPr>
+            <a:endParaRPr lang="en-US" altLang="ko-KR" sz="1400" dirty="0" smtClean="0">
+              <a:latin typeface="굴림체" pitchFamily="49" charset="-127"/>
+              <a:ea typeface="굴림체" pitchFamily="49" charset="-127"/>
+            </a:endParaRPr>
+          </a:p>
+          <a:p>
+            <a:pPr marL="0" indent="0">
+              <a:buNone/>
+            </a:pPr>
+            <a:endParaRPr lang="en-US" altLang="ko-KR" sz="1600" dirty="0" smtClean="0">
+              <a:latin typeface="굴림체" pitchFamily="49" charset="-127"/>
+              <a:ea typeface="굴림체" pitchFamily="49" charset="-127"/>
+            </a:endParaRPr>
+          </a:p>
+        </p:txBody>
+      </p:sp>
+      <p:sp>
+        <p:nvSpPr>
+          <p:cNvPr id="2" name="슬라이드 번호 개체 틀 1"/>
+          <p:cNvSpPr>
+            <a:spLocks noGrp="1"/>
+          </p:cNvSpPr>
+          <p:nvPr>
+            <p:ph type="sldNum" sz="quarter" idx="12"/>
+          </p:nvPr>
+        </p:nvSpPr>
+        <p:spPr/>
+        <p:txBody>
+          <a:bodyPr/>
+          <a:lstStyle/>
+          <a:p>
+            <a:fld id="{5078E833-DA21-410B-97BB-1AB410559DE8}" type="slidenum">
+              <a:rPr lang="ko-KR" altLang="en-US" smtClean="0"/>
+              <a:t>9</a:t>
             </a:fld>
             <a:endParaRPr lang="ko-KR" altLang="en-US"/>
           </a:p>

</xml_diff>